<commit_message>
ajout des outils de gestion de projet maj
</commit_message>
<xml_diff>
--- a/gestion_projet/planning_et_suivi_de_projet.pptx
+++ b/gestion_projet/planning_et_suivi_de_projet.pptx
@@ -7,6 +7,10 @@
   <p:sldIdLst>
     <p:sldId id="257" r:id="rId2"/>
     <p:sldId id="256" r:id="rId3"/>
+    <p:sldId id="259" r:id="rId4"/>
+    <p:sldId id="260" r:id="rId5"/>
+    <p:sldId id="261" r:id="rId6"/>
+    <p:sldId id="262" r:id="rId7"/>
   </p:sldIdLst>
   <p:sldSz cx="12192000" cy="6858000"/>
   <p:notesSz cx="6858000" cy="9144000"/>
@@ -105,6 +109,11 @@
       </a:defRPr>
     </a:lvl9pPr>
   </p:defaultTextStyle>
+  <p:extLst>
+    <p:ext uri="{EFAFB233-063F-42B5-8137-9DF3F51BA10A}">
+      <p15:sldGuideLst xmlns:p15="http://schemas.microsoft.com/office/powerpoint/2012/main"/>
+    </p:ext>
+  </p:extLst>
 </p:presentation>
 </file>
 
@@ -239,7 +248,7 @@
           <a:p>
             <a:fld id="{61392CA3-05B0-4392-AF3B-A66AF8F6FDA4}" type="datetimeFigureOut">
               <a:rPr lang="fr-FR" smtClean="0"/>
-              <a:t>01/08/2024</a:t>
+              <a:t>19/12/2024</a:t>
             </a:fld>
             <a:endParaRPr lang="fr-FR"/>
           </a:p>
@@ -409,7 +418,7 @@
           <a:p>
             <a:fld id="{61392CA3-05B0-4392-AF3B-A66AF8F6FDA4}" type="datetimeFigureOut">
               <a:rPr lang="fr-FR" smtClean="0"/>
-              <a:t>01/08/2024</a:t>
+              <a:t>19/12/2024</a:t>
             </a:fld>
             <a:endParaRPr lang="fr-FR"/>
           </a:p>
@@ -589,7 +598,7 @@
           <a:p>
             <a:fld id="{61392CA3-05B0-4392-AF3B-A66AF8F6FDA4}" type="datetimeFigureOut">
               <a:rPr lang="fr-FR" smtClean="0"/>
-              <a:t>01/08/2024</a:t>
+              <a:t>19/12/2024</a:t>
             </a:fld>
             <a:endParaRPr lang="fr-FR"/>
           </a:p>
@@ -759,7 +768,7 @@
           <a:p>
             <a:fld id="{61392CA3-05B0-4392-AF3B-A66AF8F6FDA4}" type="datetimeFigureOut">
               <a:rPr lang="fr-FR" smtClean="0"/>
-              <a:t>01/08/2024</a:t>
+              <a:t>19/12/2024</a:t>
             </a:fld>
             <a:endParaRPr lang="fr-FR"/>
           </a:p>
@@ -1005,7 +1014,7 @@
           <a:p>
             <a:fld id="{61392CA3-05B0-4392-AF3B-A66AF8F6FDA4}" type="datetimeFigureOut">
               <a:rPr lang="fr-FR" smtClean="0"/>
-              <a:t>01/08/2024</a:t>
+              <a:t>19/12/2024</a:t>
             </a:fld>
             <a:endParaRPr lang="fr-FR"/>
           </a:p>
@@ -1237,7 +1246,7 @@
           <a:p>
             <a:fld id="{61392CA3-05B0-4392-AF3B-A66AF8F6FDA4}" type="datetimeFigureOut">
               <a:rPr lang="fr-FR" smtClean="0"/>
-              <a:t>01/08/2024</a:t>
+              <a:t>19/12/2024</a:t>
             </a:fld>
             <a:endParaRPr lang="fr-FR"/>
           </a:p>
@@ -1604,7 +1613,7 @@
           <a:p>
             <a:fld id="{61392CA3-05B0-4392-AF3B-A66AF8F6FDA4}" type="datetimeFigureOut">
               <a:rPr lang="fr-FR" smtClean="0"/>
-              <a:t>01/08/2024</a:t>
+              <a:t>19/12/2024</a:t>
             </a:fld>
             <a:endParaRPr lang="fr-FR"/>
           </a:p>
@@ -1722,7 +1731,7 @@
           <a:p>
             <a:fld id="{61392CA3-05B0-4392-AF3B-A66AF8F6FDA4}" type="datetimeFigureOut">
               <a:rPr lang="fr-FR" smtClean="0"/>
-              <a:t>01/08/2024</a:t>
+              <a:t>19/12/2024</a:t>
             </a:fld>
             <a:endParaRPr lang="fr-FR"/>
           </a:p>
@@ -1817,7 +1826,7 @@
           <a:p>
             <a:fld id="{61392CA3-05B0-4392-AF3B-A66AF8F6FDA4}" type="datetimeFigureOut">
               <a:rPr lang="fr-FR" smtClean="0"/>
-              <a:t>01/08/2024</a:t>
+              <a:t>19/12/2024</a:t>
             </a:fld>
             <a:endParaRPr lang="fr-FR"/>
           </a:p>
@@ -2094,7 +2103,7 @@
           <a:p>
             <a:fld id="{61392CA3-05B0-4392-AF3B-A66AF8F6FDA4}" type="datetimeFigureOut">
               <a:rPr lang="fr-FR" smtClean="0"/>
-              <a:t>01/08/2024</a:t>
+              <a:t>19/12/2024</a:t>
             </a:fld>
             <a:endParaRPr lang="fr-FR"/>
           </a:p>
@@ -2347,7 +2356,7 @@
           <a:p>
             <a:fld id="{61392CA3-05B0-4392-AF3B-A66AF8F6FDA4}" type="datetimeFigureOut">
               <a:rPr lang="fr-FR" smtClean="0"/>
-              <a:t>01/08/2024</a:t>
+              <a:t>19/12/2024</a:t>
             </a:fld>
             <a:endParaRPr lang="fr-FR"/>
           </a:p>
@@ -2560,7 +2569,7 @@
           <a:p>
             <a:fld id="{61392CA3-05B0-4392-AF3B-A66AF8F6FDA4}" type="datetimeFigureOut">
               <a:rPr lang="fr-FR" smtClean="0"/>
-              <a:t>01/08/2024</a:t>
+              <a:t>19/12/2024</a:t>
             </a:fld>
             <a:endParaRPr lang="fr-FR"/>
           </a:p>
@@ -3841,6 +3850,266 @@
           </a:fontRef>
         </p:style>
       </p:cxnSp>
+      <p:sp>
+        <p:nvSpPr>
+          <p:cNvPr id="26" name="ZoneTexte 25"/>
+          <p:cNvSpPr txBox="1"/>
+          <p:nvPr/>
+        </p:nvSpPr>
+        <p:spPr>
+          <a:xfrm>
+            <a:off x="2568633" y="1450726"/>
+            <a:ext cx="1413164" cy="584775"/>
+          </a:xfrm>
+          <a:prstGeom prst="rect">
+            <a:avLst/>
+          </a:prstGeom>
+          <a:noFill/>
+        </p:spPr>
+        <p:txBody>
+          <a:bodyPr wrap="square" rtlCol="0">
+            <a:spAutoFit/>
+          </a:bodyPr>
+          <a:lstStyle/>
+          <a:p>
+            <a:pPr algn="ctr"/>
+            <a:r>
+              <a:rPr lang="fr-FR" sz="1600" b="1" dirty="0" smtClean="0"/>
+              <a:t>15</a:t>
+            </a:r>
+            <a:r>
+              <a:rPr lang="fr-FR" sz="1600" b="1" dirty="0" smtClean="0"/>
+              <a:t>/10/24-16/10/24</a:t>
+            </a:r>
+            <a:endParaRPr lang="fr-FR" sz="1600" b="1" dirty="0"/>
+          </a:p>
+        </p:txBody>
+      </p:sp>
+      <p:sp>
+        <p:nvSpPr>
+          <p:cNvPr id="44" name="ZoneTexte 43"/>
+          <p:cNvSpPr txBox="1"/>
+          <p:nvPr/>
+        </p:nvSpPr>
+        <p:spPr>
+          <a:xfrm>
+            <a:off x="3136861" y="2688267"/>
+            <a:ext cx="1805420" cy="369332"/>
+          </a:xfrm>
+          <a:prstGeom prst="rect">
+            <a:avLst/>
+          </a:prstGeom>
+          <a:noFill/>
+        </p:spPr>
+        <p:txBody>
+          <a:bodyPr wrap="square" rtlCol="0">
+            <a:spAutoFit/>
+          </a:bodyPr>
+          <a:lstStyle/>
+          <a:p>
+            <a:pPr algn="ctr"/>
+            <a:r>
+              <a:rPr lang="fr-FR" b="1" dirty="0" smtClean="0"/>
+              <a:t>-Front-end HTML</a:t>
+            </a:r>
+            <a:endParaRPr lang="fr-FR" b="1" dirty="0"/>
+          </a:p>
+        </p:txBody>
+      </p:sp>
+      <p:sp>
+        <p:nvSpPr>
+          <p:cNvPr id="45" name="ZoneTexte 44"/>
+          <p:cNvSpPr txBox="1"/>
+          <p:nvPr/>
+        </p:nvSpPr>
+        <p:spPr>
+          <a:xfrm>
+            <a:off x="3644293" y="3141820"/>
+            <a:ext cx="1438661" cy="1200329"/>
+          </a:xfrm>
+          <a:prstGeom prst="rect">
+            <a:avLst/>
+          </a:prstGeom>
+          <a:noFill/>
+        </p:spPr>
+        <p:txBody>
+          <a:bodyPr wrap="square" rtlCol="0">
+            <a:spAutoFit/>
+          </a:bodyPr>
+          <a:lstStyle/>
+          <a:p>
+            <a:pPr algn="ctr"/>
+            <a:r>
+              <a:rPr lang="fr-FR" b="1" dirty="0" smtClean="0"/>
+              <a:t>-Mise en forme CSS du maquettage</a:t>
+            </a:r>
+            <a:endParaRPr lang="fr-FR" b="1" dirty="0"/>
+          </a:p>
+        </p:txBody>
+      </p:sp>
+      <p:sp>
+        <p:nvSpPr>
+          <p:cNvPr id="46" name="ZoneTexte 45"/>
+          <p:cNvSpPr txBox="1"/>
+          <p:nvPr/>
+        </p:nvSpPr>
+        <p:spPr>
+          <a:xfrm>
+            <a:off x="3586606" y="4393016"/>
+            <a:ext cx="1188719" cy="646331"/>
+          </a:xfrm>
+          <a:prstGeom prst="rect">
+            <a:avLst/>
+          </a:prstGeom>
+          <a:noFill/>
+        </p:spPr>
+        <p:txBody>
+          <a:bodyPr wrap="square" rtlCol="0">
+            <a:spAutoFit/>
+          </a:bodyPr>
+          <a:lstStyle/>
+          <a:p>
+            <a:pPr algn="ctr"/>
+            <a:r>
+              <a:rPr lang="fr-FR" b="1" dirty="0" smtClean="0"/>
+              <a:t>-Codage JavaScript</a:t>
+            </a:r>
+            <a:endParaRPr lang="fr-FR" b="1" dirty="0"/>
+          </a:p>
+        </p:txBody>
+      </p:sp>
+      <p:sp>
+        <p:nvSpPr>
+          <p:cNvPr id="47" name="ZoneTexte 46"/>
+          <p:cNvSpPr txBox="1"/>
+          <p:nvPr/>
+        </p:nvSpPr>
+        <p:spPr>
+          <a:xfrm>
+            <a:off x="5236739" y="2434661"/>
+            <a:ext cx="1188719" cy="923330"/>
+          </a:xfrm>
+          <a:prstGeom prst="rect">
+            <a:avLst/>
+          </a:prstGeom>
+          <a:noFill/>
+        </p:spPr>
+        <p:txBody>
+          <a:bodyPr wrap="square" rtlCol="0">
+            <a:spAutoFit/>
+          </a:bodyPr>
+          <a:lstStyle/>
+          <a:p>
+            <a:pPr algn="ctr"/>
+            <a:r>
+              <a:rPr lang="fr-FR" b="1" dirty="0" smtClean="0"/>
+              <a:t>- C</a:t>
+            </a:r>
+            <a:r>
+              <a:rPr lang="fr-FR" b="1" dirty="0" smtClean="0"/>
+              <a:t>réation du site en PHP</a:t>
+            </a:r>
+            <a:endParaRPr lang="fr-FR" b="1" dirty="0"/>
+          </a:p>
+        </p:txBody>
+      </p:sp>
+      <p:sp>
+        <p:nvSpPr>
+          <p:cNvPr id="48" name="ZoneTexte 47"/>
+          <p:cNvSpPr txBox="1"/>
+          <p:nvPr/>
+        </p:nvSpPr>
+        <p:spPr>
+          <a:xfrm>
+            <a:off x="5806162" y="3386868"/>
+            <a:ext cx="1188719" cy="646331"/>
+          </a:xfrm>
+          <a:prstGeom prst="rect">
+            <a:avLst/>
+          </a:prstGeom>
+          <a:noFill/>
+        </p:spPr>
+        <p:txBody>
+          <a:bodyPr wrap="square" rtlCol="0">
+            <a:spAutoFit/>
+          </a:bodyPr>
+          <a:lstStyle/>
+          <a:p>
+            <a:pPr algn="ctr"/>
+            <a:r>
+              <a:rPr lang="fr-FR" b="1" dirty="0" smtClean="0"/>
+              <a:t>- Création de la BDD</a:t>
+            </a:r>
+            <a:endParaRPr lang="fr-FR" b="1" dirty="0"/>
+          </a:p>
+        </p:txBody>
+      </p:sp>
+      <p:sp>
+        <p:nvSpPr>
+          <p:cNvPr id="49" name="ZoneTexte 48"/>
+          <p:cNvSpPr txBox="1"/>
+          <p:nvPr/>
+        </p:nvSpPr>
+        <p:spPr>
+          <a:xfrm>
+            <a:off x="5569873" y="4139944"/>
+            <a:ext cx="1188719" cy="923330"/>
+          </a:xfrm>
+          <a:prstGeom prst="rect">
+            <a:avLst/>
+          </a:prstGeom>
+          <a:noFill/>
+        </p:spPr>
+        <p:txBody>
+          <a:bodyPr wrap="square" rtlCol="0">
+            <a:spAutoFit/>
+          </a:bodyPr>
+          <a:lstStyle/>
+          <a:p>
+            <a:pPr algn="ctr"/>
+            <a:r>
+              <a:rPr lang="fr-FR" b="1" dirty="0" smtClean="0"/>
+              <a:t>- Création de l’API en PHP</a:t>
+            </a:r>
+            <a:endParaRPr lang="fr-FR" b="1" dirty="0"/>
+          </a:p>
+        </p:txBody>
+      </p:sp>
+      <p:sp>
+        <p:nvSpPr>
+          <p:cNvPr id="50" name="ZoneTexte 49"/>
+          <p:cNvSpPr txBox="1"/>
+          <p:nvPr/>
+        </p:nvSpPr>
+        <p:spPr>
+          <a:xfrm>
+            <a:off x="4424236" y="1435366"/>
+            <a:ext cx="1413164" cy="584775"/>
+          </a:xfrm>
+          <a:prstGeom prst="rect">
+            <a:avLst/>
+          </a:prstGeom>
+          <a:noFill/>
+        </p:spPr>
+        <p:txBody>
+          <a:bodyPr wrap="square" rtlCol="0">
+            <a:spAutoFit/>
+          </a:bodyPr>
+          <a:lstStyle/>
+          <a:p>
+            <a:pPr algn="ctr"/>
+            <a:r>
+              <a:rPr lang="fr-FR" sz="1600" b="1" dirty="0" smtClean="0"/>
+              <a:t>19</a:t>
+            </a:r>
+            <a:r>
+              <a:rPr lang="fr-FR" sz="1600" b="1" dirty="0" smtClean="0"/>
+              <a:t>/12/24-20/12/24</a:t>
+            </a:r>
+            <a:endParaRPr lang="fr-FR" sz="1600" b="1" dirty="0"/>
+          </a:p>
+        </p:txBody>
+      </p:sp>
     </p:spTree>
     <p:extLst>
       <p:ext uri="{BB962C8B-B14F-4D97-AF65-F5344CB8AC3E}">
@@ -4429,6 +4698,2363 @@
     <p:extLst>
       <p:ext uri="{BB962C8B-B14F-4D97-AF65-F5344CB8AC3E}">
         <p14:creationId xmlns:p14="http://schemas.microsoft.com/office/powerpoint/2010/main" val="1734221515"/>
+      </p:ext>
+    </p:extLst>
+  </p:cSld>
+  <p:clrMapOvr>
+    <a:masterClrMapping/>
+  </p:clrMapOvr>
+</p:sld>
+</file>
+
+<file path=ppt/slides/slide3.xml><?xml version="1.0" encoding="utf-8"?>
+<p:sld xmlns:a="http://schemas.openxmlformats.org/drawingml/2006/main" xmlns:r="http://schemas.openxmlformats.org/officeDocument/2006/relationships" xmlns:p="http://schemas.openxmlformats.org/presentationml/2006/main">
+  <p:cSld>
+    <p:spTree>
+      <p:nvGrpSpPr>
+        <p:cNvPr id="1" name=""/>
+        <p:cNvGrpSpPr/>
+        <p:nvPr/>
+      </p:nvGrpSpPr>
+      <p:grpSpPr>
+        <a:xfrm>
+          <a:off x="0" y="0"/>
+          <a:ext cx="0" cy="0"/>
+          <a:chOff x="0" y="0"/>
+          <a:chExt cx="0" cy="0"/>
+        </a:xfrm>
+      </p:grpSpPr>
+      <p:sp>
+        <p:nvSpPr>
+          <p:cNvPr id="4" name="ZoneTexte 3"/>
+          <p:cNvSpPr txBox="1"/>
+          <p:nvPr/>
+        </p:nvSpPr>
+        <p:spPr>
+          <a:xfrm>
+            <a:off x="507077" y="145026"/>
+            <a:ext cx="7365076" cy="461665"/>
+          </a:xfrm>
+          <a:prstGeom prst="rect">
+            <a:avLst/>
+          </a:prstGeom>
+          <a:noFill/>
+        </p:spPr>
+        <p:txBody>
+          <a:bodyPr wrap="square" rtlCol="0">
+            <a:spAutoFit/>
+          </a:bodyPr>
+          <a:lstStyle/>
+          <a:p>
+            <a:pPr algn="ctr"/>
+            <a:r>
+              <a:rPr lang="fr-FR" sz="2400" dirty="0" smtClean="0">
+                <a:latin typeface="Arial Black" panose="020B0A04020102020204" pitchFamily="34" charset="0"/>
+              </a:rPr>
+              <a:t>Partie </a:t>
+            </a:r>
+            <a:r>
+              <a:rPr lang="fr-FR" sz="2400" dirty="0" smtClean="0">
+                <a:latin typeface="Arial Black" panose="020B0A04020102020204" pitchFamily="34" charset="0"/>
+              </a:rPr>
+              <a:t>2: Front-end </a:t>
+            </a:r>
+            <a:endParaRPr lang="fr-FR" sz="2400" dirty="0">
+              <a:latin typeface="Arial Black" panose="020B0A04020102020204" pitchFamily="34" charset="0"/>
+            </a:endParaRPr>
+          </a:p>
+        </p:txBody>
+      </p:sp>
+      <p:sp>
+        <p:nvSpPr>
+          <p:cNvPr id="5" name="ZoneTexte 4"/>
+          <p:cNvSpPr txBox="1"/>
+          <p:nvPr/>
+        </p:nvSpPr>
+        <p:spPr>
+          <a:xfrm>
+            <a:off x="8495607" y="191193"/>
+            <a:ext cx="3466408" cy="369332"/>
+          </a:xfrm>
+          <a:prstGeom prst="rect">
+            <a:avLst/>
+          </a:prstGeom>
+          <a:noFill/>
+        </p:spPr>
+        <p:txBody>
+          <a:bodyPr wrap="square" rtlCol="0">
+            <a:spAutoFit/>
+          </a:bodyPr>
+          <a:lstStyle/>
+          <a:p>
+            <a:r>
+              <a:rPr lang="fr-FR" dirty="0" smtClean="0">
+                <a:latin typeface="Arial Black" panose="020B0A04020102020204" pitchFamily="34" charset="0"/>
+              </a:rPr>
+              <a:t>15</a:t>
+            </a:r>
+            <a:r>
+              <a:rPr lang="fr-FR" dirty="0" smtClean="0">
+                <a:latin typeface="Arial Black" panose="020B0A04020102020204" pitchFamily="34" charset="0"/>
+              </a:rPr>
+              <a:t>/10/2024 </a:t>
+            </a:r>
+            <a:r>
+              <a:rPr lang="fr-FR" dirty="0" smtClean="0">
+                <a:latin typeface="Arial Black" panose="020B0A04020102020204" pitchFamily="34" charset="0"/>
+              </a:rPr>
+              <a:t>– </a:t>
+            </a:r>
+            <a:r>
+              <a:rPr lang="fr-FR" dirty="0" smtClean="0">
+                <a:latin typeface="Arial Black" panose="020B0A04020102020204" pitchFamily="34" charset="0"/>
+              </a:rPr>
+              <a:t>16</a:t>
+            </a:r>
+            <a:r>
+              <a:rPr lang="fr-FR" dirty="0" smtClean="0">
+                <a:latin typeface="Arial Black" panose="020B0A04020102020204" pitchFamily="34" charset="0"/>
+              </a:rPr>
+              <a:t>/10/2024</a:t>
+            </a:r>
+            <a:endParaRPr lang="fr-FR" dirty="0">
+              <a:latin typeface="Arial Black" panose="020B0A04020102020204" pitchFamily="34" charset="0"/>
+            </a:endParaRPr>
+          </a:p>
+        </p:txBody>
+      </p:sp>
+      <p:graphicFrame>
+        <p:nvGraphicFramePr>
+          <p:cNvPr id="6" name="Tableau 5"/>
+          <p:cNvGraphicFramePr>
+            <a:graphicFrameLocks noGrp="1"/>
+          </p:cNvGraphicFramePr>
+          <p:nvPr>
+            <p:extLst>
+              <p:ext uri="{D42A27DB-BD31-4B8C-83A1-F6EECF244321}">
+                <p14:modId xmlns:p14="http://schemas.microsoft.com/office/powerpoint/2010/main" val="2908228078"/>
+              </p:ext>
+            </p:extLst>
+          </p:nvPr>
+        </p:nvGraphicFramePr>
+        <p:xfrm>
+          <a:off x="1573270" y="923932"/>
+          <a:ext cx="8791172" cy="4982345"/>
+        </p:xfrm>
+        <a:graphic>
+          <a:graphicData uri="http://schemas.openxmlformats.org/drawingml/2006/table">
+            <a:tbl>
+              <a:tblPr firstRow="1" bandRow="1">
+                <a:tableStyleId>{93296810-A885-4BE3-A3E7-6D5BEEA58F35}</a:tableStyleId>
+              </a:tblPr>
+              <a:tblGrid>
+                <a:gridCol w="2197793">
+                  <a:extLst>
+                    <a:ext uri="{9D8B030D-6E8A-4147-A177-3AD203B41FA5}">
+                      <a16:colId xmlns:a16="http://schemas.microsoft.com/office/drawing/2014/main" val="1279948072"/>
+                    </a:ext>
+                  </a:extLst>
+                </a:gridCol>
+                <a:gridCol w="2197793">
+                  <a:extLst>
+                    <a:ext uri="{9D8B030D-6E8A-4147-A177-3AD203B41FA5}">
+                      <a16:colId xmlns:a16="http://schemas.microsoft.com/office/drawing/2014/main" val="1593545219"/>
+                    </a:ext>
+                  </a:extLst>
+                </a:gridCol>
+                <a:gridCol w="2197793">
+                  <a:extLst>
+                    <a:ext uri="{9D8B030D-6E8A-4147-A177-3AD203B41FA5}">
+                      <a16:colId xmlns:a16="http://schemas.microsoft.com/office/drawing/2014/main" val="1373504811"/>
+                    </a:ext>
+                  </a:extLst>
+                </a:gridCol>
+                <a:gridCol w="2197793">
+                  <a:extLst>
+                    <a:ext uri="{9D8B030D-6E8A-4147-A177-3AD203B41FA5}">
+                      <a16:colId xmlns:a16="http://schemas.microsoft.com/office/drawing/2014/main" val="1641182163"/>
+                    </a:ext>
+                  </a:extLst>
+                </a:gridCol>
+              </a:tblGrid>
+              <a:tr h="923529">
+                <a:tc>
+                  <a:txBody>
+                    <a:bodyPr/>
+                    <a:lstStyle/>
+                    <a:p>
+                      <a:pPr algn="ctr"/>
+                      <a:endParaRPr lang="fr-FR" dirty="0" smtClean="0"/>
+                    </a:p>
+                    <a:p>
+                      <a:pPr algn="ctr"/>
+                      <a:r>
+                        <a:rPr lang="fr-FR" dirty="0" smtClean="0"/>
+                        <a:t>Taches</a:t>
+                      </a:r>
+                      <a:endParaRPr lang="fr-FR" dirty="0"/>
+                    </a:p>
+                  </a:txBody>
+                  <a:tcPr/>
+                </a:tc>
+                <a:tc>
+                  <a:txBody>
+                    <a:bodyPr/>
+                    <a:lstStyle/>
+                    <a:p>
+                      <a:pPr algn="ctr"/>
+                      <a:endParaRPr lang="fr-FR" dirty="0" smtClean="0"/>
+                    </a:p>
+                    <a:p>
+                      <a:pPr algn="ctr"/>
+                      <a:r>
+                        <a:rPr lang="fr-FR" dirty="0" smtClean="0"/>
+                        <a:t>Gabriel</a:t>
+                      </a:r>
+                      <a:endParaRPr lang="fr-FR" dirty="0"/>
+                    </a:p>
+                  </a:txBody>
+                  <a:tcPr/>
+                </a:tc>
+                <a:tc>
+                  <a:txBody>
+                    <a:bodyPr/>
+                    <a:lstStyle/>
+                    <a:p>
+                      <a:pPr algn="ctr"/>
+                      <a:endParaRPr lang="fr-FR" dirty="0" smtClean="0"/>
+                    </a:p>
+                    <a:p>
+                      <a:pPr algn="ctr"/>
+                      <a:r>
+                        <a:rPr lang="fr-FR" dirty="0" smtClean="0"/>
+                        <a:t>Michael</a:t>
+                      </a:r>
+                      <a:endParaRPr lang="fr-FR" dirty="0"/>
+                    </a:p>
+                  </a:txBody>
+                  <a:tcPr/>
+                </a:tc>
+                <a:tc>
+                  <a:txBody>
+                    <a:bodyPr/>
+                    <a:lstStyle/>
+                    <a:p>
+                      <a:pPr algn="ctr"/>
+                      <a:endParaRPr lang="fr-FR" dirty="0" smtClean="0"/>
+                    </a:p>
+                    <a:p>
+                      <a:pPr algn="ctr"/>
+                      <a:r>
+                        <a:rPr lang="fr-FR" dirty="0" smtClean="0"/>
+                        <a:t>Claude</a:t>
+                      </a:r>
+                      <a:endParaRPr lang="fr-FR" dirty="0"/>
+                    </a:p>
+                  </a:txBody>
+                  <a:tcPr/>
+                </a:tc>
+                <a:extLst>
+                  <a:ext uri="{0D108BD9-81ED-4DB2-BD59-A6C34878D82A}">
+                    <a16:rowId xmlns:a16="http://schemas.microsoft.com/office/drawing/2014/main" val="2647326308"/>
+                  </a:ext>
+                </a:extLst>
+              </a:tr>
+              <a:tr h="699594">
+                <a:tc>
+                  <a:txBody>
+                    <a:bodyPr/>
+                    <a:lstStyle/>
+                    <a:p>
+                      <a:pPr algn="ctr"/>
+                      <a:r>
+                        <a:rPr lang="fr-FR" dirty="0" smtClean="0"/>
+                        <a:t>Mise</a:t>
+                      </a:r>
+                      <a:r>
+                        <a:rPr lang="fr-FR" baseline="0" dirty="0" smtClean="0"/>
+                        <a:t> en forme CSS du maquettage</a:t>
+                      </a:r>
+                      <a:endParaRPr lang="fr-FR" dirty="0"/>
+                    </a:p>
+                  </a:txBody>
+                  <a:tcPr/>
+                </a:tc>
+                <a:tc>
+                  <a:txBody>
+                    <a:bodyPr/>
+                    <a:lstStyle/>
+                    <a:p>
+                      <a:pPr algn="ctr"/>
+                      <a:endParaRPr lang="fr-FR" dirty="0" smtClean="0"/>
+                    </a:p>
+                    <a:p>
+                      <a:pPr algn="ctr"/>
+                      <a:endParaRPr lang="fr-FR" dirty="0"/>
+                    </a:p>
+                  </a:txBody>
+                  <a:tcPr>
+                    <a:solidFill>
+                      <a:schemeClr val="accent6">
+                        <a:lumMod val="75000"/>
+                      </a:schemeClr>
+                    </a:solidFill>
+                  </a:tcPr>
+                </a:tc>
+                <a:tc>
+                  <a:txBody>
+                    <a:bodyPr/>
+                    <a:lstStyle/>
+                    <a:p>
+                      <a:pPr algn="ctr"/>
+                      <a:endParaRPr lang="fr-FR" dirty="0"/>
+                    </a:p>
+                  </a:txBody>
+                  <a:tcPr/>
+                </a:tc>
+                <a:tc>
+                  <a:txBody>
+                    <a:bodyPr/>
+                    <a:lstStyle/>
+                    <a:p>
+                      <a:pPr algn="ctr"/>
+                      <a:endParaRPr lang="fr-FR" dirty="0"/>
+                    </a:p>
+                  </a:txBody>
+                  <a:tcPr/>
+                </a:tc>
+                <a:extLst>
+                  <a:ext uri="{0D108BD9-81ED-4DB2-BD59-A6C34878D82A}">
+                    <a16:rowId xmlns:a16="http://schemas.microsoft.com/office/drawing/2014/main" val="853558620"/>
+                  </a:ext>
+                </a:extLst>
+              </a:tr>
+              <a:tr h="438539">
+                <a:tc>
+                  <a:txBody>
+                    <a:bodyPr/>
+                    <a:lstStyle/>
+                    <a:p>
+                      <a:pPr algn="ctr"/>
+                      <a:r>
+                        <a:rPr lang="fr-FR" dirty="0" smtClean="0"/>
+                        <a:t>Suivi du projet</a:t>
+                      </a:r>
+                      <a:endParaRPr lang="fr-FR" dirty="0"/>
+                    </a:p>
+                  </a:txBody>
+                  <a:tcPr/>
+                </a:tc>
+                <a:tc>
+                  <a:txBody>
+                    <a:bodyPr/>
+                    <a:lstStyle/>
+                    <a:p>
+                      <a:pPr algn="ctr"/>
+                      <a:endParaRPr lang="fr-FR" dirty="0"/>
+                    </a:p>
+                  </a:txBody>
+                  <a:tcPr>
+                    <a:solidFill>
+                      <a:schemeClr val="accent6">
+                        <a:lumMod val="75000"/>
+                      </a:schemeClr>
+                    </a:solidFill>
+                  </a:tcPr>
+                </a:tc>
+                <a:tc>
+                  <a:txBody>
+                    <a:bodyPr/>
+                    <a:lstStyle/>
+                    <a:p>
+                      <a:pPr algn="ctr"/>
+                      <a:endParaRPr lang="fr-FR" dirty="0"/>
+                    </a:p>
+                  </a:txBody>
+                  <a:tcPr/>
+                </a:tc>
+                <a:tc>
+                  <a:txBody>
+                    <a:bodyPr/>
+                    <a:lstStyle/>
+                    <a:p>
+                      <a:pPr algn="ctr"/>
+                      <a:endParaRPr lang="fr-FR" dirty="0"/>
+                    </a:p>
+                  </a:txBody>
+                  <a:tcPr/>
+                </a:tc>
+                <a:extLst>
+                  <a:ext uri="{0D108BD9-81ED-4DB2-BD59-A6C34878D82A}">
+                    <a16:rowId xmlns:a16="http://schemas.microsoft.com/office/drawing/2014/main" val="2561902286"/>
+                  </a:ext>
+                </a:extLst>
+              </a:tr>
+              <a:tr h="737119">
+                <a:tc>
+                  <a:txBody>
+                    <a:bodyPr/>
+                    <a:lstStyle/>
+                    <a:p>
+                      <a:pPr algn="ctr"/>
+                      <a:r>
+                        <a:rPr lang="fr-FR" dirty="0" smtClean="0"/>
+                        <a:t>Mise</a:t>
+                      </a:r>
+                      <a:r>
+                        <a:rPr lang="fr-FR" baseline="0" dirty="0" smtClean="0"/>
+                        <a:t> en forme JS du maquettage</a:t>
+                      </a:r>
+                      <a:endParaRPr lang="fr-FR" dirty="0" smtClean="0"/>
+                    </a:p>
+                  </a:txBody>
+                  <a:tcPr/>
+                </a:tc>
+                <a:tc>
+                  <a:txBody>
+                    <a:bodyPr/>
+                    <a:lstStyle/>
+                    <a:p>
+                      <a:pPr algn="ctr"/>
+                      <a:endParaRPr lang="fr-FR" sz="1800" kern="1200" dirty="0">
+                        <a:solidFill>
+                          <a:schemeClr val="dk1"/>
+                        </a:solidFill>
+                        <a:latin typeface="+mn-lt"/>
+                        <a:ea typeface="+mn-ea"/>
+                        <a:cs typeface="+mn-cs"/>
+                      </a:endParaRPr>
+                    </a:p>
+                  </a:txBody>
+                  <a:tcPr>
+                    <a:solidFill>
+                      <a:schemeClr val="accent6">
+                        <a:lumMod val="75000"/>
+                      </a:schemeClr>
+                    </a:solidFill>
+                  </a:tcPr>
+                </a:tc>
+                <a:tc>
+                  <a:txBody>
+                    <a:bodyPr/>
+                    <a:lstStyle/>
+                    <a:p>
+                      <a:pPr algn="ctr"/>
+                      <a:endParaRPr lang="fr-FR" dirty="0"/>
+                    </a:p>
+                  </a:txBody>
+                  <a:tcPr/>
+                </a:tc>
+                <a:tc>
+                  <a:txBody>
+                    <a:bodyPr/>
+                    <a:lstStyle/>
+                    <a:p>
+                      <a:pPr algn="ctr"/>
+                      <a:endParaRPr lang="fr-FR"/>
+                    </a:p>
+                  </a:txBody>
+                  <a:tcPr/>
+                </a:tc>
+                <a:extLst>
+                  <a:ext uri="{0D108BD9-81ED-4DB2-BD59-A6C34878D82A}">
+                    <a16:rowId xmlns:a16="http://schemas.microsoft.com/office/drawing/2014/main" val="960133350"/>
+                  </a:ext>
+                </a:extLst>
+              </a:tr>
+              <a:tr h="550707">
+                <a:tc>
+                  <a:txBody>
+                    <a:bodyPr/>
+                    <a:lstStyle/>
+                    <a:p>
+                      <a:pPr algn="ctr"/>
+                      <a:r>
+                        <a:rPr lang="fr-FR" dirty="0" smtClean="0"/>
+                        <a:t>Front-end</a:t>
+                      </a:r>
+                      <a:r>
+                        <a:rPr lang="fr-FR" baseline="0" dirty="0" smtClean="0"/>
+                        <a:t> HTML</a:t>
+                      </a:r>
+                      <a:endParaRPr lang="fr-FR" dirty="0" smtClean="0"/>
+                    </a:p>
+                  </a:txBody>
+                  <a:tcPr/>
+                </a:tc>
+                <a:tc>
+                  <a:txBody>
+                    <a:bodyPr/>
+                    <a:lstStyle/>
+                    <a:p>
+                      <a:pPr algn="ctr"/>
+                      <a:endParaRPr lang="fr-FR" dirty="0"/>
+                    </a:p>
+                  </a:txBody>
+                  <a:tcPr>
+                    <a:solidFill>
+                      <a:schemeClr val="accent6">
+                        <a:lumMod val="75000"/>
+                      </a:schemeClr>
+                    </a:solidFill>
+                  </a:tcPr>
+                </a:tc>
+                <a:tc>
+                  <a:txBody>
+                    <a:bodyPr/>
+                    <a:lstStyle/>
+                    <a:p>
+                      <a:pPr algn="ctr"/>
+                      <a:endParaRPr lang="fr-FR" dirty="0"/>
+                    </a:p>
+                  </a:txBody>
+                  <a:tcPr>
+                    <a:solidFill>
+                      <a:schemeClr val="accent6">
+                        <a:lumMod val="75000"/>
+                      </a:schemeClr>
+                    </a:solidFill>
+                  </a:tcPr>
+                </a:tc>
+                <a:tc>
+                  <a:txBody>
+                    <a:bodyPr/>
+                    <a:lstStyle/>
+                    <a:p>
+                      <a:pPr algn="ctr"/>
+                      <a:endParaRPr lang="fr-FR" dirty="0"/>
+                    </a:p>
+                  </a:txBody>
+                  <a:tcPr>
+                    <a:solidFill>
+                      <a:schemeClr val="accent6">
+                        <a:lumMod val="75000"/>
+                      </a:schemeClr>
+                    </a:solidFill>
+                  </a:tcPr>
+                </a:tc>
+                <a:extLst>
+                  <a:ext uri="{0D108BD9-81ED-4DB2-BD59-A6C34878D82A}">
+                    <a16:rowId xmlns:a16="http://schemas.microsoft.com/office/drawing/2014/main" val="2268178512"/>
+                  </a:ext>
+                </a:extLst>
+              </a:tr>
+              <a:tr h="948436">
+                <a:tc>
+                  <a:txBody>
+                    <a:bodyPr/>
+                    <a:lstStyle/>
+                    <a:p>
+                      <a:pPr algn="ctr"/>
+                      <a:r>
+                        <a:rPr lang="fr-FR" dirty="0" smtClean="0"/>
+                        <a:t>Codage</a:t>
+                      </a:r>
+                      <a:r>
+                        <a:rPr lang="fr-FR" baseline="0" dirty="0" smtClean="0"/>
+                        <a:t> fonctionnalité UML en JS</a:t>
+                      </a:r>
+                      <a:endParaRPr lang="fr-FR" dirty="0"/>
+                    </a:p>
+                  </a:txBody>
+                  <a:tcPr/>
+                </a:tc>
+                <a:tc>
+                  <a:txBody>
+                    <a:bodyPr/>
+                    <a:lstStyle/>
+                    <a:p>
+                      <a:pPr algn="ctr"/>
+                      <a:endParaRPr lang="fr-FR" dirty="0"/>
+                    </a:p>
+                  </a:txBody>
+                  <a:tcPr/>
+                </a:tc>
+                <a:tc>
+                  <a:txBody>
+                    <a:bodyPr/>
+                    <a:lstStyle/>
+                    <a:p>
+                      <a:pPr algn="ctr"/>
+                      <a:endParaRPr lang="fr-FR" dirty="0"/>
+                    </a:p>
+                  </a:txBody>
+                  <a:tcPr>
+                    <a:solidFill>
+                      <a:schemeClr val="accent6">
+                        <a:lumMod val="75000"/>
+                      </a:schemeClr>
+                    </a:solidFill>
+                  </a:tcPr>
+                </a:tc>
+                <a:tc>
+                  <a:txBody>
+                    <a:bodyPr/>
+                    <a:lstStyle/>
+                    <a:p>
+                      <a:pPr algn="ctr"/>
+                      <a:endParaRPr lang="fr-FR" dirty="0"/>
+                    </a:p>
+                  </a:txBody>
+                  <a:tcPr>
+                    <a:solidFill>
+                      <a:schemeClr val="accent6">
+                        <a:lumMod val="75000"/>
+                      </a:schemeClr>
+                    </a:solidFill>
+                  </a:tcPr>
+                </a:tc>
+                <a:extLst>
+                  <a:ext uri="{0D108BD9-81ED-4DB2-BD59-A6C34878D82A}">
+                    <a16:rowId xmlns:a16="http://schemas.microsoft.com/office/drawing/2014/main" val="2663648811"/>
+                  </a:ext>
+                </a:extLst>
+              </a:tr>
+              <a:tr h="684421">
+                <a:tc>
+                  <a:txBody>
+                    <a:bodyPr/>
+                    <a:lstStyle/>
+                    <a:p>
+                      <a:pPr algn="ctr"/>
+                      <a:r>
+                        <a:rPr lang="fr-FR" baseline="0" dirty="0" smtClean="0"/>
+                        <a:t>Exploitation de l’API fournie</a:t>
+                      </a:r>
+                      <a:endParaRPr lang="fr-FR" dirty="0" smtClean="0"/>
+                    </a:p>
+                  </a:txBody>
+                  <a:tcPr/>
+                </a:tc>
+                <a:tc>
+                  <a:txBody>
+                    <a:bodyPr/>
+                    <a:lstStyle/>
+                    <a:p>
+                      <a:pPr algn="ctr"/>
+                      <a:endParaRPr lang="fr-FR" dirty="0"/>
+                    </a:p>
+                  </a:txBody>
+                  <a:tcPr/>
+                </a:tc>
+                <a:tc>
+                  <a:txBody>
+                    <a:bodyPr/>
+                    <a:lstStyle/>
+                    <a:p>
+                      <a:pPr algn="ctr"/>
+                      <a:endParaRPr lang="fr-FR" dirty="0"/>
+                    </a:p>
+                  </a:txBody>
+                  <a:tcPr>
+                    <a:solidFill>
+                      <a:schemeClr val="accent6">
+                        <a:lumMod val="75000"/>
+                      </a:schemeClr>
+                    </a:solidFill>
+                  </a:tcPr>
+                </a:tc>
+                <a:tc>
+                  <a:txBody>
+                    <a:bodyPr/>
+                    <a:lstStyle/>
+                    <a:p>
+                      <a:pPr algn="ctr"/>
+                      <a:endParaRPr lang="fr-FR" dirty="0"/>
+                    </a:p>
+                  </a:txBody>
+                  <a:tcPr>
+                    <a:solidFill>
+                      <a:schemeClr val="accent6">
+                        <a:lumMod val="75000"/>
+                      </a:schemeClr>
+                    </a:solidFill>
+                  </a:tcPr>
+                </a:tc>
+                <a:extLst>
+                  <a:ext uri="{0D108BD9-81ED-4DB2-BD59-A6C34878D82A}">
+                    <a16:rowId xmlns:a16="http://schemas.microsoft.com/office/drawing/2014/main" val="3405210912"/>
+                  </a:ext>
+                </a:extLst>
+              </a:tr>
+            </a:tbl>
+          </a:graphicData>
+        </a:graphic>
+      </p:graphicFrame>
+    </p:spTree>
+    <p:extLst>
+      <p:ext uri="{BB962C8B-B14F-4D97-AF65-F5344CB8AC3E}">
+        <p14:creationId xmlns:p14="http://schemas.microsoft.com/office/powerpoint/2010/main" val="2296595050"/>
+      </p:ext>
+    </p:extLst>
+  </p:cSld>
+  <p:clrMapOvr>
+    <a:masterClrMapping/>
+  </p:clrMapOvr>
+</p:sld>
+</file>
+
+<file path=ppt/slides/slide4.xml><?xml version="1.0" encoding="utf-8"?>
+<p:sld xmlns:a="http://schemas.openxmlformats.org/drawingml/2006/main" xmlns:r="http://schemas.openxmlformats.org/officeDocument/2006/relationships" xmlns:p="http://schemas.openxmlformats.org/presentationml/2006/main">
+  <p:cSld>
+    <p:spTree>
+      <p:nvGrpSpPr>
+        <p:cNvPr id="1" name=""/>
+        <p:cNvGrpSpPr/>
+        <p:nvPr/>
+      </p:nvGrpSpPr>
+      <p:grpSpPr>
+        <a:xfrm>
+          <a:off x="0" y="0"/>
+          <a:ext cx="0" cy="0"/>
+          <a:chOff x="0" y="0"/>
+          <a:chExt cx="0" cy="0"/>
+        </a:xfrm>
+      </p:grpSpPr>
+      <p:sp>
+        <p:nvSpPr>
+          <p:cNvPr id="4" name="ZoneTexte 3"/>
+          <p:cNvSpPr txBox="1"/>
+          <p:nvPr/>
+        </p:nvSpPr>
+        <p:spPr>
+          <a:xfrm>
+            <a:off x="479085" y="98860"/>
+            <a:ext cx="7365076" cy="461665"/>
+          </a:xfrm>
+          <a:prstGeom prst="rect">
+            <a:avLst/>
+          </a:prstGeom>
+          <a:noFill/>
+        </p:spPr>
+        <p:txBody>
+          <a:bodyPr wrap="square" rtlCol="0">
+            <a:spAutoFit/>
+          </a:bodyPr>
+          <a:lstStyle/>
+          <a:p>
+            <a:pPr algn="ctr"/>
+            <a:r>
+              <a:rPr lang="fr-FR" sz="2400" dirty="0" smtClean="0">
+                <a:latin typeface="Arial Black" panose="020B0A04020102020204" pitchFamily="34" charset="0"/>
+              </a:rPr>
+              <a:t>Partie </a:t>
+            </a:r>
+            <a:r>
+              <a:rPr lang="fr-FR" sz="2400" dirty="0">
+                <a:latin typeface="Arial Black" panose="020B0A04020102020204" pitchFamily="34" charset="0"/>
+              </a:rPr>
+              <a:t>3</a:t>
+            </a:r>
+            <a:r>
+              <a:rPr lang="fr-FR" sz="2400" dirty="0" smtClean="0">
+                <a:latin typeface="Arial Black" panose="020B0A04020102020204" pitchFamily="34" charset="0"/>
+              </a:rPr>
+              <a:t>: Back-end </a:t>
+            </a:r>
+            <a:endParaRPr lang="fr-FR" sz="2400" dirty="0">
+              <a:latin typeface="Arial Black" panose="020B0A04020102020204" pitchFamily="34" charset="0"/>
+            </a:endParaRPr>
+          </a:p>
+        </p:txBody>
+      </p:sp>
+      <p:sp>
+        <p:nvSpPr>
+          <p:cNvPr id="5" name="ZoneTexte 4"/>
+          <p:cNvSpPr txBox="1"/>
+          <p:nvPr/>
+        </p:nvSpPr>
+        <p:spPr>
+          <a:xfrm>
+            <a:off x="8495607" y="191193"/>
+            <a:ext cx="3466408" cy="369332"/>
+          </a:xfrm>
+          <a:prstGeom prst="rect">
+            <a:avLst/>
+          </a:prstGeom>
+          <a:noFill/>
+        </p:spPr>
+        <p:txBody>
+          <a:bodyPr wrap="square" rtlCol="0">
+            <a:spAutoFit/>
+          </a:bodyPr>
+          <a:lstStyle/>
+          <a:p>
+            <a:r>
+              <a:rPr lang="fr-FR" dirty="0" smtClean="0">
+                <a:latin typeface="Arial Black" panose="020B0A04020102020204" pitchFamily="34" charset="0"/>
+              </a:rPr>
+              <a:t>19</a:t>
+            </a:r>
+            <a:r>
+              <a:rPr lang="fr-FR" dirty="0" smtClean="0">
+                <a:latin typeface="Arial Black" panose="020B0A04020102020204" pitchFamily="34" charset="0"/>
+              </a:rPr>
+              <a:t>/12/2024 </a:t>
+            </a:r>
+            <a:r>
+              <a:rPr lang="fr-FR" dirty="0" smtClean="0">
+                <a:latin typeface="Arial Black" panose="020B0A04020102020204" pitchFamily="34" charset="0"/>
+              </a:rPr>
+              <a:t>– </a:t>
+            </a:r>
+            <a:r>
+              <a:rPr lang="fr-FR" dirty="0" smtClean="0">
+                <a:latin typeface="Arial Black" panose="020B0A04020102020204" pitchFamily="34" charset="0"/>
+              </a:rPr>
+              <a:t>20</a:t>
+            </a:r>
+            <a:r>
+              <a:rPr lang="fr-FR" dirty="0" smtClean="0">
+                <a:latin typeface="Arial Black" panose="020B0A04020102020204" pitchFamily="34" charset="0"/>
+              </a:rPr>
+              <a:t>/12/2024</a:t>
+            </a:r>
+            <a:endParaRPr lang="fr-FR" dirty="0">
+              <a:latin typeface="Arial Black" panose="020B0A04020102020204" pitchFamily="34" charset="0"/>
+            </a:endParaRPr>
+          </a:p>
+        </p:txBody>
+      </p:sp>
+      <p:graphicFrame>
+        <p:nvGraphicFramePr>
+          <p:cNvPr id="6" name="Tableau 5"/>
+          <p:cNvGraphicFramePr>
+            <a:graphicFrameLocks noGrp="1"/>
+          </p:cNvGraphicFramePr>
+          <p:nvPr>
+            <p:extLst>
+              <p:ext uri="{D42A27DB-BD31-4B8C-83A1-F6EECF244321}">
+                <p14:modId xmlns:p14="http://schemas.microsoft.com/office/powerpoint/2010/main" val="3482983543"/>
+              </p:ext>
+            </p:extLst>
+          </p:nvPr>
+        </p:nvGraphicFramePr>
+        <p:xfrm>
+          <a:off x="1815867" y="786169"/>
+          <a:ext cx="8791172" cy="5403843"/>
+        </p:xfrm>
+        <a:graphic>
+          <a:graphicData uri="http://schemas.openxmlformats.org/drawingml/2006/table">
+            <a:tbl>
+              <a:tblPr firstRow="1" bandRow="1">
+                <a:tableStyleId>{00A15C55-8517-42AA-B614-E9B94910E393}</a:tableStyleId>
+              </a:tblPr>
+              <a:tblGrid>
+                <a:gridCol w="2197793">
+                  <a:extLst>
+                    <a:ext uri="{9D8B030D-6E8A-4147-A177-3AD203B41FA5}">
+                      <a16:colId xmlns:a16="http://schemas.microsoft.com/office/drawing/2014/main" val="1279948072"/>
+                    </a:ext>
+                  </a:extLst>
+                </a:gridCol>
+                <a:gridCol w="2197793">
+                  <a:extLst>
+                    <a:ext uri="{9D8B030D-6E8A-4147-A177-3AD203B41FA5}">
+                      <a16:colId xmlns:a16="http://schemas.microsoft.com/office/drawing/2014/main" val="1593545219"/>
+                    </a:ext>
+                  </a:extLst>
+                </a:gridCol>
+                <a:gridCol w="2197793">
+                  <a:extLst>
+                    <a:ext uri="{9D8B030D-6E8A-4147-A177-3AD203B41FA5}">
+                      <a16:colId xmlns:a16="http://schemas.microsoft.com/office/drawing/2014/main" val="1373504811"/>
+                    </a:ext>
+                  </a:extLst>
+                </a:gridCol>
+                <a:gridCol w="2197793">
+                  <a:extLst>
+                    <a:ext uri="{9D8B030D-6E8A-4147-A177-3AD203B41FA5}">
+                      <a16:colId xmlns:a16="http://schemas.microsoft.com/office/drawing/2014/main" val="1641182163"/>
+                    </a:ext>
+                  </a:extLst>
+                </a:gridCol>
+              </a:tblGrid>
+              <a:tr h="436141">
+                <a:tc>
+                  <a:txBody>
+                    <a:bodyPr/>
+                    <a:lstStyle/>
+                    <a:p>
+                      <a:pPr algn="ctr"/>
+                      <a:r>
+                        <a:rPr lang="fr-FR" dirty="0" smtClean="0"/>
+                        <a:t>Taches</a:t>
+                      </a:r>
+                      <a:endParaRPr lang="fr-FR" dirty="0"/>
+                    </a:p>
+                  </a:txBody>
+                  <a:tcPr/>
+                </a:tc>
+                <a:tc>
+                  <a:txBody>
+                    <a:bodyPr/>
+                    <a:lstStyle/>
+                    <a:p>
+                      <a:pPr algn="ctr"/>
+                      <a:r>
+                        <a:rPr lang="fr-FR" dirty="0" smtClean="0"/>
+                        <a:t>Gabriel</a:t>
+                      </a:r>
+                      <a:endParaRPr lang="fr-FR" dirty="0"/>
+                    </a:p>
+                  </a:txBody>
+                  <a:tcPr/>
+                </a:tc>
+                <a:tc>
+                  <a:txBody>
+                    <a:bodyPr/>
+                    <a:lstStyle/>
+                    <a:p>
+                      <a:pPr algn="ctr"/>
+                      <a:r>
+                        <a:rPr lang="fr-FR" dirty="0" smtClean="0"/>
+                        <a:t>Michael</a:t>
+                      </a:r>
+                      <a:endParaRPr lang="fr-FR" dirty="0"/>
+                    </a:p>
+                  </a:txBody>
+                  <a:tcPr/>
+                </a:tc>
+                <a:tc>
+                  <a:txBody>
+                    <a:bodyPr/>
+                    <a:lstStyle/>
+                    <a:p>
+                      <a:pPr algn="ctr"/>
+                      <a:r>
+                        <a:rPr lang="fr-FR" dirty="0" smtClean="0"/>
+                        <a:t>Claude</a:t>
+                      </a:r>
+                      <a:endParaRPr lang="fr-FR" dirty="0"/>
+                    </a:p>
+                  </a:txBody>
+                  <a:tcPr/>
+                </a:tc>
+                <a:extLst>
+                  <a:ext uri="{0D108BD9-81ED-4DB2-BD59-A6C34878D82A}">
+                    <a16:rowId xmlns:a16="http://schemas.microsoft.com/office/drawing/2014/main" val="2647326308"/>
+                  </a:ext>
+                </a:extLst>
+              </a:tr>
+              <a:tr h="1147666">
+                <a:tc>
+                  <a:txBody>
+                    <a:bodyPr/>
+                    <a:lstStyle/>
+                    <a:p>
+                      <a:pPr algn="ctr"/>
+                      <a:endParaRPr lang="fr-FR" dirty="0" smtClean="0"/>
+                    </a:p>
+                    <a:p>
+                      <a:pPr algn="ctr"/>
+                      <a:r>
+                        <a:rPr lang="fr-FR" dirty="0" err="1" smtClean="0"/>
+                        <a:t>Creation</a:t>
+                      </a:r>
+                      <a:r>
+                        <a:rPr lang="fr-FR" dirty="0" smtClean="0"/>
+                        <a:t> du</a:t>
+                      </a:r>
+                      <a:r>
+                        <a:rPr lang="fr-FR" baseline="0" dirty="0" smtClean="0"/>
+                        <a:t> site en PHP</a:t>
+                      </a:r>
+                      <a:endParaRPr lang="fr-FR" dirty="0"/>
+                    </a:p>
+                  </a:txBody>
+                  <a:tcPr/>
+                </a:tc>
+                <a:tc>
+                  <a:txBody>
+                    <a:bodyPr/>
+                    <a:lstStyle/>
+                    <a:p>
+                      <a:pPr algn="ctr"/>
+                      <a:endParaRPr lang="fr-FR" dirty="0" smtClean="0"/>
+                    </a:p>
+                    <a:p>
+                      <a:pPr algn="ctr"/>
+                      <a:endParaRPr lang="fr-FR" dirty="0"/>
+                    </a:p>
+                  </a:txBody>
+                  <a:tcPr>
+                    <a:solidFill>
+                      <a:schemeClr val="accent4">
+                        <a:lumMod val="75000"/>
+                      </a:schemeClr>
+                    </a:solidFill>
+                  </a:tcPr>
+                </a:tc>
+                <a:tc>
+                  <a:txBody>
+                    <a:bodyPr/>
+                    <a:lstStyle/>
+                    <a:p>
+                      <a:pPr algn="ctr"/>
+                      <a:endParaRPr lang="fr-FR" dirty="0"/>
+                    </a:p>
+                  </a:txBody>
+                  <a:tcPr>
+                    <a:solidFill>
+                      <a:schemeClr val="accent4">
+                        <a:lumMod val="75000"/>
+                      </a:schemeClr>
+                    </a:solidFill>
+                  </a:tcPr>
+                </a:tc>
+                <a:tc>
+                  <a:txBody>
+                    <a:bodyPr/>
+                    <a:lstStyle/>
+                    <a:p>
+                      <a:pPr algn="ctr"/>
+                      <a:endParaRPr lang="fr-FR" dirty="0"/>
+                    </a:p>
+                  </a:txBody>
+                  <a:tcPr/>
+                </a:tc>
+                <a:extLst>
+                  <a:ext uri="{0D108BD9-81ED-4DB2-BD59-A6C34878D82A}">
+                    <a16:rowId xmlns:a16="http://schemas.microsoft.com/office/drawing/2014/main" val="853558620"/>
+                  </a:ext>
+                </a:extLst>
+              </a:tr>
+              <a:tr h="955009">
+                <a:tc>
+                  <a:txBody>
+                    <a:bodyPr/>
+                    <a:lstStyle/>
+                    <a:p>
+                      <a:pPr algn="ctr"/>
+                      <a:endParaRPr lang="fr-FR" dirty="0" smtClean="0"/>
+                    </a:p>
+                    <a:p>
+                      <a:pPr algn="ctr"/>
+                      <a:r>
+                        <a:rPr lang="fr-FR" dirty="0" smtClean="0"/>
+                        <a:t>Suivi de projet</a:t>
+                      </a:r>
+                    </a:p>
+                  </a:txBody>
+                  <a:tcPr/>
+                </a:tc>
+                <a:tc>
+                  <a:txBody>
+                    <a:bodyPr/>
+                    <a:lstStyle/>
+                    <a:p>
+                      <a:pPr algn="ctr"/>
+                      <a:endParaRPr lang="fr-FR" dirty="0"/>
+                    </a:p>
+                  </a:txBody>
+                  <a:tcPr>
+                    <a:solidFill>
+                      <a:schemeClr val="accent4">
+                        <a:lumMod val="75000"/>
+                      </a:schemeClr>
+                    </a:solidFill>
+                  </a:tcPr>
+                </a:tc>
+                <a:tc>
+                  <a:txBody>
+                    <a:bodyPr/>
+                    <a:lstStyle/>
+                    <a:p>
+                      <a:pPr algn="ctr"/>
+                      <a:endParaRPr lang="fr-FR" dirty="0"/>
+                    </a:p>
+                  </a:txBody>
+                  <a:tcPr/>
+                </a:tc>
+                <a:tc>
+                  <a:txBody>
+                    <a:bodyPr/>
+                    <a:lstStyle/>
+                    <a:p>
+                      <a:pPr algn="ctr"/>
+                      <a:endParaRPr lang="fr-FR"/>
+                    </a:p>
+                  </a:txBody>
+                  <a:tcPr/>
+                </a:tc>
+                <a:extLst>
+                  <a:ext uri="{0D108BD9-81ED-4DB2-BD59-A6C34878D82A}">
+                    <a16:rowId xmlns:a16="http://schemas.microsoft.com/office/drawing/2014/main" val="960133350"/>
+                  </a:ext>
+                </a:extLst>
+              </a:tr>
+              <a:tr h="955009">
+                <a:tc>
+                  <a:txBody>
+                    <a:bodyPr/>
+                    <a:lstStyle/>
+                    <a:p>
+                      <a:pPr algn="ctr"/>
+                      <a:endParaRPr lang="fr-FR" dirty="0" smtClean="0"/>
+                    </a:p>
+                    <a:p>
+                      <a:pPr algn="ctr"/>
+                      <a:r>
+                        <a:rPr lang="fr-FR" dirty="0" smtClean="0"/>
+                        <a:t>Création</a:t>
+                      </a:r>
+                      <a:r>
+                        <a:rPr lang="fr-FR" baseline="0" dirty="0" smtClean="0"/>
+                        <a:t> de la BDD</a:t>
+                      </a:r>
+                      <a:endParaRPr lang="fr-FR" dirty="0" smtClean="0"/>
+                    </a:p>
+                  </a:txBody>
+                  <a:tcPr/>
+                </a:tc>
+                <a:tc>
+                  <a:txBody>
+                    <a:bodyPr/>
+                    <a:lstStyle/>
+                    <a:p>
+                      <a:pPr algn="ctr"/>
+                      <a:endParaRPr lang="fr-FR" dirty="0"/>
+                    </a:p>
+                  </a:txBody>
+                  <a:tcPr/>
+                </a:tc>
+                <a:tc>
+                  <a:txBody>
+                    <a:bodyPr/>
+                    <a:lstStyle/>
+                    <a:p>
+                      <a:pPr algn="ctr"/>
+                      <a:endParaRPr lang="fr-FR" dirty="0"/>
+                    </a:p>
+                  </a:txBody>
+                  <a:tcPr/>
+                </a:tc>
+                <a:tc>
+                  <a:txBody>
+                    <a:bodyPr/>
+                    <a:lstStyle/>
+                    <a:p>
+                      <a:pPr algn="ctr"/>
+                      <a:endParaRPr lang="fr-FR" dirty="0"/>
+                    </a:p>
+                  </a:txBody>
+                  <a:tcPr>
+                    <a:solidFill>
+                      <a:schemeClr val="accent4">
+                        <a:lumMod val="75000"/>
+                      </a:schemeClr>
+                    </a:solidFill>
+                  </a:tcPr>
+                </a:tc>
+                <a:extLst>
+                  <a:ext uri="{0D108BD9-81ED-4DB2-BD59-A6C34878D82A}">
+                    <a16:rowId xmlns:a16="http://schemas.microsoft.com/office/drawing/2014/main" val="2268178512"/>
+                  </a:ext>
+                </a:extLst>
+              </a:tr>
+              <a:tr h="955009">
+                <a:tc>
+                  <a:txBody>
+                    <a:bodyPr/>
+                    <a:lstStyle/>
+                    <a:p>
+                      <a:pPr algn="ctr"/>
+                      <a:endParaRPr lang="fr-FR" dirty="0"/>
+                    </a:p>
+                    <a:p>
+                      <a:pPr algn="ctr"/>
+                      <a:r>
+                        <a:rPr lang="fr-FR" dirty="0" smtClean="0"/>
+                        <a:t>Création</a:t>
+                      </a:r>
+                      <a:r>
+                        <a:rPr lang="fr-FR" baseline="0" dirty="0" smtClean="0"/>
+                        <a:t> de l’API en PHP</a:t>
+                      </a:r>
+                      <a:endParaRPr lang="fr-FR" dirty="0" smtClean="0"/>
+                    </a:p>
+                  </a:txBody>
+                  <a:tcPr/>
+                </a:tc>
+                <a:tc>
+                  <a:txBody>
+                    <a:bodyPr/>
+                    <a:lstStyle/>
+                    <a:p>
+                      <a:pPr algn="ctr"/>
+                      <a:endParaRPr lang="fr-FR" dirty="0"/>
+                    </a:p>
+                  </a:txBody>
+                  <a:tcPr>
+                    <a:solidFill>
+                      <a:schemeClr val="accent4">
+                        <a:lumMod val="75000"/>
+                      </a:schemeClr>
+                    </a:solidFill>
+                  </a:tcPr>
+                </a:tc>
+                <a:tc>
+                  <a:txBody>
+                    <a:bodyPr/>
+                    <a:lstStyle/>
+                    <a:p>
+                      <a:pPr algn="ctr"/>
+                      <a:endParaRPr lang="fr-FR" dirty="0"/>
+                    </a:p>
+                  </a:txBody>
+                  <a:tcPr>
+                    <a:solidFill>
+                      <a:schemeClr val="accent4">
+                        <a:lumMod val="75000"/>
+                      </a:schemeClr>
+                    </a:solidFill>
+                  </a:tcPr>
+                </a:tc>
+                <a:tc>
+                  <a:txBody>
+                    <a:bodyPr/>
+                    <a:lstStyle/>
+                    <a:p>
+                      <a:pPr algn="ctr"/>
+                      <a:endParaRPr lang="fr-FR" dirty="0"/>
+                    </a:p>
+                  </a:txBody>
+                  <a:tcPr/>
+                </a:tc>
+                <a:extLst>
+                  <a:ext uri="{0D108BD9-81ED-4DB2-BD59-A6C34878D82A}">
+                    <a16:rowId xmlns:a16="http://schemas.microsoft.com/office/drawing/2014/main" val="2663648811"/>
+                  </a:ext>
+                </a:extLst>
+              </a:tr>
+              <a:tr h="955009">
+                <a:tc>
+                  <a:txBody>
+                    <a:bodyPr/>
+                    <a:lstStyle/>
+                    <a:p>
+                      <a:pPr algn="ctr"/>
+                      <a:endParaRPr lang="fr-FR" dirty="0" smtClean="0"/>
+                    </a:p>
+                  </a:txBody>
+                  <a:tcPr/>
+                </a:tc>
+                <a:tc>
+                  <a:txBody>
+                    <a:bodyPr/>
+                    <a:lstStyle/>
+                    <a:p>
+                      <a:pPr algn="ctr"/>
+                      <a:endParaRPr lang="fr-FR" dirty="0"/>
+                    </a:p>
+                  </a:txBody>
+                  <a:tcPr/>
+                </a:tc>
+                <a:tc>
+                  <a:txBody>
+                    <a:bodyPr/>
+                    <a:lstStyle/>
+                    <a:p>
+                      <a:pPr algn="ctr"/>
+                      <a:endParaRPr lang="fr-FR" dirty="0"/>
+                    </a:p>
+                  </a:txBody>
+                  <a:tcPr/>
+                </a:tc>
+                <a:tc>
+                  <a:txBody>
+                    <a:bodyPr/>
+                    <a:lstStyle/>
+                    <a:p>
+                      <a:pPr algn="ctr"/>
+                      <a:endParaRPr lang="fr-FR" dirty="0"/>
+                    </a:p>
+                  </a:txBody>
+                  <a:tcPr/>
+                </a:tc>
+                <a:extLst>
+                  <a:ext uri="{0D108BD9-81ED-4DB2-BD59-A6C34878D82A}">
+                    <a16:rowId xmlns:a16="http://schemas.microsoft.com/office/drawing/2014/main" val="3405210912"/>
+                  </a:ext>
+                </a:extLst>
+              </a:tr>
+            </a:tbl>
+          </a:graphicData>
+        </a:graphic>
+      </p:graphicFrame>
+    </p:spTree>
+    <p:extLst>
+      <p:ext uri="{BB962C8B-B14F-4D97-AF65-F5344CB8AC3E}">
+        <p14:creationId xmlns:p14="http://schemas.microsoft.com/office/powerpoint/2010/main" val="4185223905"/>
+      </p:ext>
+    </p:extLst>
+  </p:cSld>
+  <p:clrMapOvr>
+    <a:masterClrMapping/>
+  </p:clrMapOvr>
+</p:sld>
+</file>
+
+<file path=ppt/slides/slide5.xml><?xml version="1.0" encoding="utf-8"?>
+<p:sld xmlns:a="http://schemas.openxmlformats.org/drawingml/2006/main" xmlns:r="http://schemas.openxmlformats.org/officeDocument/2006/relationships" xmlns:p="http://schemas.openxmlformats.org/presentationml/2006/main">
+  <p:cSld>
+    <p:spTree>
+      <p:nvGrpSpPr>
+        <p:cNvPr id="1" name=""/>
+        <p:cNvGrpSpPr/>
+        <p:nvPr/>
+      </p:nvGrpSpPr>
+      <p:grpSpPr>
+        <a:xfrm>
+          <a:off x="0" y="0"/>
+          <a:ext cx="0" cy="0"/>
+          <a:chOff x="0" y="0"/>
+          <a:chExt cx="0" cy="0"/>
+        </a:xfrm>
+      </p:grpSpPr>
+      <p:sp>
+        <p:nvSpPr>
+          <p:cNvPr id="4" name="ZoneTexte 3"/>
+          <p:cNvSpPr txBox="1"/>
+          <p:nvPr/>
+        </p:nvSpPr>
+        <p:spPr>
+          <a:xfrm>
+            <a:off x="479085" y="98860"/>
+            <a:ext cx="7365076" cy="461665"/>
+          </a:xfrm>
+          <a:prstGeom prst="rect">
+            <a:avLst/>
+          </a:prstGeom>
+          <a:noFill/>
+        </p:spPr>
+        <p:txBody>
+          <a:bodyPr wrap="square" rtlCol="0">
+            <a:spAutoFit/>
+          </a:bodyPr>
+          <a:lstStyle/>
+          <a:p>
+            <a:pPr algn="ctr"/>
+            <a:r>
+              <a:rPr lang="fr-FR" sz="2400" dirty="0" smtClean="0">
+                <a:latin typeface="Arial Black" panose="020B0A04020102020204" pitchFamily="34" charset="0"/>
+              </a:rPr>
+              <a:t>Partie </a:t>
+            </a:r>
+            <a:r>
+              <a:rPr lang="fr-FR" sz="2400" dirty="0" smtClean="0">
+                <a:latin typeface="Arial Black" panose="020B0A04020102020204" pitchFamily="34" charset="0"/>
+              </a:rPr>
+              <a:t>4: Déploiement </a:t>
+            </a:r>
+            <a:endParaRPr lang="fr-FR" sz="2400" dirty="0">
+              <a:latin typeface="Arial Black" panose="020B0A04020102020204" pitchFamily="34" charset="0"/>
+            </a:endParaRPr>
+          </a:p>
+        </p:txBody>
+      </p:sp>
+      <p:sp>
+        <p:nvSpPr>
+          <p:cNvPr id="5" name="ZoneTexte 4"/>
+          <p:cNvSpPr txBox="1"/>
+          <p:nvPr/>
+        </p:nvSpPr>
+        <p:spPr>
+          <a:xfrm>
+            <a:off x="8495607" y="191193"/>
+            <a:ext cx="3466408" cy="369332"/>
+          </a:xfrm>
+          <a:prstGeom prst="rect">
+            <a:avLst/>
+          </a:prstGeom>
+          <a:noFill/>
+        </p:spPr>
+        <p:txBody>
+          <a:bodyPr wrap="square" rtlCol="0">
+            <a:spAutoFit/>
+          </a:bodyPr>
+          <a:lstStyle/>
+          <a:p>
+            <a:r>
+              <a:rPr lang="fr-FR" dirty="0" smtClean="0">
+                <a:latin typeface="Arial Black" panose="020B0A04020102020204" pitchFamily="34" charset="0"/>
+              </a:rPr>
+              <a:t>..</a:t>
+            </a:r>
+            <a:r>
+              <a:rPr lang="fr-FR" dirty="0" smtClean="0">
+                <a:latin typeface="Arial Black" panose="020B0A04020102020204" pitchFamily="34" charset="0"/>
+              </a:rPr>
+              <a:t>/../2025 </a:t>
+            </a:r>
+            <a:r>
+              <a:rPr lang="fr-FR" dirty="0" smtClean="0">
+                <a:latin typeface="Arial Black" panose="020B0A04020102020204" pitchFamily="34" charset="0"/>
+              </a:rPr>
+              <a:t>– </a:t>
+            </a:r>
+            <a:r>
+              <a:rPr lang="fr-FR" dirty="0" smtClean="0">
+                <a:latin typeface="Arial Black" panose="020B0A04020102020204" pitchFamily="34" charset="0"/>
+              </a:rPr>
+              <a:t>../../2025</a:t>
+            </a:r>
+            <a:endParaRPr lang="fr-FR" dirty="0">
+              <a:latin typeface="Arial Black" panose="020B0A04020102020204" pitchFamily="34" charset="0"/>
+            </a:endParaRPr>
+          </a:p>
+        </p:txBody>
+      </p:sp>
+      <p:graphicFrame>
+        <p:nvGraphicFramePr>
+          <p:cNvPr id="6" name="Tableau 5"/>
+          <p:cNvGraphicFramePr>
+            <a:graphicFrameLocks noGrp="1"/>
+          </p:cNvGraphicFramePr>
+          <p:nvPr>
+            <p:extLst>
+              <p:ext uri="{D42A27DB-BD31-4B8C-83A1-F6EECF244321}">
+                <p14:modId xmlns:p14="http://schemas.microsoft.com/office/powerpoint/2010/main" val="1788215075"/>
+              </p:ext>
+            </p:extLst>
+          </p:nvPr>
+        </p:nvGraphicFramePr>
+        <p:xfrm>
+          <a:off x="1815867" y="786169"/>
+          <a:ext cx="8791172" cy="5403843"/>
+        </p:xfrm>
+        <a:graphic>
+          <a:graphicData uri="http://schemas.openxmlformats.org/drawingml/2006/table">
+            <a:tbl>
+              <a:tblPr firstRow="1" bandRow="1">
+                <a:tableStyleId>{9DCAF9ED-07DC-4A11-8D7F-57B35C25682E}</a:tableStyleId>
+              </a:tblPr>
+              <a:tblGrid>
+                <a:gridCol w="2197793">
+                  <a:extLst>
+                    <a:ext uri="{9D8B030D-6E8A-4147-A177-3AD203B41FA5}">
+                      <a16:colId xmlns:a16="http://schemas.microsoft.com/office/drawing/2014/main" val="1279948072"/>
+                    </a:ext>
+                  </a:extLst>
+                </a:gridCol>
+                <a:gridCol w="2197793">
+                  <a:extLst>
+                    <a:ext uri="{9D8B030D-6E8A-4147-A177-3AD203B41FA5}">
+                      <a16:colId xmlns:a16="http://schemas.microsoft.com/office/drawing/2014/main" val="1593545219"/>
+                    </a:ext>
+                  </a:extLst>
+                </a:gridCol>
+                <a:gridCol w="2197793">
+                  <a:extLst>
+                    <a:ext uri="{9D8B030D-6E8A-4147-A177-3AD203B41FA5}">
+                      <a16:colId xmlns:a16="http://schemas.microsoft.com/office/drawing/2014/main" val="1373504811"/>
+                    </a:ext>
+                  </a:extLst>
+                </a:gridCol>
+                <a:gridCol w="2197793">
+                  <a:extLst>
+                    <a:ext uri="{9D8B030D-6E8A-4147-A177-3AD203B41FA5}">
+                      <a16:colId xmlns:a16="http://schemas.microsoft.com/office/drawing/2014/main" val="1641182163"/>
+                    </a:ext>
+                  </a:extLst>
+                </a:gridCol>
+              </a:tblGrid>
+              <a:tr h="436141">
+                <a:tc>
+                  <a:txBody>
+                    <a:bodyPr/>
+                    <a:lstStyle/>
+                    <a:p>
+                      <a:pPr algn="ctr"/>
+                      <a:r>
+                        <a:rPr lang="fr-FR" dirty="0" smtClean="0"/>
+                        <a:t>Taches</a:t>
+                      </a:r>
+                      <a:endParaRPr lang="fr-FR" dirty="0"/>
+                    </a:p>
+                  </a:txBody>
+                  <a:tcPr/>
+                </a:tc>
+                <a:tc>
+                  <a:txBody>
+                    <a:bodyPr/>
+                    <a:lstStyle/>
+                    <a:p>
+                      <a:pPr algn="ctr"/>
+                      <a:r>
+                        <a:rPr lang="fr-FR" dirty="0" smtClean="0"/>
+                        <a:t>Gabriel</a:t>
+                      </a:r>
+                      <a:endParaRPr lang="fr-FR" dirty="0"/>
+                    </a:p>
+                  </a:txBody>
+                  <a:tcPr/>
+                </a:tc>
+                <a:tc>
+                  <a:txBody>
+                    <a:bodyPr/>
+                    <a:lstStyle/>
+                    <a:p>
+                      <a:pPr algn="ctr"/>
+                      <a:r>
+                        <a:rPr lang="fr-FR" dirty="0" smtClean="0"/>
+                        <a:t>Michael</a:t>
+                      </a:r>
+                      <a:endParaRPr lang="fr-FR" dirty="0"/>
+                    </a:p>
+                  </a:txBody>
+                  <a:tcPr/>
+                </a:tc>
+                <a:tc>
+                  <a:txBody>
+                    <a:bodyPr/>
+                    <a:lstStyle/>
+                    <a:p>
+                      <a:pPr algn="ctr"/>
+                      <a:r>
+                        <a:rPr lang="fr-FR" dirty="0" smtClean="0"/>
+                        <a:t>Claude</a:t>
+                      </a:r>
+                      <a:endParaRPr lang="fr-FR" dirty="0"/>
+                    </a:p>
+                  </a:txBody>
+                  <a:tcPr/>
+                </a:tc>
+                <a:extLst>
+                  <a:ext uri="{0D108BD9-81ED-4DB2-BD59-A6C34878D82A}">
+                    <a16:rowId xmlns:a16="http://schemas.microsoft.com/office/drawing/2014/main" val="2647326308"/>
+                  </a:ext>
+                </a:extLst>
+              </a:tr>
+              <a:tr h="1147666">
+                <a:tc>
+                  <a:txBody>
+                    <a:bodyPr/>
+                    <a:lstStyle/>
+                    <a:p>
+                      <a:pPr algn="ctr"/>
+                      <a:endParaRPr lang="fr-FR" dirty="0" smtClean="0"/>
+                    </a:p>
+                    <a:p>
+                      <a:pPr algn="ctr"/>
+                      <a:r>
+                        <a:rPr lang="fr-FR" dirty="0" smtClean="0"/>
+                        <a:t>Plan</a:t>
+                      </a:r>
+                      <a:r>
+                        <a:rPr lang="fr-FR" baseline="0" dirty="0" smtClean="0"/>
+                        <a:t> de déploiement</a:t>
+                      </a:r>
+                      <a:endParaRPr lang="fr-FR" dirty="0" smtClean="0"/>
+                    </a:p>
+                  </a:txBody>
+                  <a:tcPr/>
+                </a:tc>
+                <a:tc>
+                  <a:txBody>
+                    <a:bodyPr/>
+                    <a:lstStyle/>
+                    <a:p>
+                      <a:pPr algn="ctr"/>
+                      <a:endParaRPr lang="fr-FR" dirty="0" smtClean="0"/>
+                    </a:p>
+                    <a:p>
+                      <a:pPr algn="ctr"/>
+                      <a:endParaRPr lang="fr-FR" dirty="0"/>
+                    </a:p>
+                  </a:txBody>
+                  <a:tcPr/>
+                </a:tc>
+                <a:tc>
+                  <a:txBody>
+                    <a:bodyPr/>
+                    <a:lstStyle/>
+                    <a:p>
+                      <a:pPr algn="ctr"/>
+                      <a:endParaRPr lang="fr-FR" dirty="0"/>
+                    </a:p>
+                  </a:txBody>
+                  <a:tcPr/>
+                </a:tc>
+                <a:tc>
+                  <a:txBody>
+                    <a:bodyPr/>
+                    <a:lstStyle/>
+                    <a:p>
+                      <a:pPr algn="ctr"/>
+                      <a:endParaRPr lang="fr-FR" dirty="0"/>
+                    </a:p>
+                  </a:txBody>
+                  <a:tcPr/>
+                </a:tc>
+                <a:extLst>
+                  <a:ext uri="{0D108BD9-81ED-4DB2-BD59-A6C34878D82A}">
+                    <a16:rowId xmlns:a16="http://schemas.microsoft.com/office/drawing/2014/main" val="853558620"/>
+                  </a:ext>
+                </a:extLst>
+              </a:tr>
+              <a:tr h="955009">
+                <a:tc>
+                  <a:txBody>
+                    <a:bodyPr/>
+                    <a:lstStyle/>
+                    <a:p>
+                      <a:pPr algn="ctr"/>
+                      <a:endParaRPr lang="fr-FR" dirty="0" smtClean="0"/>
+                    </a:p>
+                    <a:p>
+                      <a:pPr algn="ctr"/>
+                      <a:r>
+                        <a:rPr lang="fr-FR" dirty="0" smtClean="0"/>
+                        <a:t>Suivi de projet</a:t>
+                      </a:r>
+                    </a:p>
+                  </a:txBody>
+                  <a:tcPr/>
+                </a:tc>
+                <a:tc>
+                  <a:txBody>
+                    <a:bodyPr/>
+                    <a:lstStyle/>
+                    <a:p>
+                      <a:pPr algn="ctr"/>
+                      <a:endParaRPr lang="fr-FR" dirty="0"/>
+                    </a:p>
+                  </a:txBody>
+                  <a:tcPr/>
+                </a:tc>
+                <a:tc>
+                  <a:txBody>
+                    <a:bodyPr/>
+                    <a:lstStyle/>
+                    <a:p>
+                      <a:pPr algn="ctr"/>
+                      <a:endParaRPr lang="fr-FR" dirty="0"/>
+                    </a:p>
+                  </a:txBody>
+                  <a:tcPr/>
+                </a:tc>
+                <a:tc>
+                  <a:txBody>
+                    <a:bodyPr/>
+                    <a:lstStyle/>
+                    <a:p>
+                      <a:pPr algn="ctr"/>
+                      <a:endParaRPr lang="fr-FR"/>
+                    </a:p>
+                  </a:txBody>
+                  <a:tcPr/>
+                </a:tc>
+                <a:extLst>
+                  <a:ext uri="{0D108BD9-81ED-4DB2-BD59-A6C34878D82A}">
+                    <a16:rowId xmlns:a16="http://schemas.microsoft.com/office/drawing/2014/main" val="960133350"/>
+                  </a:ext>
+                </a:extLst>
+              </a:tr>
+              <a:tr h="955009">
+                <a:tc>
+                  <a:txBody>
+                    <a:bodyPr/>
+                    <a:lstStyle/>
+                    <a:p>
+                      <a:pPr algn="ctr"/>
+                      <a:endParaRPr lang="fr-FR" dirty="0" smtClean="0"/>
+                    </a:p>
+                    <a:p>
+                      <a:pPr algn="ctr"/>
+                      <a:r>
+                        <a:rPr lang="fr-FR" dirty="0" smtClean="0"/>
+                        <a:t>Plan</a:t>
+                      </a:r>
+                      <a:r>
+                        <a:rPr lang="fr-FR" baseline="0" dirty="0" smtClean="0"/>
+                        <a:t> de test</a:t>
+                      </a:r>
+                      <a:endParaRPr lang="fr-FR" dirty="0" smtClean="0"/>
+                    </a:p>
+                  </a:txBody>
+                  <a:tcPr/>
+                </a:tc>
+                <a:tc>
+                  <a:txBody>
+                    <a:bodyPr/>
+                    <a:lstStyle/>
+                    <a:p>
+                      <a:pPr algn="ctr"/>
+                      <a:endParaRPr lang="fr-FR" dirty="0"/>
+                    </a:p>
+                  </a:txBody>
+                  <a:tcPr/>
+                </a:tc>
+                <a:tc>
+                  <a:txBody>
+                    <a:bodyPr/>
+                    <a:lstStyle/>
+                    <a:p>
+                      <a:pPr algn="ctr"/>
+                      <a:endParaRPr lang="fr-FR" dirty="0"/>
+                    </a:p>
+                  </a:txBody>
+                  <a:tcPr/>
+                </a:tc>
+                <a:tc>
+                  <a:txBody>
+                    <a:bodyPr/>
+                    <a:lstStyle/>
+                    <a:p>
+                      <a:pPr algn="ctr"/>
+                      <a:endParaRPr lang="fr-FR" dirty="0"/>
+                    </a:p>
+                  </a:txBody>
+                  <a:tcPr/>
+                </a:tc>
+                <a:extLst>
+                  <a:ext uri="{0D108BD9-81ED-4DB2-BD59-A6C34878D82A}">
+                    <a16:rowId xmlns:a16="http://schemas.microsoft.com/office/drawing/2014/main" val="2268178512"/>
+                  </a:ext>
+                </a:extLst>
+              </a:tr>
+              <a:tr h="955009">
+                <a:tc>
+                  <a:txBody>
+                    <a:bodyPr/>
+                    <a:lstStyle/>
+                    <a:p>
+                      <a:pPr algn="ctr"/>
+                      <a:endParaRPr lang="fr-FR" dirty="0" smtClean="0"/>
+                    </a:p>
+                    <a:p>
+                      <a:pPr algn="ctr"/>
+                      <a:r>
+                        <a:rPr lang="fr-FR" dirty="0" smtClean="0"/>
+                        <a:t>sécurisation</a:t>
+                      </a:r>
+                      <a:endParaRPr lang="fr-FR" dirty="0"/>
+                    </a:p>
+                  </a:txBody>
+                  <a:tcPr/>
+                </a:tc>
+                <a:tc>
+                  <a:txBody>
+                    <a:bodyPr/>
+                    <a:lstStyle/>
+                    <a:p>
+                      <a:pPr algn="ctr"/>
+                      <a:endParaRPr lang="fr-FR" dirty="0"/>
+                    </a:p>
+                  </a:txBody>
+                  <a:tcPr/>
+                </a:tc>
+                <a:tc>
+                  <a:txBody>
+                    <a:bodyPr/>
+                    <a:lstStyle/>
+                    <a:p>
+                      <a:pPr algn="ctr"/>
+                      <a:endParaRPr lang="fr-FR" dirty="0"/>
+                    </a:p>
+                  </a:txBody>
+                  <a:tcPr/>
+                </a:tc>
+                <a:tc>
+                  <a:txBody>
+                    <a:bodyPr/>
+                    <a:lstStyle/>
+                    <a:p>
+                      <a:pPr algn="ctr"/>
+                      <a:endParaRPr lang="fr-FR" dirty="0"/>
+                    </a:p>
+                  </a:txBody>
+                  <a:tcPr/>
+                </a:tc>
+                <a:extLst>
+                  <a:ext uri="{0D108BD9-81ED-4DB2-BD59-A6C34878D82A}">
+                    <a16:rowId xmlns:a16="http://schemas.microsoft.com/office/drawing/2014/main" val="2663648811"/>
+                  </a:ext>
+                </a:extLst>
+              </a:tr>
+              <a:tr h="955009">
+                <a:tc>
+                  <a:txBody>
+                    <a:bodyPr/>
+                    <a:lstStyle/>
+                    <a:p>
+                      <a:pPr algn="ctr"/>
+                      <a:endParaRPr lang="fr-FR" dirty="0" smtClean="0"/>
+                    </a:p>
+                  </a:txBody>
+                  <a:tcPr/>
+                </a:tc>
+                <a:tc>
+                  <a:txBody>
+                    <a:bodyPr/>
+                    <a:lstStyle/>
+                    <a:p>
+                      <a:pPr algn="ctr"/>
+                      <a:endParaRPr lang="fr-FR" dirty="0"/>
+                    </a:p>
+                  </a:txBody>
+                  <a:tcPr/>
+                </a:tc>
+                <a:tc>
+                  <a:txBody>
+                    <a:bodyPr/>
+                    <a:lstStyle/>
+                    <a:p>
+                      <a:pPr algn="ctr"/>
+                      <a:endParaRPr lang="fr-FR" dirty="0"/>
+                    </a:p>
+                  </a:txBody>
+                  <a:tcPr/>
+                </a:tc>
+                <a:tc>
+                  <a:txBody>
+                    <a:bodyPr/>
+                    <a:lstStyle/>
+                    <a:p>
+                      <a:pPr algn="ctr"/>
+                      <a:endParaRPr lang="fr-FR" dirty="0"/>
+                    </a:p>
+                  </a:txBody>
+                  <a:tcPr/>
+                </a:tc>
+                <a:extLst>
+                  <a:ext uri="{0D108BD9-81ED-4DB2-BD59-A6C34878D82A}">
+                    <a16:rowId xmlns:a16="http://schemas.microsoft.com/office/drawing/2014/main" val="3405210912"/>
+                  </a:ext>
+                </a:extLst>
+              </a:tr>
+            </a:tbl>
+          </a:graphicData>
+        </a:graphic>
+      </p:graphicFrame>
+    </p:spTree>
+    <p:extLst>
+      <p:ext uri="{BB962C8B-B14F-4D97-AF65-F5344CB8AC3E}">
+        <p14:creationId xmlns:p14="http://schemas.microsoft.com/office/powerpoint/2010/main" val="1031953042"/>
+      </p:ext>
+    </p:extLst>
+  </p:cSld>
+  <p:clrMapOvr>
+    <a:masterClrMapping/>
+  </p:clrMapOvr>
+</p:sld>
+</file>
+
+<file path=ppt/slides/slide6.xml><?xml version="1.0" encoding="utf-8"?>
+<p:sld xmlns:a="http://schemas.openxmlformats.org/drawingml/2006/main" xmlns:r="http://schemas.openxmlformats.org/officeDocument/2006/relationships" xmlns:p="http://schemas.openxmlformats.org/presentationml/2006/main">
+  <p:cSld>
+    <p:spTree>
+      <p:nvGrpSpPr>
+        <p:cNvPr id="1" name=""/>
+        <p:cNvGrpSpPr/>
+        <p:nvPr/>
+      </p:nvGrpSpPr>
+      <p:grpSpPr>
+        <a:xfrm>
+          <a:off x="0" y="0"/>
+          <a:ext cx="0" cy="0"/>
+          <a:chOff x="0" y="0"/>
+          <a:chExt cx="0" cy="0"/>
+        </a:xfrm>
+      </p:grpSpPr>
+      <p:sp>
+        <p:nvSpPr>
+          <p:cNvPr id="4" name="ZoneTexte 3"/>
+          <p:cNvSpPr txBox="1"/>
+          <p:nvPr/>
+        </p:nvSpPr>
+        <p:spPr>
+          <a:xfrm>
+            <a:off x="479085" y="98860"/>
+            <a:ext cx="7365076" cy="461665"/>
+          </a:xfrm>
+          <a:prstGeom prst="rect">
+            <a:avLst/>
+          </a:prstGeom>
+          <a:noFill/>
+        </p:spPr>
+        <p:txBody>
+          <a:bodyPr wrap="square" rtlCol="0">
+            <a:spAutoFit/>
+          </a:bodyPr>
+          <a:lstStyle/>
+          <a:p>
+            <a:pPr algn="ctr"/>
+            <a:r>
+              <a:rPr lang="fr-FR" sz="2400" dirty="0" smtClean="0">
+                <a:latin typeface="Arial Black" panose="020B0A04020102020204" pitchFamily="34" charset="0"/>
+              </a:rPr>
+              <a:t>Partie </a:t>
+            </a:r>
+            <a:r>
+              <a:rPr lang="fr-FR" sz="2400" dirty="0">
+                <a:latin typeface="Arial Black" panose="020B0A04020102020204" pitchFamily="34" charset="0"/>
+              </a:rPr>
+              <a:t>5</a:t>
+            </a:r>
+            <a:r>
+              <a:rPr lang="fr-FR" sz="2400" dirty="0" smtClean="0">
+                <a:latin typeface="Arial Black" panose="020B0A04020102020204" pitchFamily="34" charset="0"/>
+              </a:rPr>
+              <a:t>: présentation </a:t>
+            </a:r>
+            <a:endParaRPr lang="fr-FR" sz="2400" dirty="0">
+              <a:latin typeface="Arial Black" panose="020B0A04020102020204" pitchFamily="34" charset="0"/>
+            </a:endParaRPr>
+          </a:p>
+        </p:txBody>
+      </p:sp>
+      <p:sp>
+        <p:nvSpPr>
+          <p:cNvPr id="5" name="ZoneTexte 4"/>
+          <p:cNvSpPr txBox="1"/>
+          <p:nvPr/>
+        </p:nvSpPr>
+        <p:spPr>
+          <a:xfrm>
+            <a:off x="8495607" y="191193"/>
+            <a:ext cx="3466408" cy="369332"/>
+          </a:xfrm>
+          <a:prstGeom prst="rect">
+            <a:avLst/>
+          </a:prstGeom>
+          <a:noFill/>
+        </p:spPr>
+        <p:txBody>
+          <a:bodyPr wrap="square" rtlCol="0">
+            <a:spAutoFit/>
+          </a:bodyPr>
+          <a:lstStyle/>
+          <a:p>
+            <a:r>
+              <a:rPr lang="fr-FR" dirty="0" smtClean="0">
+                <a:latin typeface="Arial Black" panose="020B0A04020102020204" pitchFamily="34" charset="0"/>
+              </a:rPr>
+              <a:t>..</a:t>
+            </a:r>
+            <a:r>
+              <a:rPr lang="fr-FR" dirty="0" smtClean="0">
+                <a:latin typeface="Arial Black" panose="020B0A04020102020204" pitchFamily="34" charset="0"/>
+              </a:rPr>
+              <a:t>/../2025 </a:t>
+            </a:r>
+            <a:r>
+              <a:rPr lang="fr-FR" dirty="0" smtClean="0">
+                <a:latin typeface="Arial Black" panose="020B0A04020102020204" pitchFamily="34" charset="0"/>
+              </a:rPr>
+              <a:t>– </a:t>
+            </a:r>
+            <a:r>
+              <a:rPr lang="fr-FR" dirty="0" smtClean="0">
+                <a:latin typeface="Arial Black" panose="020B0A04020102020204" pitchFamily="34" charset="0"/>
+              </a:rPr>
+              <a:t>../../2025</a:t>
+            </a:r>
+            <a:endParaRPr lang="fr-FR" dirty="0">
+              <a:latin typeface="Arial Black" panose="020B0A04020102020204" pitchFamily="34" charset="0"/>
+            </a:endParaRPr>
+          </a:p>
+        </p:txBody>
+      </p:sp>
+      <p:graphicFrame>
+        <p:nvGraphicFramePr>
+          <p:cNvPr id="6" name="Tableau 5"/>
+          <p:cNvGraphicFramePr>
+            <a:graphicFrameLocks noGrp="1"/>
+          </p:cNvGraphicFramePr>
+          <p:nvPr>
+            <p:extLst>
+              <p:ext uri="{D42A27DB-BD31-4B8C-83A1-F6EECF244321}">
+                <p14:modId xmlns:p14="http://schemas.microsoft.com/office/powerpoint/2010/main" val="559589661"/>
+              </p:ext>
+            </p:extLst>
+          </p:nvPr>
+        </p:nvGraphicFramePr>
+        <p:xfrm>
+          <a:off x="1815867" y="699796"/>
+          <a:ext cx="8791172" cy="5573662"/>
+        </p:xfrm>
+        <a:graphic>
+          <a:graphicData uri="http://schemas.openxmlformats.org/drawingml/2006/table">
+            <a:tbl>
+              <a:tblPr firstRow="1" bandRow="1">
+                <a:tableStyleId>{793D81CF-94F2-401A-BA57-92F5A7B2D0C5}</a:tableStyleId>
+              </a:tblPr>
+              <a:tblGrid>
+                <a:gridCol w="2197793">
+                  <a:extLst>
+                    <a:ext uri="{9D8B030D-6E8A-4147-A177-3AD203B41FA5}">
+                      <a16:colId xmlns:a16="http://schemas.microsoft.com/office/drawing/2014/main" val="1279948072"/>
+                    </a:ext>
+                  </a:extLst>
+                </a:gridCol>
+                <a:gridCol w="2197793">
+                  <a:extLst>
+                    <a:ext uri="{9D8B030D-6E8A-4147-A177-3AD203B41FA5}">
+                      <a16:colId xmlns:a16="http://schemas.microsoft.com/office/drawing/2014/main" val="1593545219"/>
+                    </a:ext>
+                  </a:extLst>
+                </a:gridCol>
+                <a:gridCol w="2197793">
+                  <a:extLst>
+                    <a:ext uri="{9D8B030D-6E8A-4147-A177-3AD203B41FA5}">
+                      <a16:colId xmlns:a16="http://schemas.microsoft.com/office/drawing/2014/main" val="1373504811"/>
+                    </a:ext>
+                  </a:extLst>
+                </a:gridCol>
+                <a:gridCol w="2197793">
+                  <a:extLst>
+                    <a:ext uri="{9D8B030D-6E8A-4147-A177-3AD203B41FA5}">
+                      <a16:colId xmlns:a16="http://schemas.microsoft.com/office/drawing/2014/main" val="1641182163"/>
+                    </a:ext>
+                  </a:extLst>
+                </a:gridCol>
+              </a:tblGrid>
+              <a:tr h="961053">
+                <a:tc>
+                  <a:txBody>
+                    <a:bodyPr/>
+                    <a:lstStyle/>
+                    <a:p>
+                      <a:pPr algn="ctr"/>
+                      <a:endParaRPr lang="fr-FR" dirty="0" smtClean="0"/>
+                    </a:p>
+                    <a:p>
+                      <a:pPr algn="ctr"/>
+                      <a:r>
+                        <a:rPr lang="fr-FR" dirty="0" smtClean="0"/>
+                        <a:t>Taches</a:t>
+                      </a:r>
+                      <a:endParaRPr lang="fr-FR" dirty="0"/>
+                    </a:p>
+                  </a:txBody>
+                  <a:tcPr/>
+                </a:tc>
+                <a:tc>
+                  <a:txBody>
+                    <a:bodyPr/>
+                    <a:lstStyle/>
+                    <a:p>
+                      <a:pPr algn="ctr"/>
+                      <a:endParaRPr lang="fr-FR" dirty="0" smtClean="0"/>
+                    </a:p>
+                    <a:p>
+                      <a:pPr algn="ctr"/>
+                      <a:r>
+                        <a:rPr lang="fr-FR" dirty="0" smtClean="0"/>
+                        <a:t>Gabriel</a:t>
+                      </a:r>
+                      <a:endParaRPr lang="fr-FR" dirty="0"/>
+                    </a:p>
+                  </a:txBody>
+                  <a:tcPr/>
+                </a:tc>
+                <a:tc>
+                  <a:txBody>
+                    <a:bodyPr/>
+                    <a:lstStyle/>
+                    <a:p>
+                      <a:pPr algn="ctr"/>
+                      <a:endParaRPr lang="fr-FR" dirty="0" smtClean="0"/>
+                    </a:p>
+                    <a:p>
+                      <a:pPr algn="ctr"/>
+                      <a:r>
+                        <a:rPr lang="fr-FR" dirty="0" smtClean="0"/>
+                        <a:t>Michael</a:t>
+                      </a:r>
+                      <a:endParaRPr lang="fr-FR" dirty="0"/>
+                    </a:p>
+                  </a:txBody>
+                  <a:tcPr/>
+                </a:tc>
+                <a:tc>
+                  <a:txBody>
+                    <a:bodyPr/>
+                    <a:lstStyle/>
+                    <a:p>
+                      <a:pPr algn="ctr"/>
+                      <a:endParaRPr lang="fr-FR" dirty="0" smtClean="0"/>
+                    </a:p>
+                    <a:p>
+                      <a:pPr algn="ctr"/>
+                      <a:r>
+                        <a:rPr lang="fr-FR" dirty="0" smtClean="0"/>
+                        <a:t>Claude</a:t>
+                      </a:r>
+                      <a:endParaRPr lang="fr-FR" dirty="0"/>
+                    </a:p>
+                  </a:txBody>
+                  <a:tcPr/>
+                </a:tc>
+                <a:extLst>
+                  <a:ext uri="{0D108BD9-81ED-4DB2-BD59-A6C34878D82A}">
+                    <a16:rowId xmlns:a16="http://schemas.microsoft.com/office/drawing/2014/main" val="2647326308"/>
+                  </a:ext>
+                </a:extLst>
+              </a:tr>
+              <a:tr h="1147666">
+                <a:tc>
+                  <a:txBody>
+                    <a:bodyPr/>
+                    <a:lstStyle/>
+                    <a:p>
+                      <a:pPr algn="ctr"/>
+                      <a:endParaRPr lang="fr-FR" dirty="0" smtClean="0"/>
+                    </a:p>
+                    <a:p>
+                      <a:pPr algn="ctr"/>
+                      <a:r>
+                        <a:rPr lang="fr-FR" dirty="0" smtClean="0"/>
+                        <a:t>Documentation</a:t>
+                      </a:r>
+                      <a:r>
+                        <a:rPr lang="fr-FR" baseline="0" dirty="0" smtClean="0"/>
+                        <a:t> relative au projet</a:t>
+                      </a:r>
+                      <a:endParaRPr lang="fr-FR" dirty="0" smtClean="0"/>
+                    </a:p>
+                  </a:txBody>
+                  <a:tcPr/>
+                </a:tc>
+                <a:tc>
+                  <a:txBody>
+                    <a:bodyPr/>
+                    <a:lstStyle/>
+                    <a:p>
+                      <a:pPr algn="ctr"/>
+                      <a:endParaRPr lang="fr-FR" dirty="0" smtClean="0"/>
+                    </a:p>
+                    <a:p>
+                      <a:pPr algn="ctr"/>
+                      <a:endParaRPr lang="fr-FR" dirty="0"/>
+                    </a:p>
+                  </a:txBody>
+                  <a:tcPr/>
+                </a:tc>
+                <a:tc>
+                  <a:txBody>
+                    <a:bodyPr/>
+                    <a:lstStyle/>
+                    <a:p>
+                      <a:pPr algn="ctr"/>
+                      <a:endParaRPr lang="fr-FR" dirty="0"/>
+                    </a:p>
+                  </a:txBody>
+                  <a:tcPr/>
+                </a:tc>
+                <a:tc>
+                  <a:txBody>
+                    <a:bodyPr/>
+                    <a:lstStyle/>
+                    <a:p>
+                      <a:pPr algn="ctr"/>
+                      <a:endParaRPr lang="fr-FR" dirty="0"/>
+                    </a:p>
+                  </a:txBody>
+                  <a:tcPr/>
+                </a:tc>
+                <a:extLst>
+                  <a:ext uri="{0D108BD9-81ED-4DB2-BD59-A6C34878D82A}">
+                    <a16:rowId xmlns:a16="http://schemas.microsoft.com/office/drawing/2014/main" val="853558620"/>
+                  </a:ext>
+                </a:extLst>
+              </a:tr>
+              <a:tr h="1259632">
+                <a:tc>
+                  <a:txBody>
+                    <a:bodyPr/>
+                    <a:lstStyle/>
+                    <a:p>
+                      <a:pPr algn="ctr"/>
+                      <a:endParaRPr lang="fr-FR" dirty="0" smtClean="0"/>
+                    </a:p>
+                    <a:p>
+                      <a:pPr algn="ctr"/>
+                      <a:r>
+                        <a:rPr lang="fr-FR" dirty="0" smtClean="0"/>
+                        <a:t>Support</a:t>
+                      </a:r>
+                      <a:r>
+                        <a:rPr lang="fr-FR" baseline="0" dirty="0" smtClean="0"/>
+                        <a:t> de présentation</a:t>
+                      </a:r>
+                      <a:endParaRPr lang="fr-FR" dirty="0" smtClean="0"/>
+                    </a:p>
+                  </a:txBody>
+                  <a:tcPr/>
+                </a:tc>
+                <a:tc>
+                  <a:txBody>
+                    <a:bodyPr/>
+                    <a:lstStyle/>
+                    <a:p>
+                      <a:pPr algn="ctr"/>
+                      <a:endParaRPr lang="fr-FR" dirty="0"/>
+                    </a:p>
+                  </a:txBody>
+                  <a:tcPr/>
+                </a:tc>
+                <a:tc>
+                  <a:txBody>
+                    <a:bodyPr/>
+                    <a:lstStyle/>
+                    <a:p>
+                      <a:pPr algn="ctr"/>
+                      <a:endParaRPr lang="fr-FR" dirty="0"/>
+                    </a:p>
+                  </a:txBody>
+                  <a:tcPr/>
+                </a:tc>
+                <a:tc>
+                  <a:txBody>
+                    <a:bodyPr/>
+                    <a:lstStyle/>
+                    <a:p>
+                      <a:pPr algn="ctr"/>
+                      <a:endParaRPr lang="fr-FR"/>
+                    </a:p>
+                  </a:txBody>
+                  <a:tcPr/>
+                </a:tc>
+                <a:extLst>
+                  <a:ext uri="{0D108BD9-81ED-4DB2-BD59-A6C34878D82A}">
+                    <a16:rowId xmlns:a16="http://schemas.microsoft.com/office/drawing/2014/main" val="960133350"/>
+                  </a:ext>
+                </a:extLst>
+              </a:tr>
+              <a:tr h="1250302">
+                <a:tc>
+                  <a:txBody>
+                    <a:bodyPr/>
+                    <a:lstStyle/>
+                    <a:p>
+                      <a:pPr algn="ctr"/>
+                      <a:endParaRPr lang="fr-FR" dirty="0" smtClean="0"/>
+                    </a:p>
+                    <a:p>
+                      <a:pPr algn="ctr"/>
+                      <a:r>
+                        <a:rPr lang="fr-FR" dirty="0" smtClean="0"/>
+                        <a:t>Présentation</a:t>
+                      </a:r>
+                      <a:r>
+                        <a:rPr lang="fr-FR" baseline="0" dirty="0" smtClean="0"/>
+                        <a:t> du projet</a:t>
+                      </a:r>
+                      <a:endParaRPr lang="fr-FR" dirty="0" smtClean="0"/>
+                    </a:p>
+                  </a:txBody>
+                  <a:tcPr/>
+                </a:tc>
+                <a:tc>
+                  <a:txBody>
+                    <a:bodyPr/>
+                    <a:lstStyle/>
+                    <a:p>
+                      <a:pPr algn="ctr"/>
+                      <a:endParaRPr lang="fr-FR" dirty="0"/>
+                    </a:p>
+                  </a:txBody>
+                  <a:tcPr/>
+                </a:tc>
+                <a:tc>
+                  <a:txBody>
+                    <a:bodyPr/>
+                    <a:lstStyle/>
+                    <a:p>
+                      <a:pPr algn="ctr"/>
+                      <a:endParaRPr lang="fr-FR" dirty="0"/>
+                    </a:p>
+                  </a:txBody>
+                  <a:tcPr/>
+                </a:tc>
+                <a:tc>
+                  <a:txBody>
+                    <a:bodyPr/>
+                    <a:lstStyle/>
+                    <a:p>
+                      <a:pPr algn="ctr"/>
+                      <a:endParaRPr lang="fr-FR" dirty="0"/>
+                    </a:p>
+                  </a:txBody>
+                  <a:tcPr/>
+                </a:tc>
+                <a:extLst>
+                  <a:ext uri="{0D108BD9-81ED-4DB2-BD59-A6C34878D82A}">
+                    <a16:rowId xmlns:a16="http://schemas.microsoft.com/office/drawing/2014/main" val="2268178512"/>
+                  </a:ext>
+                </a:extLst>
+              </a:tr>
+              <a:tr h="955009">
+                <a:tc>
+                  <a:txBody>
+                    <a:bodyPr/>
+                    <a:lstStyle/>
+                    <a:p>
+                      <a:pPr algn="ctr"/>
+                      <a:endParaRPr lang="fr-FR" dirty="0" smtClean="0"/>
+                    </a:p>
+                    <a:p>
+                      <a:pPr algn="ctr"/>
+                      <a:r>
+                        <a:rPr lang="fr-FR" dirty="0" smtClean="0"/>
+                        <a:t>sécurisation</a:t>
+                      </a:r>
+                      <a:endParaRPr lang="fr-FR" dirty="0"/>
+                    </a:p>
+                  </a:txBody>
+                  <a:tcPr/>
+                </a:tc>
+                <a:tc>
+                  <a:txBody>
+                    <a:bodyPr/>
+                    <a:lstStyle/>
+                    <a:p>
+                      <a:pPr algn="ctr"/>
+                      <a:endParaRPr lang="fr-FR" dirty="0"/>
+                    </a:p>
+                  </a:txBody>
+                  <a:tcPr/>
+                </a:tc>
+                <a:tc>
+                  <a:txBody>
+                    <a:bodyPr/>
+                    <a:lstStyle/>
+                    <a:p>
+                      <a:pPr algn="ctr"/>
+                      <a:endParaRPr lang="fr-FR" dirty="0"/>
+                    </a:p>
+                  </a:txBody>
+                  <a:tcPr/>
+                </a:tc>
+                <a:tc>
+                  <a:txBody>
+                    <a:bodyPr/>
+                    <a:lstStyle/>
+                    <a:p>
+                      <a:pPr algn="ctr"/>
+                      <a:endParaRPr lang="fr-FR" dirty="0"/>
+                    </a:p>
+                  </a:txBody>
+                  <a:tcPr/>
+                </a:tc>
+                <a:extLst>
+                  <a:ext uri="{0D108BD9-81ED-4DB2-BD59-A6C34878D82A}">
+                    <a16:rowId xmlns:a16="http://schemas.microsoft.com/office/drawing/2014/main" val="2663648811"/>
+                  </a:ext>
+                </a:extLst>
+              </a:tr>
+            </a:tbl>
+          </a:graphicData>
+        </a:graphic>
+      </p:graphicFrame>
+    </p:spTree>
+    <p:extLst>
+      <p:ext uri="{BB962C8B-B14F-4D97-AF65-F5344CB8AC3E}">
+        <p14:creationId xmlns:p14="http://schemas.microsoft.com/office/powerpoint/2010/main" val="2885146786"/>
       </p:ext>
     </p:extLst>
   </p:cSld>

</xml_diff>

<commit_message>
ajout des outils de gestion MAJ
</commit_message>
<xml_diff>
--- a/gestion_projet/planning_et_suivi_de_projet.pptx
+++ b/gestion_projet/planning_et_suivi_de_projet.pptx
@@ -7,6 +7,10 @@
   <p:sldIdLst>
     <p:sldId id="257" r:id="rId2"/>
     <p:sldId id="256" r:id="rId3"/>
+    <p:sldId id="259" r:id="rId4"/>
+    <p:sldId id="260" r:id="rId5"/>
+    <p:sldId id="261" r:id="rId6"/>
+    <p:sldId id="262" r:id="rId7"/>
   </p:sldIdLst>
   <p:sldSz cx="12192000" cy="6858000"/>
   <p:notesSz cx="6858000" cy="9144000"/>
@@ -105,6 +109,11 @@
       </a:defRPr>
     </a:lvl9pPr>
   </p:defaultTextStyle>
+  <p:extLst>
+    <p:ext uri="{EFAFB233-063F-42B5-8137-9DF3F51BA10A}">
+      <p15:sldGuideLst xmlns:p15="http://schemas.microsoft.com/office/powerpoint/2012/main"/>
+    </p:ext>
+  </p:extLst>
 </p:presentation>
 </file>
 
@@ -239,7 +248,7 @@
           <a:p>
             <a:fld id="{61392CA3-05B0-4392-AF3B-A66AF8F6FDA4}" type="datetimeFigureOut">
               <a:rPr lang="fr-FR" smtClean="0"/>
-              <a:t>01/08/2024</a:t>
+              <a:t>19/12/2024</a:t>
             </a:fld>
             <a:endParaRPr lang="fr-FR"/>
           </a:p>
@@ -409,7 +418,7 @@
           <a:p>
             <a:fld id="{61392CA3-05B0-4392-AF3B-A66AF8F6FDA4}" type="datetimeFigureOut">
               <a:rPr lang="fr-FR" smtClean="0"/>
-              <a:t>01/08/2024</a:t>
+              <a:t>19/12/2024</a:t>
             </a:fld>
             <a:endParaRPr lang="fr-FR"/>
           </a:p>
@@ -589,7 +598,7 @@
           <a:p>
             <a:fld id="{61392CA3-05B0-4392-AF3B-A66AF8F6FDA4}" type="datetimeFigureOut">
               <a:rPr lang="fr-FR" smtClean="0"/>
-              <a:t>01/08/2024</a:t>
+              <a:t>19/12/2024</a:t>
             </a:fld>
             <a:endParaRPr lang="fr-FR"/>
           </a:p>
@@ -759,7 +768,7 @@
           <a:p>
             <a:fld id="{61392CA3-05B0-4392-AF3B-A66AF8F6FDA4}" type="datetimeFigureOut">
               <a:rPr lang="fr-FR" smtClean="0"/>
-              <a:t>01/08/2024</a:t>
+              <a:t>19/12/2024</a:t>
             </a:fld>
             <a:endParaRPr lang="fr-FR"/>
           </a:p>
@@ -1005,7 +1014,7 @@
           <a:p>
             <a:fld id="{61392CA3-05B0-4392-AF3B-A66AF8F6FDA4}" type="datetimeFigureOut">
               <a:rPr lang="fr-FR" smtClean="0"/>
-              <a:t>01/08/2024</a:t>
+              <a:t>19/12/2024</a:t>
             </a:fld>
             <a:endParaRPr lang="fr-FR"/>
           </a:p>
@@ -1237,7 +1246,7 @@
           <a:p>
             <a:fld id="{61392CA3-05B0-4392-AF3B-A66AF8F6FDA4}" type="datetimeFigureOut">
               <a:rPr lang="fr-FR" smtClean="0"/>
-              <a:t>01/08/2024</a:t>
+              <a:t>19/12/2024</a:t>
             </a:fld>
             <a:endParaRPr lang="fr-FR"/>
           </a:p>
@@ -1604,7 +1613,7 @@
           <a:p>
             <a:fld id="{61392CA3-05B0-4392-AF3B-A66AF8F6FDA4}" type="datetimeFigureOut">
               <a:rPr lang="fr-FR" smtClean="0"/>
-              <a:t>01/08/2024</a:t>
+              <a:t>19/12/2024</a:t>
             </a:fld>
             <a:endParaRPr lang="fr-FR"/>
           </a:p>
@@ -1722,7 +1731,7 @@
           <a:p>
             <a:fld id="{61392CA3-05B0-4392-AF3B-A66AF8F6FDA4}" type="datetimeFigureOut">
               <a:rPr lang="fr-FR" smtClean="0"/>
-              <a:t>01/08/2024</a:t>
+              <a:t>19/12/2024</a:t>
             </a:fld>
             <a:endParaRPr lang="fr-FR"/>
           </a:p>
@@ -1817,7 +1826,7 @@
           <a:p>
             <a:fld id="{61392CA3-05B0-4392-AF3B-A66AF8F6FDA4}" type="datetimeFigureOut">
               <a:rPr lang="fr-FR" smtClean="0"/>
-              <a:t>01/08/2024</a:t>
+              <a:t>19/12/2024</a:t>
             </a:fld>
             <a:endParaRPr lang="fr-FR"/>
           </a:p>
@@ -2094,7 +2103,7 @@
           <a:p>
             <a:fld id="{61392CA3-05B0-4392-AF3B-A66AF8F6FDA4}" type="datetimeFigureOut">
               <a:rPr lang="fr-FR" smtClean="0"/>
-              <a:t>01/08/2024</a:t>
+              <a:t>19/12/2024</a:t>
             </a:fld>
             <a:endParaRPr lang="fr-FR"/>
           </a:p>
@@ -2347,7 +2356,7 @@
           <a:p>
             <a:fld id="{61392CA3-05B0-4392-AF3B-A66AF8F6FDA4}" type="datetimeFigureOut">
               <a:rPr lang="fr-FR" smtClean="0"/>
-              <a:t>01/08/2024</a:t>
+              <a:t>19/12/2024</a:t>
             </a:fld>
             <a:endParaRPr lang="fr-FR"/>
           </a:p>
@@ -2560,7 +2569,7 @@
           <a:p>
             <a:fld id="{61392CA3-05B0-4392-AF3B-A66AF8F6FDA4}" type="datetimeFigureOut">
               <a:rPr lang="fr-FR" smtClean="0"/>
-              <a:t>01/08/2024</a:t>
+              <a:t>19/12/2024</a:t>
             </a:fld>
             <a:endParaRPr lang="fr-FR"/>
           </a:p>
@@ -3841,6 +3850,266 @@
           </a:fontRef>
         </p:style>
       </p:cxnSp>
+      <p:sp>
+        <p:nvSpPr>
+          <p:cNvPr id="26" name="ZoneTexte 25"/>
+          <p:cNvSpPr txBox="1"/>
+          <p:nvPr/>
+        </p:nvSpPr>
+        <p:spPr>
+          <a:xfrm>
+            <a:off x="2568633" y="1450726"/>
+            <a:ext cx="1413164" cy="584775"/>
+          </a:xfrm>
+          <a:prstGeom prst="rect">
+            <a:avLst/>
+          </a:prstGeom>
+          <a:noFill/>
+        </p:spPr>
+        <p:txBody>
+          <a:bodyPr wrap="square" rtlCol="0">
+            <a:spAutoFit/>
+          </a:bodyPr>
+          <a:lstStyle/>
+          <a:p>
+            <a:pPr algn="ctr"/>
+            <a:r>
+              <a:rPr lang="fr-FR" sz="1600" b="1" dirty="0" smtClean="0"/>
+              <a:t>15</a:t>
+            </a:r>
+            <a:r>
+              <a:rPr lang="fr-FR" sz="1600" b="1" dirty="0" smtClean="0"/>
+              <a:t>/10/24-16/10/24</a:t>
+            </a:r>
+            <a:endParaRPr lang="fr-FR" sz="1600" b="1" dirty="0"/>
+          </a:p>
+        </p:txBody>
+      </p:sp>
+      <p:sp>
+        <p:nvSpPr>
+          <p:cNvPr id="44" name="ZoneTexte 43"/>
+          <p:cNvSpPr txBox="1"/>
+          <p:nvPr/>
+        </p:nvSpPr>
+        <p:spPr>
+          <a:xfrm>
+            <a:off x="3136861" y="2688267"/>
+            <a:ext cx="1805420" cy="369332"/>
+          </a:xfrm>
+          <a:prstGeom prst="rect">
+            <a:avLst/>
+          </a:prstGeom>
+          <a:noFill/>
+        </p:spPr>
+        <p:txBody>
+          <a:bodyPr wrap="square" rtlCol="0">
+            <a:spAutoFit/>
+          </a:bodyPr>
+          <a:lstStyle/>
+          <a:p>
+            <a:pPr algn="ctr"/>
+            <a:r>
+              <a:rPr lang="fr-FR" b="1" dirty="0" smtClean="0"/>
+              <a:t>-Front-end HTML</a:t>
+            </a:r>
+            <a:endParaRPr lang="fr-FR" b="1" dirty="0"/>
+          </a:p>
+        </p:txBody>
+      </p:sp>
+      <p:sp>
+        <p:nvSpPr>
+          <p:cNvPr id="45" name="ZoneTexte 44"/>
+          <p:cNvSpPr txBox="1"/>
+          <p:nvPr/>
+        </p:nvSpPr>
+        <p:spPr>
+          <a:xfrm>
+            <a:off x="3644293" y="3141820"/>
+            <a:ext cx="1438661" cy="1200329"/>
+          </a:xfrm>
+          <a:prstGeom prst="rect">
+            <a:avLst/>
+          </a:prstGeom>
+          <a:noFill/>
+        </p:spPr>
+        <p:txBody>
+          <a:bodyPr wrap="square" rtlCol="0">
+            <a:spAutoFit/>
+          </a:bodyPr>
+          <a:lstStyle/>
+          <a:p>
+            <a:pPr algn="ctr"/>
+            <a:r>
+              <a:rPr lang="fr-FR" b="1" dirty="0" smtClean="0"/>
+              <a:t>-Mise en forme CSS du maquettage</a:t>
+            </a:r>
+            <a:endParaRPr lang="fr-FR" b="1" dirty="0"/>
+          </a:p>
+        </p:txBody>
+      </p:sp>
+      <p:sp>
+        <p:nvSpPr>
+          <p:cNvPr id="46" name="ZoneTexte 45"/>
+          <p:cNvSpPr txBox="1"/>
+          <p:nvPr/>
+        </p:nvSpPr>
+        <p:spPr>
+          <a:xfrm>
+            <a:off x="3586606" y="4393016"/>
+            <a:ext cx="1188719" cy="646331"/>
+          </a:xfrm>
+          <a:prstGeom prst="rect">
+            <a:avLst/>
+          </a:prstGeom>
+          <a:noFill/>
+        </p:spPr>
+        <p:txBody>
+          <a:bodyPr wrap="square" rtlCol="0">
+            <a:spAutoFit/>
+          </a:bodyPr>
+          <a:lstStyle/>
+          <a:p>
+            <a:pPr algn="ctr"/>
+            <a:r>
+              <a:rPr lang="fr-FR" b="1" dirty="0" smtClean="0"/>
+              <a:t>-Codage JavaScript</a:t>
+            </a:r>
+            <a:endParaRPr lang="fr-FR" b="1" dirty="0"/>
+          </a:p>
+        </p:txBody>
+      </p:sp>
+      <p:sp>
+        <p:nvSpPr>
+          <p:cNvPr id="47" name="ZoneTexte 46"/>
+          <p:cNvSpPr txBox="1"/>
+          <p:nvPr/>
+        </p:nvSpPr>
+        <p:spPr>
+          <a:xfrm>
+            <a:off x="5236739" y="2434661"/>
+            <a:ext cx="1188719" cy="923330"/>
+          </a:xfrm>
+          <a:prstGeom prst="rect">
+            <a:avLst/>
+          </a:prstGeom>
+          <a:noFill/>
+        </p:spPr>
+        <p:txBody>
+          <a:bodyPr wrap="square" rtlCol="0">
+            <a:spAutoFit/>
+          </a:bodyPr>
+          <a:lstStyle/>
+          <a:p>
+            <a:pPr algn="ctr"/>
+            <a:r>
+              <a:rPr lang="fr-FR" b="1" dirty="0" smtClean="0"/>
+              <a:t>- C</a:t>
+            </a:r>
+            <a:r>
+              <a:rPr lang="fr-FR" b="1" dirty="0" smtClean="0"/>
+              <a:t>réation du site en PHP</a:t>
+            </a:r>
+            <a:endParaRPr lang="fr-FR" b="1" dirty="0"/>
+          </a:p>
+        </p:txBody>
+      </p:sp>
+      <p:sp>
+        <p:nvSpPr>
+          <p:cNvPr id="48" name="ZoneTexte 47"/>
+          <p:cNvSpPr txBox="1"/>
+          <p:nvPr/>
+        </p:nvSpPr>
+        <p:spPr>
+          <a:xfrm>
+            <a:off x="5806162" y="3386868"/>
+            <a:ext cx="1188719" cy="646331"/>
+          </a:xfrm>
+          <a:prstGeom prst="rect">
+            <a:avLst/>
+          </a:prstGeom>
+          <a:noFill/>
+        </p:spPr>
+        <p:txBody>
+          <a:bodyPr wrap="square" rtlCol="0">
+            <a:spAutoFit/>
+          </a:bodyPr>
+          <a:lstStyle/>
+          <a:p>
+            <a:pPr algn="ctr"/>
+            <a:r>
+              <a:rPr lang="fr-FR" b="1" dirty="0" smtClean="0"/>
+              <a:t>- Création de la BDD</a:t>
+            </a:r>
+            <a:endParaRPr lang="fr-FR" b="1" dirty="0"/>
+          </a:p>
+        </p:txBody>
+      </p:sp>
+      <p:sp>
+        <p:nvSpPr>
+          <p:cNvPr id="49" name="ZoneTexte 48"/>
+          <p:cNvSpPr txBox="1"/>
+          <p:nvPr/>
+        </p:nvSpPr>
+        <p:spPr>
+          <a:xfrm>
+            <a:off x="5569873" y="4139944"/>
+            <a:ext cx="1188719" cy="923330"/>
+          </a:xfrm>
+          <a:prstGeom prst="rect">
+            <a:avLst/>
+          </a:prstGeom>
+          <a:noFill/>
+        </p:spPr>
+        <p:txBody>
+          <a:bodyPr wrap="square" rtlCol="0">
+            <a:spAutoFit/>
+          </a:bodyPr>
+          <a:lstStyle/>
+          <a:p>
+            <a:pPr algn="ctr"/>
+            <a:r>
+              <a:rPr lang="fr-FR" b="1" dirty="0" smtClean="0"/>
+              <a:t>- Création de l’API en PHP</a:t>
+            </a:r>
+            <a:endParaRPr lang="fr-FR" b="1" dirty="0"/>
+          </a:p>
+        </p:txBody>
+      </p:sp>
+      <p:sp>
+        <p:nvSpPr>
+          <p:cNvPr id="50" name="ZoneTexte 49"/>
+          <p:cNvSpPr txBox="1"/>
+          <p:nvPr/>
+        </p:nvSpPr>
+        <p:spPr>
+          <a:xfrm>
+            <a:off x="4424236" y="1435366"/>
+            <a:ext cx="1413164" cy="584775"/>
+          </a:xfrm>
+          <a:prstGeom prst="rect">
+            <a:avLst/>
+          </a:prstGeom>
+          <a:noFill/>
+        </p:spPr>
+        <p:txBody>
+          <a:bodyPr wrap="square" rtlCol="0">
+            <a:spAutoFit/>
+          </a:bodyPr>
+          <a:lstStyle/>
+          <a:p>
+            <a:pPr algn="ctr"/>
+            <a:r>
+              <a:rPr lang="fr-FR" sz="1600" b="1" dirty="0" smtClean="0"/>
+              <a:t>19</a:t>
+            </a:r>
+            <a:r>
+              <a:rPr lang="fr-FR" sz="1600" b="1" dirty="0" smtClean="0"/>
+              <a:t>/12/24-20/12/24</a:t>
+            </a:r>
+            <a:endParaRPr lang="fr-FR" sz="1600" b="1" dirty="0"/>
+          </a:p>
+        </p:txBody>
+      </p:sp>
     </p:spTree>
     <p:extLst>
       <p:ext uri="{BB962C8B-B14F-4D97-AF65-F5344CB8AC3E}">
@@ -4429,6 +4698,2363 @@
     <p:extLst>
       <p:ext uri="{BB962C8B-B14F-4D97-AF65-F5344CB8AC3E}">
         <p14:creationId xmlns:p14="http://schemas.microsoft.com/office/powerpoint/2010/main" val="1734221515"/>
+      </p:ext>
+    </p:extLst>
+  </p:cSld>
+  <p:clrMapOvr>
+    <a:masterClrMapping/>
+  </p:clrMapOvr>
+</p:sld>
+</file>
+
+<file path=ppt/slides/slide3.xml><?xml version="1.0" encoding="utf-8"?>
+<p:sld xmlns:a="http://schemas.openxmlformats.org/drawingml/2006/main" xmlns:r="http://schemas.openxmlformats.org/officeDocument/2006/relationships" xmlns:p="http://schemas.openxmlformats.org/presentationml/2006/main">
+  <p:cSld>
+    <p:spTree>
+      <p:nvGrpSpPr>
+        <p:cNvPr id="1" name=""/>
+        <p:cNvGrpSpPr/>
+        <p:nvPr/>
+      </p:nvGrpSpPr>
+      <p:grpSpPr>
+        <a:xfrm>
+          <a:off x="0" y="0"/>
+          <a:ext cx="0" cy="0"/>
+          <a:chOff x="0" y="0"/>
+          <a:chExt cx="0" cy="0"/>
+        </a:xfrm>
+      </p:grpSpPr>
+      <p:sp>
+        <p:nvSpPr>
+          <p:cNvPr id="4" name="ZoneTexte 3"/>
+          <p:cNvSpPr txBox="1"/>
+          <p:nvPr/>
+        </p:nvSpPr>
+        <p:spPr>
+          <a:xfrm>
+            <a:off x="507077" y="145026"/>
+            <a:ext cx="7365076" cy="461665"/>
+          </a:xfrm>
+          <a:prstGeom prst="rect">
+            <a:avLst/>
+          </a:prstGeom>
+          <a:noFill/>
+        </p:spPr>
+        <p:txBody>
+          <a:bodyPr wrap="square" rtlCol="0">
+            <a:spAutoFit/>
+          </a:bodyPr>
+          <a:lstStyle/>
+          <a:p>
+            <a:pPr algn="ctr"/>
+            <a:r>
+              <a:rPr lang="fr-FR" sz="2400" dirty="0" smtClean="0">
+                <a:latin typeface="Arial Black" panose="020B0A04020102020204" pitchFamily="34" charset="0"/>
+              </a:rPr>
+              <a:t>Partie </a:t>
+            </a:r>
+            <a:r>
+              <a:rPr lang="fr-FR" sz="2400" dirty="0" smtClean="0">
+                <a:latin typeface="Arial Black" panose="020B0A04020102020204" pitchFamily="34" charset="0"/>
+              </a:rPr>
+              <a:t>2: Front-end </a:t>
+            </a:r>
+            <a:endParaRPr lang="fr-FR" sz="2400" dirty="0">
+              <a:latin typeface="Arial Black" panose="020B0A04020102020204" pitchFamily="34" charset="0"/>
+            </a:endParaRPr>
+          </a:p>
+        </p:txBody>
+      </p:sp>
+      <p:sp>
+        <p:nvSpPr>
+          <p:cNvPr id="5" name="ZoneTexte 4"/>
+          <p:cNvSpPr txBox="1"/>
+          <p:nvPr/>
+        </p:nvSpPr>
+        <p:spPr>
+          <a:xfrm>
+            <a:off x="8495607" y="191193"/>
+            <a:ext cx="3466408" cy="369332"/>
+          </a:xfrm>
+          <a:prstGeom prst="rect">
+            <a:avLst/>
+          </a:prstGeom>
+          <a:noFill/>
+        </p:spPr>
+        <p:txBody>
+          <a:bodyPr wrap="square" rtlCol="0">
+            <a:spAutoFit/>
+          </a:bodyPr>
+          <a:lstStyle/>
+          <a:p>
+            <a:r>
+              <a:rPr lang="fr-FR" dirty="0" smtClean="0">
+                <a:latin typeface="Arial Black" panose="020B0A04020102020204" pitchFamily="34" charset="0"/>
+              </a:rPr>
+              <a:t>15</a:t>
+            </a:r>
+            <a:r>
+              <a:rPr lang="fr-FR" dirty="0" smtClean="0">
+                <a:latin typeface="Arial Black" panose="020B0A04020102020204" pitchFamily="34" charset="0"/>
+              </a:rPr>
+              <a:t>/10/2024 </a:t>
+            </a:r>
+            <a:r>
+              <a:rPr lang="fr-FR" dirty="0" smtClean="0">
+                <a:latin typeface="Arial Black" panose="020B0A04020102020204" pitchFamily="34" charset="0"/>
+              </a:rPr>
+              <a:t>– </a:t>
+            </a:r>
+            <a:r>
+              <a:rPr lang="fr-FR" dirty="0" smtClean="0">
+                <a:latin typeface="Arial Black" panose="020B0A04020102020204" pitchFamily="34" charset="0"/>
+              </a:rPr>
+              <a:t>16</a:t>
+            </a:r>
+            <a:r>
+              <a:rPr lang="fr-FR" dirty="0" smtClean="0">
+                <a:latin typeface="Arial Black" panose="020B0A04020102020204" pitchFamily="34" charset="0"/>
+              </a:rPr>
+              <a:t>/10/2024</a:t>
+            </a:r>
+            <a:endParaRPr lang="fr-FR" dirty="0">
+              <a:latin typeface="Arial Black" panose="020B0A04020102020204" pitchFamily="34" charset="0"/>
+            </a:endParaRPr>
+          </a:p>
+        </p:txBody>
+      </p:sp>
+      <p:graphicFrame>
+        <p:nvGraphicFramePr>
+          <p:cNvPr id="6" name="Tableau 5"/>
+          <p:cNvGraphicFramePr>
+            <a:graphicFrameLocks noGrp="1"/>
+          </p:cNvGraphicFramePr>
+          <p:nvPr>
+            <p:extLst>
+              <p:ext uri="{D42A27DB-BD31-4B8C-83A1-F6EECF244321}">
+                <p14:modId xmlns:p14="http://schemas.microsoft.com/office/powerpoint/2010/main" val="2908228078"/>
+              </p:ext>
+            </p:extLst>
+          </p:nvPr>
+        </p:nvGraphicFramePr>
+        <p:xfrm>
+          <a:off x="1573270" y="923932"/>
+          <a:ext cx="8791172" cy="4982345"/>
+        </p:xfrm>
+        <a:graphic>
+          <a:graphicData uri="http://schemas.openxmlformats.org/drawingml/2006/table">
+            <a:tbl>
+              <a:tblPr firstRow="1" bandRow="1">
+                <a:tableStyleId>{93296810-A885-4BE3-A3E7-6D5BEEA58F35}</a:tableStyleId>
+              </a:tblPr>
+              <a:tblGrid>
+                <a:gridCol w="2197793">
+                  <a:extLst>
+                    <a:ext uri="{9D8B030D-6E8A-4147-A177-3AD203B41FA5}">
+                      <a16:colId xmlns:a16="http://schemas.microsoft.com/office/drawing/2014/main" val="1279948072"/>
+                    </a:ext>
+                  </a:extLst>
+                </a:gridCol>
+                <a:gridCol w="2197793">
+                  <a:extLst>
+                    <a:ext uri="{9D8B030D-6E8A-4147-A177-3AD203B41FA5}">
+                      <a16:colId xmlns:a16="http://schemas.microsoft.com/office/drawing/2014/main" val="1593545219"/>
+                    </a:ext>
+                  </a:extLst>
+                </a:gridCol>
+                <a:gridCol w="2197793">
+                  <a:extLst>
+                    <a:ext uri="{9D8B030D-6E8A-4147-A177-3AD203B41FA5}">
+                      <a16:colId xmlns:a16="http://schemas.microsoft.com/office/drawing/2014/main" val="1373504811"/>
+                    </a:ext>
+                  </a:extLst>
+                </a:gridCol>
+                <a:gridCol w="2197793">
+                  <a:extLst>
+                    <a:ext uri="{9D8B030D-6E8A-4147-A177-3AD203B41FA5}">
+                      <a16:colId xmlns:a16="http://schemas.microsoft.com/office/drawing/2014/main" val="1641182163"/>
+                    </a:ext>
+                  </a:extLst>
+                </a:gridCol>
+              </a:tblGrid>
+              <a:tr h="923529">
+                <a:tc>
+                  <a:txBody>
+                    <a:bodyPr/>
+                    <a:lstStyle/>
+                    <a:p>
+                      <a:pPr algn="ctr"/>
+                      <a:endParaRPr lang="fr-FR" dirty="0" smtClean="0"/>
+                    </a:p>
+                    <a:p>
+                      <a:pPr algn="ctr"/>
+                      <a:r>
+                        <a:rPr lang="fr-FR" dirty="0" smtClean="0"/>
+                        <a:t>Taches</a:t>
+                      </a:r>
+                      <a:endParaRPr lang="fr-FR" dirty="0"/>
+                    </a:p>
+                  </a:txBody>
+                  <a:tcPr/>
+                </a:tc>
+                <a:tc>
+                  <a:txBody>
+                    <a:bodyPr/>
+                    <a:lstStyle/>
+                    <a:p>
+                      <a:pPr algn="ctr"/>
+                      <a:endParaRPr lang="fr-FR" dirty="0" smtClean="0"/>
+                    </a:p>
+                    <a:p>
+                      <a:pPr algn="ctr"/>
+                      <a:r>
+                        <a:rPr lang="fr-FR" dirty="0" smtClean="0"/>
+                        <a:t>Gabriel</a:t>
+                      </a:r>
+                      <a:endParaRPr lang="fr-FR" dirty="0"/>
+                    </a:p>
+                  </a:txBody>
+                  <a:tcPr/>
+                </a:tc>
+                <a:tc>
+                  <a:txBody>
+                    <a:bodyPr/>
+                    <a:lstStyle/>
+                    <a:p>
+                      <a:pPr algn="ctr"/>
+                      <a:endParaRPr lang="fr-FR" dirty="0" smtClean="0"/>
+                    </a:p>
+                    <a:p>
+                      <a:pPr algn="ctr"/>
+                      <a:r>
+                        <a:rPr lang="fr-FR" dirty="0" smtClean="0"/>
+                        <a:t>Michael</a:t>
+                      </a:r>
+                      <a:endParaRPr lang="fr-FR" dirty="0"/>
+                    </a:p>
+                  </a:txBody>
+                  <a:tcPr/>
+                </a:tc>
+                <a:tc>
+                  <a:txBody>
+                    <a:bodyPr/>
+                    <a:lstStyle/>
+                    <a:p>
+                      <a:pPr algn="ctr"/>
+                      <a:endParaRPr lang="fr-FR" dirty="0" smtClean="0"/>
+                    </a:p>
+                    <a:p>
+                      <a:pPr algn="ctr"/>
+                      <a:r>
+                        <a:rPr lang="fr-FR" dirty="0" smtClean="0"/>
+                        <a:t>Claude</a:t>
+                      </a:r>
+                      <a:endParaRPr lang="fr-FR" dirty="0"/>
+                    </a:p>
+                  </a:txBody>
+                  <a:tcPr/>
+                </a:tc>
+                <a:extLst>
+                  <a:ext uri="{0D108BD9-81ED-4DB2-BD59-A6C34878D82A}">
+                    <a16:rowId xmlns:a16="http://schemas.microsoft.com/office/drawing/2014/main" val="2647326308"/>
+                  </a:ext>
+                </a:extLst>
+              </a:tr>
+              <a:tr h="699594">
+                <a:tc>
+                  <a:txBody>
+                    <a:bodyPr/>
+                    <a:lstStyle/>
+                    <a:p>
+                      <a:pPr algn="ctr"/>
+                      <a:r>
+                        <a:rPr lang="fr-FR" dirty="0" smtClean="0"/>
+                        <a:t>Mise</a:t>
+                      </a:r>
+                      <a:r>
+                        <a:rPr lang="fr-FR" baseline="0" dirty="0" smtClean="0"/>
+                        <a:t> en forme CSS du maquettage</a:t>
+                      </a:r>
+                      <a:endParaRPr lang="fr-FR" dirty="0"/>
+                    </a:p>
+                  </a:txBody>
+                  <a:tcPr/>
+                </a:tc>
+                <a:tc>
+                  <a:txBody>
+                    <a:bodyPr/>
+                    <a:lstStyle/>
+                    <a:p>
+                      <a:pPr algn="ctr"/>
+                      <a:endParaRPr lang="fr-FR" dirty="0" smtClean="0"/>
+                    </a:p>
+                    <a:p>
+                      <a:pPr algn="ctr"/>
+                      <a:endParaRPr lang="fr-FR" dirty="0"/>
+                    </a:p>
+                  </a:txBody>
+                  <a:tcPr>
+                    <a:solidFill>
+                      <a:schemeClr val="accent6">
+                        <a:lumMod val="75000"/>
+                      </a:schemeClr>
+                    </a:solidFill>
+                  </a:tcPr>
+                </a:tc>
+                <a:tc>
+                  <a:txBody>
+                    <a:bodyPr/>
+                    <a:lstStyle/>
+                    <a:p>
+                      <a:pPr algn="ctr"/>
+                      <a:endParaRPr lang="fr-FR" dirty="0"/>
+                    </a:p>
+                  </a:txBody>
+                  <a:tcPr/>
+                </a:tc>
+                <a:tc>
+                  <a:txBody>
+                    <a:bodyPr/>
+                    <a:lstStyle/>
+                    <a:p>
+                      <a:pPr algn="ctr"/>
+                      <a:endParaRPr lang="fr-FR" dirty="0"/>
+                    </a:p>
+                  </a:txBody>
+                  <a:tcPr/>
+                </a:tc>
+                <a:extLst>
+                  <a:ext uri="{0D108BD9-81ED-4DB2-BD59-A6C34878D82A}">
+                    <a16:rowId xmlns:a16="http://schemas.microsoft.com/office/drawing/2014/main" val="853558620"/>
+                  </a:ext>
+                </a:extLst>
+              </a:tr>
+              <a:tr h="438539">
+                <a:tc>
+                  <a:txBody>
+                    <a:bodyPr/>
+                    <a:lstStyle/>
+                    <a:p>
+                      <a:pPr algn="ctr"/>
+                      <a:r>
+                        <a:rPr lang="fr-FR" dirty="0" smtClean="0"/>
+                        <a:t>Suivi du projet</a:t>
+                      </a:r>
+                      <a:endParaRPr lang="fr-FR" dirty="0"/>
+                    </a:p>
+                  </a:txBody>
+                  <a:tcPr/>
+                </a:tc>
+                <a:tc>
+                  <a:txBody>
+                    <a:bodyPr/>
+                    <a:lstStyle/>
+                    <a:p>
+                      <a:pPr algn="ctr"/>
+                      <a:endParaRPr lang="fr-FR" dirty="0"/>
+                    </a:p>
+                  </a:txBody>
+                  <a:tcPr>
+                    <a:solidFill>
+                      <a:schemeClr val="accent6">
+                        <a:lumMod val="75000"/>
+                      </a:schemeClr>
+                    </a:solidFill>
+                  </a:tcPr>
+                </a:tc>
+                <a:tc>
+                  <a:txBody>
+                    <a:bodyPr/>
+                    <a:lstStyle/>
+                    <a:p>
+                      <a:pPr algn="ctr"/>
+                      <a:endParaRPr lang="fr-FR" dirty="0"/>
+                    </a:p>
+                  </a:txBody>
+                  <a:tcPr/>
+                </a:tc>
+                <a:tc>
+                  <a:txBody>
+                    <a:bodyPr/>
+                    <a:lstStyle/>
+                    <a:p>
+                      <a:pPr algn="ctr"/>
+                      <a:endParaRPr lang="fr-FR" dirty="0"/>
+                    </a:p>
+                  </a:txBody>
+                  <a:tcPr/>
+                </a:tc>
+                <a:extLst>
+                  <a:ext uri="{0D108BD9-81ED-4DB2-BD59-A6C34878D82A}">
+                    <a16:rowId xmlns:a16="http://schemas.microsoft.com/office/drawing/2014/main" val="2561902286"/>
+                  </a:ext>
+                </a:extLst>
+              </a:tr>
+              <a:tr h="737119">
+                <a:tc>
+                  <a:txBody>
+                    <a:bodyPr/>
+                    <a:lstStyle/>
+                    <a:p>
+                      <a:pPr algn="ctr"/>
+                      <a:r>
+                        <a:rPr lang="fr-FR" dirty="0" smtClean="0"/>
+                        <a:t>Mise</a:t>
+                      </a:r>
+                      <a:r>
+                        <a:rPr lang="fr-FR" baseline="0" dirty="0" smtClean="0"/>
+                        <a:t> en forme JS du maquettage</a:t>
+                      </a:r>
+                      <a:endParaRPr lang="fr-FR" dirty="0" smtClean="0"/>
+                    </a:p>
+                  </a:txBody>
+                  <a:tcPr/>
+                </a:tc>
+                <a:tc>
+                  <a:txBody>
+                    <a:bodyPr/>
+                    <a:lstStyle/>
+                    <a:p>
+                      <a:pPr algn="ctr"/>
+                      <a:endParaRPr lang="fr-FR" sz="1800" kern="1200" dirty="0">
+                        <a:solidFill>
+                          <a:schemeClr val="dk1"/>
+                        </a:solidFill>
+                        <a:latin typeface="+mn-lt"/>
+                        <a:ea typeface="+mn-ea"/>
+                        <a:cs typeface="+mn-cs"/>
+                      </a:endParaRPr>
+                    </a:p>
+                  </a:txBody>
+                  <a:tcPr>
+                    <a:solidFill>
+                      <a:schemeClr val="accent6">
+                        <a:lumMod val="75000"/>
+                      </a:schemeClr>
+                    </a:solidFill>
+                  </a:tcPr>
+                </a:tc>
+                <a:tc>
+                  <a:txBody>
+                    <a:bodyPr/>
+                    <a:lstStyle/>
+                    <a:p>
+                      <a:pPr algn="ctr"/>
+                      <a:endParaRPr lang="fr-FR" dirty="0"/>
+                    </a:p>
+                  </a:txBody>
+                  <a:tcPr/>
+                </a:tc>
+                <a:tc>
+                  <a:txBody>
+                    <a:bodyPr/>
+                    <a:lstStyle/>
+                    <a:p>
+                      <a:pPr algn="ctr"/>
+                      <a:endParaRPr lang="fr-FR"/>
+                    </a:p>
+                  </a:txBody>
+                  <a:tcPr/>
+                </a:tc>
+                <a:extLst>
+                  <a:ext uri="{0D108BD9-81ED-4DB2-BD59-A6C34878D82A}">
+                    <a16:rowId xmlns:a16="http://schemas.microsoft.com/office/drawing/2014/main" val="960133350"/>
+                  </a:ext>
+                </a:extLst>
+              </a:tr>
+              <a:tr h="550707">
+                <a:tc>
+                  <a:txBody>
+                    <a:bodyPr/>
+                    <a:lstStyle/>
+                    <a:p>
+                      <a:pPr algn="ctr"/>
+                      <a:r>
+                        <a:rPr lang="fr-FR" dirty="0" smtClean="0"/>
+                        <a:t>Front-end</a:t>
+                      </a:r>
+                      <a:r>
+                        <a:rPr lang="fr-FR" baseline="0" dirty="0" smtClean="0"/>
+                        <a:t> HTML</a:t>
+                      </a:r>
+                      <a:endParaRPr lang="fr-FR" dirty="0" smtClean="0"/>
+                    </a:p>
+                  </a:txBody>
+                  <a:tcPr/>
+                </a:tc>
+                <a:tc>
+                  <a:txBody>
+                    <a:bodyPr/>
+                    <a:lstStyle/>
+                    <a:p>
+                      <a:pPr algn="ctr"/>
+                      <a:endParaRPr lang="fr-FR" dirty="0"/>
+                    </a:p>
+                  </a:txBody>
+                  <a:tcPr>
+                    <a:solidFill>
+                      <a:schemeClr val="accent6">
+                        <a:lumMod val="75000"/>
+                      </a:schemeClr>
+                    </a:solidFill>
+                  </a:tcPr>
+                </a:tc>
+                <a:tc>
+                  <a:txBody>
+                    <a:bodyPr/>
+                    <a:lstStyle/>
+                    <a:p>
+                      <a:pPr algn="ctr"/>
+                      <a:endParaRPr lang="fr-FR" dirty="0"/>
+                    </a:p>
+                  </a:txBody>
+                  <a:tcPr>
+                    <a:solidFill>
+                      <a:schemeClr val="accent6">
+                        <a:lumMod val="75000"/>
+                      </a:schemeClr>
+                    </a:solidFill>
+                  </a:tcPr>
+                </a:tc>
+                <a:tc>
+                  <a:txBody>
+                    <a:bodyPr/>
+                    <a:lstStyle/>
+                    <a:p>
+                      <a:pPr algn="ctr"/>
+                      <a:endParaRPr lang="fr-FR" dirty="0"/>
+                    </a:p>
+                  </a:txBody>
+                  <a:tcPr>
+                    <a:solidFill>
+                      <a:schemeClr val="accent6">
+                        <a:lumMod val="75000"/>
+                      </a:schemeClr>
+                    </a:solidFill>
+                  </a:tcPr>
+                </a:tc>
+                <a:extLst>
+                  <a:ext uri="{0D108BD9-81ED-4DB2-BD59-A6C34878D82A}">
+                    <a16:rowId xmlns:a16="http://schemas.microsoft.com/office/drawing/2014/main" val="2268178512"/>
+                  </a:ext>
+                </a:extLst>
+              </a:tr>
+              <a:tr h="948436">
+                <a:tc>
+                  <a:txBody>
+                    <a:bodyPr/>
+                    <a:lstStyle/>
+                    <a:p>
+                      <a:pPr algn="ctr"/>
+                      <a:r>
+                        <a:rPr lang="fr-FR" dirty="0" smtClean="0"/>
+                        <a:t>Codage</a:t>
+                      </a:r>
+                      <a:r>
+                        <a:rPr lang="fr-FR" baseline="0" dirty="0" smtClean="0"/>
+                        <a:t> fonctionnalité UML en JS</a:t>
+                      </a:r>
+                      <a:endParaRPr lang="fr-FR" dirty="0"/>
+                    </a:p>
+                  </a:txBody>
+                  <a:tcPr/>
+                </a:tc>
+                <a:tc>
+                  <a:txBody>
+                    <a:bodyPr/>
+                    <a:lstStyle/>
+                    <a:p>
+                      <a:pPr algn="ctr"/>
+                      <a:endParaRPr lang="fr-FR" dirty="0"/>
+                    </a:p>
+                  </a:txBody>
+                  <a:tcPr/>
+                </a:tc>
+                <a:tc>
+                  <a:txBody>
+                    <a:bodyPr/>
+                    <a:lstStyle/>
+                    <a:p>
+                      <a:pPr algn="ctr"/>
+                      <a:endParaRPr lang="fr-FR" dirty="0"/>
+                    </a:p>
+                  </a:txBody>
+                  <a:tcPr>
+                    <a:solidFill>
+                      <a:schemeClr val="accent6">
+                        <a:lumMod val="75000"/>
+                      </a:schemeClr>
+                    </a:solidFill>
+                  </a:tcPr>
+                </a:tc>
+                <a:tc>
+                  <a:txBody>
+                    <a:bodyPr/>
+                    <a:lstStyle/>
+                    <a:p>
+                      <a:pPr algn="ctr"/>
+                      <a:endParaRPr lang="fr-FR" dirty="0"/>
+                    </a:p>
+                  </a:txBody>
+                  <a:tcPr>
+                    <a:solidFill>
+                      <a:schemeClr val="accent6">
+                        <a:lumMod val="75000"/>
+                      </a:schemeClr>
+                    </a:solidFill>
+                  </a:tcPr>
+                </a:tc>
+                <a:extLst>
+                  <a:ext uri="{0D108BD9-81ED-4DB2-BD59-A6C34878D82A}">
+                    <a16:rowId xmlns:a16="http://schemas.microsoft.com/office/drawing/2014/main" val="2663648811"/>
+                  </a:ext>
+                </a:extLst>
+              </a:tr>
+              <a:tr h="684421">
+                <a:tc>
+                  <a:txBody>
+                    <a:bodyPr/>
+                    <a:lstStyle/>
+                    <a:p>
+                      <a:pPr algn="ctr"/>
+                      <a:r>
+                        <a:rPr lang="fr-FR" baseline="0" dirty="0" smtClean="0"/>
+                        <a:t>Exploitation de l’API fournie</a:t>
+                      </a:r>
+                      <a:endParaRPr lang="fr-FR" dirty="0" smtClean="0"/>
+                    </a:p>
+                  </a:txBody>
+                  <a:tcPr/>
+                </a:tc>
+                <a:tc>
+                  <a:txBody>
+                    <a:bodyPr/>
+                    <a:lstStyle/>
+                    <a:p>
+                      <a:pPr algn="ctr"/>
+                      <a:endParaRPr lang="fr-FR" dirty="0"/>
+                    </a:p>
+                  </a:txBody>
+                  <a:tcPr/>
+                </a:tc>
+                <a:tc>
+                  <a:txBody>
+                    <a:bodyPr/>
+                    <a:lstStyle/>
+                    <a:p>
+                      <a:pPr algn="ctr"/>
+                      <a:endParaRPr lang="fr-FR" dirty="0"/>
+                    </a:p>
+                  </a:txBody>
+                  <a:tcPr>
+                    <a:solidFill>
+                      <a:schemeClr val="accent6">
+                        <a:lumMod val="75000"/>
+                      </a:schemeClr>
+                    </a:solidFill>
+                  </a:tcPr>
+                </a:tc>
+                <a:tc>
+                  <a:txBody>
+                    <a:bodyPr/>
+                    <a:lstStyle/>
+                    <a:p>
+                      <a:pPr algn="ctr"/>
+                      <a:endParaRPr lang="fr-FR" dirty="0"/>
+                    </a:p>
+                  </a:txBody>
+                  <a:tcPr>
+                    <a:solidFill>
+                      <a:schemeClr val="accent6">
+                        <a:lumMod val="75000"/>
+                      </a:schemeClr>
+                    </a:solidFill>
+                  </a:tcPr>
+                </a:tc>
+                <a:extLst>
+                  <a:ext uri="{0D108BD9-81ED-4DB2-BD59-A6C34878D82A}">
+                    <a16:rowId xmlns:a16="http://schemas.microsoft.com/office/drawing/2014/main" val="3405210912"/>
+                  </a:ext>
+                </a:extLst>
+              </a:tr>
+            </a:tbl>
+          </a:graphicData>
+        </a:graphic>
+      </p:graphicFrame>
+    </p:spTree>
+    <p:extLst>
+      <p:ext uri="{BB962C8B-B14F-4D97-AF65-F5344CB8AC3E}">
+        <p14:creationId xmlns:p14="http://schemas.microsoft.com/office/powerpoint/2010/main" val="2296595050"/>
+      </p:ext>
+    </p:extLst>
+  </p:cSld>
+  <p:clrMapOvr>
+    <a:masterClrMapping/>
+  </p:clrMapOvr>
+</p:sld>
+</file>
+
+<file path=ppt/slides/slide4.xml><?xml version="1.0" encoding="utf-8"?>
+<p:sld xmlns:a="http://schemas.openxmlformats.org/drawingml/2006/main" xmlns:r="http://schemas.openxmlformats.org/officeDocument/2006/relationships" xmlns:p="http://schemas.openxmlformats.org/presentationml/2006/main">
+  <p:cSld>
+    <p:spTree>
+      <p:nvGrpSpPr>
+        <p:cNvPr id="1" name=""/>
+        <p:cNvGrpSpPr/>
+        <p:nvPr/>
+      </p:nvGrpSpPr>
+      <p:grpSpPr>
+        <a:xfrm>
+          <a:off x="0" y="0"/>
+          <a:ext cx="0" cy="0"/>
+          <a:chOff x="0" y="0"/>
+          <a:chExt cx="0" cy="0"/>
+        </a:xfrm>
+      </p:grpSpPr>
+      <p:sp>
+        <p:nvSpPr>
+          <p:cNvPr id="4" name="ZoneTexte 3"/>
+          <p:cNvSpPr txBox="1"/>
+          <p:nvPr/>
+        </p:nvSpPr>
+        <p:spPr>
+          <a:xfrm>
+            <a:off x="479085" y="98860"/>
+            <a:ext cx="7365076" cy="461665"/>
+          </a:xfrm>
+          <a:prstGeom prst="rect">
+            <a:avLst/>
+          </a:prstGeom>
+          <a:noFill/>
+        </p:spPr>
+        <p:txBody>
+          <a:bodyPr wrap="square" rtlCol="0">
+            <a:spAutoFit/>
+          </a:bodyPr>
+          <a:lstStyle/>
+          <a:p>
+            <a:pPr algn="ctr"/>
+            <a:r>
+              <a:rPr lang="fr-FR" sz="2400" dirty="0" smtClean="0">
+                <a:latin typeface="Arial Black" panose="020B0A04020102020204" pitchFamily="34" charset="0"/>
+              </a:rPr>
+              <a:t>Partie </a:t>
+            </a:r>
+            <a:r>
+              <a:rPr lang="fr-FR" sz="2400" dirty="0">
+                <a:latin typeface="Arial Black" panose="020B0A04020102020204" pitchFamily="34" charset="0"/>
+              </a:rPr>
+              <a:t>3</a:t>
+            </a:r>
+            <a:r>
+              <a:rPr lang="fr-FR" sz="2400" dirty="0" smtClean="0">
+                <a:latin typeface="Arial Black" panose="020B0A04020102020204" pitchFamily="34" charset="0"/>
+              </a:rPr>
+              <a:t>: Back-end </a:t>
+            </a:r>
+            <a:endParaRPr lang="fr-FR" sz="2400" dirty="0">
+              <a:latin typeface="Arial Black" panose="020B0A04020102020204" pitchFamily="34" charset="0"/>
+            </a:endParaRPr>
+          </a:p>
+        </p:txBody>
+      </p:sp>
+      <p:sp>
+        <p:nvSpPr>
+          <p:cNvPr id="5" name="ZoneTexte 4"/>
+          <p:cNvSpPr txBox="1"/>
+          <p:nvPr/>
+        </p:nvSpPr>
+        <p:spPr>
+          <a:xfrm>
+            <a:off x="8495607" y="191193"/>
+            <a:ext cx="3466408" cy="369332"/>
+          </a:xfrm>
+          <a:prstGeom prst="rect">
+            <a:avLst/>
+          </a:prstGeom>
+          <a:noFill/>
+        </p:spPr>
+        <p:txBody>
+          <a:bodyPr wrap="square" rtlCol="0">
+            <a:spAutoFit/>
+          </a:bodyPr>
+          <a:lstStyle/>
+          <a:p>
+            <a:r>
+              <a:rPr lang="fr-FR" dirty="0" smtClean="0">
+                <a:latin typeface="Arial Black" panose="020B0A04020102020204" pitchFamily="34" charset="0"/>
+              </a:rPr>
+              <a:t>19</a:t>
+            </a:r>
+            <a:r>
+              <a:rPr lang="fr-FR" dirty="0" smtClean="0">
+                <a:latin typeface="Arial Black" panose="020B0A04020102020204" pitchFamily="34" charset="0"/>
+              </a:rPr>
+              <a:t>/12/2024 </a:t>
+            </a:r>
+            <a:r>
+              <a:rPr lang="fr-FR" dirty="0" smtClean="0">
+                <a:latin typeface="Arial Black" panose="020B0A04020102020204" pitchFamily="34" charset="0"/>
+              </a:rPr>
+              <a:t>– </a:t>
+            </a:r>
+            <a:r>
+              <a:rPr lang="fr-FR" dirty="0" smtClean="0">
+                <a:latin typeface="Arial Black" panose="020B0A04020102020204" pitchFamily="34" charset="0"/>
+              </a:rPr>
+              <a:t>20</a:t>
+            </a:r>
+            <a:r>
+              <a:rPr lang="fr-FR" dirty="0" smtClean="0">
+                <a:latin typeface="Arial Black" panose="020B0A04020102020204" pitchFamily="34" charset="0"/>
+              </a:rPr>
+              <a:t>/12/2024</a:t>
+            </a:r>
+            <a:endParaRPr lang="fr-FR" dirty="0">
+              <a:latin typeface="Arial Black" panose="020B0A04020102020204" pitchFamily="34" charset="0"/>
+            </a:endParaRPr>
+          </a:p>
+        </p:txBody>
+      </p:sp>
+      <p:graphicFrame>
+        <p:nvGraphicFramePr>
+          <p:cNvPr id="6" name="Tableau 5"/>
+          <p:cNvGraphicFramePr>
+            <a:graphicFrameLocks noGrp="1"/>
+          </p:cNvGraphicFramePr>
+          <p:nvPr>
+            <p:extLst>
+              <p:ext uri="{D42A27DB-BD31-4B8C-83A1-F6EECF244321}">
+                <p14:modId xmlns:p14="http://schemas.microsoft.com/office/powerpoint/2010/main" val="3482983543"/>
+              </p:ext>
+            </p:extLst>
+          </p:nvPr>
+        </p:nvGraphicFramePr>
+        <p:xfrm>
+          <a:off x="1815867" y="786169"/>
+          <a:ext cx="8791172" cy="5403843"/>
+        </p:xfrm>
+        <a:graphic>
+          <a:graphicData uri="http://schemas.openxmlformats.org/drawingml/2006/table">
+            <a:tbl>
+              <a:tblPr firstRow="1" bandRow="1">
+                <a:tableStyleId>{00A15C55-8517-42AA-B614-E9B94910E393}</a:tableStyleId>
+              </a:tblPr>
+              <a:tblGrid>
+                <a:gridCol w="2197793">
+                  <a:extLst>
+                    <a:ext uri="{9D8B030D-6E8A-4147-A177-3AD203B41FA5}">
+                      <a16:colId xmlns:a16="http://schemas.microsoft.com/office/drawing/2014/main" val="1279948072"/>
+                    </a:ext>
+                  </a:extLst>
+                </a:gridCol>
+                <a:gridCol w="2197793">
+                  <a:extLst>
+                    <a:ext uri="{9D8B030D-6E8A-4147-A177-3AD203B41FA5}">
+                      <a16:colId xmlns:a16="http://schemas.microsoft.com/office/drawing/2014/main" val="1593545219"/>
+                    </a:ext>
+                  </a:extLst>
+                </a:gridCol>
+                <a:gridCol w="2197793">
+                  <a:extLst>
+                    <a:ext uri="{9D8B030D-6E8A-4147-A177-3AD203B41FA5}">
+                      <a16:colId xmlns:a16="http://schemas.microsoft.com/office/drawing/2014/main" val="1373504811"/>
+                    </a:ext>
+                  </a:extLst>
+                </a:gridCol>
+                <a:gridCol w="2197793">
+                  <a:extLst>
+                    <a:ext uri="{9D8B030D-6E8A-4147-A177-3AD203B41FA5}">
+                      <a16:colId xmlns:a16="http://schemas.microsoft.com/office/drawing/2014/main" val="1641182163"/>
+                    </a:ext>
+                  </a:extLst>
+                </a:gridCol>
+              </a:tblGrid>
+              <a:tr h="436141">
+                <a:tc>
+                  <a:txBody>
+                    <a:bodyPr/>
+                    <a:lstStyle/>
+                    <a:p>
+                      <a:pPr algn="ctr"/>
+                      <a:r>
+                        <a:rPr lang="fr-FR" dirty="0" smtClean="0"/>
+                        <a:t>Taches</a:t>
+                      </a:r>
+                      <a:endParaRPr lang="fr-FR" dirty="0"/>
+                    </a:p>
+                  </a:txBody>
+                  <a:tcPr/>
+                </a:tc>
+                <a:tc>
+                  <a:txBody>
+                    <a:bodyPr/>
+                    <a:lstStyle/>
+                    <a:p>
+                      <a:pPr algn="ctr"/>
+                      <a:r>
+                        <a:rPr lang="fr-FR" dirty="0" smtClean="0"/>
+                        <a:t>Gabriel</a:t>
+                      </a:r>
+                      <a:endParaRPr lang="fr-FR" dirty="0"/>
+                    </a:p>
+                  </a:txBody>
+                  <a:tcPr/>
+                </a:tc>
+                <a:tc>
+                  <a:txBody>
+                    <a:bodyPr/>
+                    <a:lstStyle/>
+                    <a:p>
+                      <a:pPr algn="ctr"/>
+                      <a:r>
+                        <a:rPr lang="fr-FR" dirty="0" smtClean="0"/>
+                        <a:t>Michael</a:t>
+                      </a:r>
+                      <a:endParaRPr lang="fr-FR" dirty="0"/>
+                    </a:p>
+                  </a:txBody>
+                  <a:tcPr/>
+                </a:tc>
+                <a:tc>
+                  <a:txBody>
+                    <a:bodyPr/>
+                    <a:lstStyle/>
+                    <a:p>
+                      <a:pPr algn="ctr"/>
+                      <a:r>
+                        <a:rPr lang="fr-FR" dirty="0" smtClean="0"/>
+                        <a:t>Claude</a:t>
+                      </a:r>
+                      <a:endParaRPr lang="fr-FR" dirty="0"/>
+                    </a:p>
+                  </a:txBody>
+                  <a:tcPr/>
+                </a:tc>
+                <a:extLst>
+                  <a:ext uri="{0D108BD9-81ED-4DB2-BD59-A6C34878D82A}">
+                    <a16:rowId xmlns:a16="http://schemas.microsoft.com/office/drawing/2014/main" val="2647326308"/>
+                  </a:ext>
+                </a:extLst>
+              </a:tr>
+              <a:tr h="1147666">
+                <a:tc>
+                  <a:txBody>
+                    <a:bodyPr/>
+                    <a:lstStyle/>
+                    <a:p>
+                      <a:pPr algn="ctr"/>
+                      <a:endParaRPr lang="fr-FR" dirty="0" smtClean="0"/>
+                    </a:p>
+                    <a:p>
+                      <a:pPr algn="ctr"/>
+                      <a:r>
+                        <a:rPr lang="fr-FR" dirty="0" err="1" smtClean="0"/>
+                        <a:t>Creation</a:t>
+                      </a:r>
+                      <a:r>
+                        <a:rPr lang="fr-FR" dirty="0" smtClean="0"/>
+                        <a:t> du</a:t>
+                      </a:r>
+                      <a:r>
+                        <a:rPr lang="fr-FR" baseline="0" dirty="0" smtClean="0"/>
+                        <a:t> site en PHP</a:t>
+                      </a:r>
+                      <a:endParaRPr lang="fr-FR" dirty="0"/>
+                    </a:p>
+                  </a:txBody>
+                  <a:tcPr/>
+                </a:tc>
+                <a:tc>
+                  <a:txBody>
+                    <a:bodyPr/>
+                    <a:lstStyle/>
+                    <a:p>
+                      <a:pPr algn="ctr"/>
+                      <a:endParaRPr lang="fr-FR" dirty="0" smtClean="0"/>
+                    </a:p>
+                    <a:p>
+                      <a:pPr algn="ctr"/>
+                      <a:endParaRPr lang="fr-FR" dirty="0"/>
+                    </a:p>
+                  </a:txBody>
+                  <a:tcPr>
+                    <a:solidFill>
+                      <a:schemeClr val="accent4">
+                        <a:lumMod val="75000"/>
+                      </a:schemeClr>
+                    </a:solidFill>
+                  </a:tcPr>
+                </a:tc>
+                <a:tc>
+                  <a:txBody>
+                    <a:bodyPr/>
+                    <a:lstStyle/>
+                    <a:p>
+                      <a:pPr algn="ctr"/>
+                      <a:endParaRPr lang="fr-FR" dirty="0"/>
+                    </a:p>
+                  </a:txBody>
+                  <a:tcPr>
+                    <a:solidFill>
+                      <a:schemeClr val="accent4">
+                        <a:lumMod val="75000"/>
+                      </a:schemeClr>
+                    </a:solidFill>
+                  </a:tcPr>
+                </a:tc>
+                <a:tc>
+                  <a:txBody>
+                    <a:bodyPr/>
+                    <a:lstStyle/>
+                    <a:p>
+                      <a:pPr algn="ctr"/>
+                      <a:endParaRPr lang="fr-FR" dirty="0"/>
+                    </a:p>
+                  </a:txBody>
+                  <a:tcPr/>
+                </a:tc>
+                <a:extLst>
+                  <a:ext uri="{0D108BD9-81ED-4DB2-BD59-A6C34878D82A}">
+                    <a16:rowId xmlns:a16="http://schemas.microsoft.com/office/drawing/2014/main" val="853558620"/>
+                  </a:ext>
+                </a:extLst>
+              </a:tr>
+              <a:tr h="955009">
+                <a:tc>
+                  <a:txBody>
+                    <a:bodyPr/>
+                    <a:lstStyle/>
+                    <a:p>
+                      <a:pPr algn="ctr"/>
+                      <a:endParaRPr lang="fr-FR" dirty="0" smtClean="0"/>
+                    </a:p>
+                    <a:p>
+                      <a:pPr algn="ctr"/>
+                      <a:r>
+                        <a:rPr lang="fr-FR" dirty="0" smtClean="0"/>
+                        <a:t>Suivi de projet</a:t>
+                      </a:r>
+                    </a:p>
+                  </a:txBody>
+                  <a:tcPr/>
+                </a:tc>
+                <a:tc>
+                  <a:txBody>
+                    <a:bodyPr/>
+                    <a:lstStyle/>
+                    <a:p>
+                      <a:pPr algn="ctr"/>
+                      <a:endParaRPr lang="fr-FR" dirty="0"/>
+                    </a:p>
+                  </a:txBody>
+                  <a:tcPr>
+                    <a:solidFill>
+                      <a:schemeClr val="accent4">
+                        <a:lumMod val="75000"/>
+                      </a:schemeClr>
+                    </a:solidFill>
+                  </a:tcPr>
+                </a:tc>
+                <a:tc>
+                  <a:txBody>
+                    <a:bodyPr/>
+                    <a:lstStyle/>
+                    <a:p>
+                      <a:pPr algn="ctr"/>
+                      <a:endParaRPr lang="fr-FR" dirty="0"/>
+                    </a:p>
+                  </a:txBody>
+                  <a:tcPr/>
+                </a:tc>
+                <a:tc>
+                  <a:txBody>
+                    <a:bodyPr/>
+                    <a:lstStyle/>
+                    <a:p>
+                      <a:pPr algn="ctr"/>
+                      <a:endParaRPr lang="fr-FR"/>
+                    </a:p>
+                  </a:txBody>
+                  <a:tcPr/>
+                </a:tc>
+                <a:extLst>
+                  <a:ext uri="{0D108BD9-81ED-4DB2-BD59-A6C34878D82A}">
+                    <a16:rowId xmlns:a16="http://schemas.microsoft.com/office/drawing/2014/main" val="960133350"/>
+                  </a:ext>
+                </a:extLst>
+              </a:tr>
+              <a:tr h="955009">
+                <a:tc>
+                  <a:txBody>
+                    <a:bodyPr/>
+                    <a:lstStyle/>
+                    <a:p>
+                      <a:pPr algn="ctr"/>
+                      <a:endParaRPr lang="fr-FR" dirty="0" smtClean="0"/>
+                    </a:p>
+                    <a:p>
+                      <a:pPr algn="ctr"/>
+                      <a:r>
+                        <a:rPr lang="fr-FR" dirty="0" smtClean="0"/>
+                        <a:t>Création</a:t>
+                      </a:r>
+                      <a:r>
+                        <a:rPr lang="fr-FR" baseline="0" dirty="0" smtClean="0"/>
+                        <a:t> de la BDD</a:t>
+                      </a:r>
+                      <a:endParaRPr lang="fr-FR" dirty="0" smtClean="0"/>
+                    </a:p>
+                  </a:txBody>
+                  <a:tcPr/>
+                </a:tc>
+                <a:tc>
+                  <a:txBody>
+                    <a:bodyPr/>
+                    <a:lstStyle/>
+                    <a:p>
+                      <a:pPr algn="ctr"/>
+                      <a:endParaRPr lang="fr-FR" dirty="0"/>
+                    </a:p>
+                  </a:txBody>
+                  <a:tcPr/>
+                </a:tc>
+                <a:tc>
+                  <a:txBody>
+                    <a:bodyPr/>
+                    <a:lstStyle/>
+                    <a:p>
+                      <a:pPr algn="ctr"/>
+                      <a:endParaRPr lang="fr-FR" dirty="0"/>
+                    </a:p>
+                  </a:txBody>
+                  <a:tcPr/>
+                </a:tc>
+                <a:tc>
+                  <a:txBody>
+                    <a:bodyPr/>
+                    <a:lstStyle/>
+                    <a:p>
+                      <a:pPr algn="ctr"/>
+                      <a:endParaRPr lang="fr-FR" dirty="0"/>
+                    </a:p>
+                  </a:txBody>
+                  <a:tcPr>
+                    <a:solidFill>
+                      <a:schemeClr val="accent4">
+                        <a:lumMod val="75000"/>
+                      </a:schemeClr>
+                    </a:solidFill>
+                  </a:tcPr>
+                </a:tc>
+                <a:extLst>
+                  <a:ext uri="{0D108BD9-81ED-4DB2-BD59-A6C34878D82A}">
+                    <a16:rowId xmlns:a16="http://schemas.microsoft.com/office/drawing/2014/main" val="2268178512"/>
+                  </a:ext>
+                </a:extLst>
+              </a:tr>
+              <a:tr h="955009">
+                <a:tc>
+                  <a:txBody>
+                    <a:bodyPr/>
+                    <a:lstStyle/>
+                    <a:p>
+                      <a:pPr algn="ctr"/>
+                      <a:endParaRPr lang="fr-FR" dirty="0"/>
+                    </a:p>
+                    <a:p>
+                      <a:pPr algn="ctr"/>
+                      <a:r>
+                        <a:rPr lang="fr-FR" dirty="0" smtClean="0"/>
+                        <a:t>Création</a:t>
+                      </a:r>
+                      <a:r>
+                        <a:rPr lang="fr-FR" baseline="0" dirty="0" smtClean="0"/>
+                        <a:t> de l’API en PHP</a:t>
+                      </a:r>
+                      <a:endParaRPr lang="fr-FR" dirty="0" smtClean="0"/>
+                    </a:p>
+                  </a:txBody>
+                  <a:tcPr/>
+                </a:tc>
+                <a:tc>
+                  <a:txBody>
+                    <a:bodyPr/>
+                    <a:lstStyle/>
+                    <a:p>
+                      <a:pPr algn="ctr"/>
+                      <a:endParaRPr lang="fr-FR" dirty="0"/>
+                    </a:p>
+                  </a:txBody>
+                  <a:tcPr>
+                    <a:solidFill>
+                      <a:schemeClr val="accent4">
+                        <a:lumMod val="75000"/>
+                      </a:schemeClr>
+                    </a:solidFill>
+                  </a:tcPr>
+                </a:tc>
+                <a:tc>
+                  <a:txBody>
+                    <a:bodyPr/>
+                    <a:lstStyle/>
+                    <a:p>
+                      <a:pPr algn="ctr"/>
+                      <a:endParaRPr lang="fr-FR" dirty="0"/>
+                    </a:p>
+                  </a:txBody>
+                  <a:tcPr>
+                    <a:solidFill>
+                      <a:schemeClr val="accent4">
+                        <a:lumMod val="75000"/>
+                      </a:schemeClr>
+                    </a:solidFill>
+                  </a:tcPr>
+                </a:tc>
+                <a:tc>
+                  <a:txBody>
+                    <a:bodyPr/>
+                    <a:lstStyle/>
+                    <a:p>
+                      <a:pPr algn="ctr"/>
+                      <a:endParaRPr lang="fr-FR" dirty="0"/>
+                    </a:p>
+                  </a:txBody>
+                  <a:tcPr/>
+                </a:tc>
+                <a:extLst>
+                  <a:ext uri="{0D108BD9-81ED-4DB2-BD59-A6C34878D82A}">
+                    <a16:rowId xmlns:a16="http://schemas.microsoft.com/office/drawing/2014/main" val="2663648811"/>
+                  </a:ext>
+                </a:extLst>
+              </a:tr>
+              <a:tr h="955009">
+                <a:tc>
+                  <a:txBody>
+                    <a:bodyPr/>
+                    <a:lstStyle/>
+                    <a:p>
+                      <a:pPr algn="ctr"/>
+                      <a:endParaRPr lang="fr-FR" dirty="0" smtClean="0"/>
+                    </a:p>
+                  </a:txBody>
+                  <a:tcPr/>
+                </a:tc>
+                <a:tc>
+                  <a:txBody>
+                    <a:bodyPr/>
+                    <a:lstStyle/>
+                    <a:p>
+                      <a:pPr algn="ctr"/>
+                      <a:endParaRPr lang="fr-FR" dirty="0"/>
+                    </a:p>
+                  </a:txBody>
+                  <a:tcPr/>
+                </a:tc>
+                <a:tc>
+                  <a:txBody>
+                    <a:bodyPr/>
+                    <a:lstStyle/>
+                    <a:p>
+                      <a:pPr algn="ctr"/>
+                      <a:endParaRPr lang="fr-FR" dirty="0"/>
+                    </a:p>
+                  </a:txBody>
+                  <a:tcPr/>
+                </a:tc>
+                <a:tc>
+                  <a:txBody>
+                    <a:bodyPr/>
+                    <a:lstStyle/>
+                    <a:p>
+                      <a:pPr algn="ctr"/>
+                      <a:endParaRPr lang="fr-FR" dirty="0"/>
+                    </a:p>
+                  </a:txBody>
+                  <a:tcPr/>
+                </a:tc>
+                <a:extLst>
+                  <a:ext uri="{0D108BD9-81ED-4DB2-BD59-A6C34878D82A}">
+                    <a16:rowId xmlns:a16="http://schemas.microsoft.com/office/drawing/2014/main" val="3405210912"/>
+                  </a:ext>
+                </a:extLst>
+              </a:tr>
+            </a:tbl>
+          </a:graphicData>
+        </a:graphic>
+      </p:graphicFrame>
+    </p:spTree>
+    <p:extLst>
+      <p:ext uri="{BB962C8B-B14F-4D97-AF65-F5344CB8AC3E}">
+        <p14:creationId xmlns:p14="http://schemas.microsoft.com/office/powerpoint/2010/main" val="4185223905"/>
+      </p:ext>
+    </p:extLst>
+  </p:cSld>
+  <p:clrMapOvr>
+    <a:masterClrMapping/>
+  </p:clrMapOvr>
+</p:sld>
+</file>
+
+<file path=ppt/slides/slide5.xml><?xml version="1.0" encoding="utf-8"?>
+<p:sld xmlns:a="http://schemas.openxmlformats.org/drawingml/2006/main" xmlns:r="http://schemas.openxmlformats.org/officeDocument/2006/relationships" xmlns:p="http://schemas.openxmlformats.org/presentationml/2006/main">
+  <p:cSld>
+    <p:spTree>
+      <p:nvGrpSpPr>
+        <p:cNvPr id="1" name=""/>
+        <p:cNvGrpSpPr/>
+        <p:nvPr/>
+      </p:nvGrpSpPr>
+      <p:grpSpPr>
+        <a:xfrm>
+          <a:off x="0" y="0"/>
+          <a:ext cx="0" cy="0"/>
+          <a:chOff x="0" y="0"/>
+          <a:chExt cx="0" cy="0"/>
+        </a:xfrm>
+      </p:grpSpPr>
+      <p:sp>
+        <p:nvSpPr>
+          <p:cNvPr id="4" name="ZoneTexte 3"/>
+          <p:cNvSpPr txBox="1"/>
+          <p:nvPr/>
+        </p:nvSpPr>
+        <p:spPr>
+          <a:xfrm>
+            <a:off x="479085" y="98860"/>
+            <a:ext cx="7365076" cy="461665"/>
+          </a:xfrm>
+          <a:prstGeom prst="rect">
+            <a:avLst/>
+          </a:prstGeom>
+          <a:noFill/>
+        </p:spPr>
+        <p:txBody>
+          <a:bodyPr wrap="square" rtlCol="0">
+            <a:spAutoFit/>
+          </a:bodyPr>
+          <a:lstStyle/>
+          <a:p>
+            <a:pPr algn="ctr"/>
+            <a:r>
+              <a:rPr lang="fr-FR" sz="2400" dirty="0" smtClean="0">
+                <a:latin typeface="Arial Black" panose="020B0A04020102020204" pitchFamily="34" charset="0"/>
+              </a:rPr>
+              <a:t>Partie </a:t>
+            </a:r>
+            <a:r>
+              <a:rPr lang="fr-FR" sz="2400" dirty="0" smtClean="0">
+                <a:latin typeface="Arial Black" panose="020B0A04020102020204" pitchFamily="34" charset="0"/>
+              </a:rPr>
+              <a:t>4: Déploiement </a:t>
+            </a:r>
+            <a:endParaRPr lang="fr-FR" sz="2400" dirty="0">
+              <a:latin typeface="Arial Black" panose="020B0A04020102020204" pitchFamily="34" charset="0"/>
+            </a:endParaRPr>
+          </a:p>
+        </p:txBody>
+      </p:sp>
+      <p:sp>
+        <p:nvSpPr>
+          <p:cNvPr id="5" name="ZoneTexte 4"/>
+          <p:cNvSpPr txBox="1"/>
+          <p:nvPr/>
+        </p:nvSpPr>
+        <p:spPr>
+          <a:xfrm>
+            <a:off x="8495607" y="191193"/>
+            <a:ext cx="3466408" cy="369332"/>
+          </a:xfrm>
+          <a:prstGeom prst="rect">
+            <a:avLst/>
+          </a:prstGeom>
+          <a:noFill/>
+        </p:spPr>
+        <p:txBody>
+          <a:bodyPr wrap="square" rtlCol="0">
+            <a:spAutoFit/>
+          </a:bodyPr>
+          <a:lstStyle/>
+          <a:p>
+            <a:r>
+              <a:rPr lang="fr-FR" dirty="0" smtClean="0">
+                <a:latin typeface="Arial Black" panose="020B0A04020102020204" pitchFamily="34" charset="0"/>
+              </a:rPr>
+              <a:t>..</a:t>
+            </a:r>
+            <a:r>
+              <a:rPr lang="fr-FR" dirty="0" smtClean="0">
+                <a:latin typeface="Arial Black" panose="020B0A04020102020204" pitchFamily="34" charset="0"/>
+              </a:rPr>
+              <a:t>/../2025 </a:t>
+            </a:r>
+            <a:r>
+              <a:rPr lang="fr-FR" dirty="0" smtClean="0">
+                <a:latin typeface="Arial Black" panose="020B0A04020102020204" pitchFamily="34" charset="0"/>
+              </a:rPr>
+              <a:t>– </a:t>
+            </a:r>
+            <a:r>
+              <a:rPr lang="fr-FR" dirty="0" smtClean="0">
+                <a:latin typeface="Arial Black" panose="020B0A04020102020204" pitchFamily="34" charset="0"/>
+              </a:rPr>
+              <a:t>../../2025</a:t>
+            </a:r>
+            <a:endParaRPr lang="fr-FR" dirty="0">
+              <a:latin typeface="Arial Black" panose="020B0A04020102020204" pitchFamily="34" charset="0"/>
+            </a:endParaRPr>
+          </a:p>
+        </p:txBody>
+      </p:sp>
+      <p:graphicFrame>
+        <p:nvGraphicFramePr>
+          <p:cNvPr id="6" name="Tableau 5"/>
+          <p:cNvGraphicFramePr>
+            <a:graphicFrameLocks noGrp="1"/>
+          </p:cNvGraphicFramePr>
+          <p:nvPr>
+            <p:extLst>
+              <p:ext uri="{D42A27DB-BD31-4B8C-83A1-F6EECF244321}">
+                <p14:modId xmlns:p14="http://schemas.microsoft.com/office/powerpoint/2010/main" val="1788215075"/>
+              </p:ext>
+            </p:extLst>
+          </p:nvPr>
+        </p:nvGraphicFramePr>
+        <p:xfrm>
+          <a:off x="1815867" y="786169"/>
+          <a:ext cx="8791172" cy="5403843"/>
+        </p:xfrm>
+        <a:graphic>
+          <a:graphicData uri="http://schemas.openxmlformats.org/drawingml/2006/table">
+            <a:tbl>
+              <a:tblPr firstRow="1" bandRow="1">
+                <a:tableStyleId>{9DCAF9ED-07DC-4A11-8D7F-57B35C25682E}</a:tableStyleId>
+              </a:tblPr>
+              <a:tblGrid>
+                <a:gridCol w="2197793">
+                  <a:extLst>
+                    <a:ext uri="{9D8B030D-6E8A-4147-A177-3AD203B41FA5}">
+                      <a16:colId xmlns:a16="http://schemas.microsoft.com/office/drawing/2014/main" val="1279948072"/>
+                    </a:ext>
+                  </a:extLst>
+                </a:gridCol>
+                <a:gridCol w="2197793">
+                  <a:extLst>
+                    <a:ext uri="{9D8B030D-6E8A-4147-A177-3AD203B41FA5}">
+                      <a16:colId xmlns:a16="http://schemas.microsoft.com/office/drawing/2014/main" val="1593545219"/>
+                    </a:ext>
+                  </a:extLst>
+                </a:gridCol>
+                <a:gridCol w="2197793">
+                  <a:extLst>
+                    <a:ext uri="{9D8B030D-6E8A-4147-A177-3AD203B41FA5}">
+                      <a16:colId xmlns:a16="http://schemas.microsoft.com/office/drawing/2014/main" val="1373504811"/>
+                    </a:ext>
+                  </a:extLst>
+                </a:gridCol>
+                <a:gridCol w="2197793">
+                  <a:extLst>
+                    <a:ext uri="{9D8B030D-6E8A-4147-A177-3AD203B41FA5}">
+                      <a16:colId xmlns:a16="http://schemas.microsoft.com/office/drawing/2014/main" val="1641182163"/>
+                    </a:ext>
+                  </a:extLst>
+                </a:gridCol>
+              </a:tblGrid>
+              <a:tr h="436141">
+                <a:tc>
+                  <a:txBody>
+                    <a:bodyPr/>
+                    <a:lstStyle/>
+                    <a:p>
+                      <a:pPr algn="ctr"/>
+                      <a:r>
+                        <a:rPr lang="fr-FR" dirty="0" smtClean="0"/>
+                        <a:t>Taches</a:t>
+                      </a:r>
+                      <a:endParaRPr lang="fr-FR" dirty="0"/>
+                    </a:p>
+                  </a:txBody>
+                  <a:tcPr/>
+                </a:tc>
+                <a:tc>
+                  <a:txBody>
+                    <a:bodyPr/>
+                    <a:lstStyle/>
+                    <a:p>
+                      <a:pPr algn="ctr"/>
+                      <a:r>
+                        <a:rPr lang="fr-FR" dirty="0" smtClean="0"/>
+                        <a:t>Gabriel</a:t>
+                      </a:r>
+                      <a:endParaRPr lang="fr-FR" dirty="0"/>
+                    </a:p>
+                  </a:txBody>
+                  <a:tcPr/>
+                </a:tc>
+                <a:tc>
+                  <a:txBody>
+                    <a:bodyPr/>
+                    <a:lstStyle/>
+                    <a:p>
+                      <a:pPr algn="ctr"/>
+                      <a:r>
+                        <a:rPr lang="fr-FR" dirty="0" smtClean="0"/>
+                        <a:t>Michael</a:t>
+                      </a:r>
+                      <a:endParaRPr lang="fr-FR" dirty="0"/>
+                    </a:p>
+                  </a:txBody>
+                  <a:tcPr/>
+                </a:tc>
+                <a:tc>
+                  <a:txBody>
+                    <a:bodyPr/>
+                    <a:lstStyle/>
+                    <a:p>
+                      <a:pPr algn="ctr"/>
+                      <a:r>
+                        <a:rPr lang="fr-FR" dirty="0" smtClean="0"/>
+                        <a:t>Claude</a:t>
+                      </a:r>
+                      <a:endParaRPr lang="fr-FR" dirty="0"/>
+                    </a:p>
+                  </a:txBody>
+                  <a:tcPr/>
+                </a:tc>
+                <a:extLst>
+                  <a:ext uri="{0D108BD9-81ED-4DB2-BD59-A6C34878D82A}">
+                    <a16:rowId xmlns:a16="http://schemas.microsoft.com/office/drawing/2014/main" val="2647326308"/>
+                  </a:ext>
+                </a:extLst>
+              </a:tr>
+              <a:tr h="1147666">
+                <a:tc>
+                  <a:txBody>
+                    <a:bodyPr/>
+                    <a:lstStyle/>
+                    <a:p>
+                      <a:pPr algn="ctr"/>
+                      <a:endParaRPr lang="fr-FR" dirty="0" smtClean="0"/>
+                    </a:p>
+                    <a:p>
+                      <a:pPr algn="ctr"/>
+                      <a:r>
+                        <a:rPr lang="fr-FR" dirty="0" smtClean="0"/>
+                        <a:t>Plan</a:t>
+                      </a:r>
+                      <a:r>
+                        <a:rPr lang="fr-FR" baseline="0" dirty="0" smtClean="0"/>
+                        <a:t> de déploiement</a:t>
+                      </a:r>
+                      <a:endParaRPr lang="fr-FR" dirty="0" smtClean="0"/>
+                    </a:p>
+                  </a:txBody>
+                  <a:tcPr/>
+                </a:tc>
+                <a:tc>
+                  <a:txBody>
+                    <a:bodyPr/>
+                    <a:lstStyle/>
+                    <a:p>
+                      <a:pPr algn="ctr"/>
+                      <a:endParaRPr lang="fr-FR" dirty="0" smtClean="0"/>
+                    </a:p>
+                    <a:p>
+                      <a:pPr algn="ctr"/>
+                      <a:endParaRPr lang="fr-FR" dirty="0"/>
+                    </a:p>
+                  </a:txBody>
+                  <a:tcPr/>
+                </a:tc>
+                <a:tc>
+                  <a:txBody>
+                    <a:bodyPr/>
+                    <a:lstStyle/>
+                    <a:p>
+                      <a:pPr algn="ctr"/>
+                      <a:endParaRPr lang="fr-FR" dirty="0"/>
+                    </a:p>
+                  </a:txBody>
+                  <a:tcPr/>
+                </a:tc>
+                <a:tc>
+                  <a:txBody>
+                    <a:bodyPr/>
+                    <a:lstStyle/>
+                    <a:p>
+                      <a:pPr algn="ctr"/>
+                      <a:endParaRPr lang="fr-FR" dirty="0"/>
+                    </a:p>
+                  </a:txBody>
+                  <a:tcPr/>
+                </a:tc>
+                <a:extLst>
+                  <a:ext uri="{0D108BD9-81ED-4DB2-BD59-A6C34878D82A}">
+                    <a16:rowId xmlns:a16="http://schemas.microsoft.com/office/drawing/2014/main" val="853558620"/>
+                  </a:ext>
+                </a:extLst>
+              </a:tr>
+              <a:tr h="955009">
+                <a:tc>
+                  <a:txBody>
+                    <a:bodyPr/>
+                    <a:lstStyle/>
+                    <a:p>
+                      <a:pPr algn="ctr"/>
+                      <a:endParaRPr lang="fr-FR" dirty="0" smtClean="0"/>
+                    </a:p>
+                    <a:p>
+                      <a:pPr algn="ctr"/>
+                      <a:r>
+                        <a:rPr lang="fr-FR" dirty="0" smtClean="0"/>
+                        <a:t>Suivi de projet</a:t>
+                      </a:r>
+                    </a:p>
+                  </a:txBody>
+                  <a:tcPr/>
+                </a:tc>
+                <a:tc>
+                  <a:txBody>
+                    <a:bodyPr/>
+                    <a:lstStyle/>
+                    <a:p>
+                      <a:pPr algn="ctr"/>
+                      <a:endParaRPr lang="fr-FR" dirty="0"/>
+                    </a:p>
+                  </a:txBody>
+                  <a:tcPr/>
+                </a:tc>
+                <a:tc>
+                  <a:txBody>
+                    <a:bodyPr/>
+                    <a:lstStyle/>
+                    <a:p>
+                      <a:pPr algn="ctr"/>
+                      <a:endParaRPr lang="fr-FR" dirty="0"/>
+                    </a:p>
+                  </a:txBody>
+                  <a:tcPr/>
+                </a:tc>
+                <a:tc>
+                  <a:txBody>
+                    <a:bodyPr/>
+                    <a:lstStyle/>
+                    <a:p>
+                      <a:pPr algn="ctr"/>
+                      <a:endParaRPr lang="fr-FR"/>
+                    </a:p>
+                  </a:txBody>
+                  <a:tcPr/>
+                </a:tc>
+                <a:extLst>
+                  <a:ext uri="{0D108BD9-81ED-4DB2-BD59-A6C34878D82A}">
+                    <a16:rowId xmlns:a16="http://schemas.microsoft.com/office/drawing/2014/main" val="960133350"/>
+                  </a:ext>
+                </a:extLst>
+              </a:tr>
+              <a:tr h="955009">
+                <a:tc>
+                  <a:txBody>
+                    <a:bodyPr/>
+                    <a:lstStyle/>
+                    <a:p>
+                      <a:pPr algn="ctr"/>
+                      <a:endParaRPr lang="fr-FR" dirty="0" smtClean="0"/>
+                    </a:p>
+                    <a:p>
+                      <a:pPr algn="ctr"/>
+                      <a:r>
+                        <a:rPr lang="fr-FR" dirty="0" smtClean="0"/>
+                        <a:t>Plan</a:t>
+                      </a:r>
+                      <a:r>
+                        <a:rPr lang="fr-FR" baseline="0" dirty="0" smtClean="0"/>
+                        <a:t> de test</a:t>
+                      </a:r>
+                      <a:endParaRPr lang="fr-FR" dirty="0" smtClean="0"/>
+                    </a:p>
+                  </a:txBody>
+                  <a:tcPr/>
+                </a:tc>
+                <a:tc>
+                  <a:txBody>
+                    <a:bodyPr/>
+                    <a:lstStyle/>
+                    <a:p>
+                      <a:pPr algn="ctr"/>
+                      <a:endParaRPr lang="fr-FR" dirty="0"/>
+                    </a:p>
+                  </a:txBody>
+                  <a:tcPr/>
+                </a:tc>
+                <a:tc>
+                  <a:txBody>
+                    <a:bodyPr/>
+                    <a:lstStyle/>
+                    <a:p>
+                      <a:pPr algn="ctr"/>
+                      <a:endParaRPr lang="fr-FR" dirty="0"/>
+                    </a:p>
+                  </a:txBody>
+                  <a:tcPr/>
+                </a:tc>
+                <a:tc>
+                  <a:txBody>
+                    <a:bodyPr/>
+                    <a:lstStyle/>
+                    <a:p>
+                      <a:pPr algn="ctr"/>
+                      <a:endParaRPr lang="fr-FR" dirty="0"/>
+                    </a:p>
+                  </a:txBody>
+                  <a:tcPr/>
+                </a:tc>
+                <a:extLst>
+                  <a:ext uri="{0D108BD9-81ED-4DB2-BD59-A6C34878D82A}">
+                    <a16:rowId xmlns:a16="http://schemas.microsoft.com/office/drawing/2014/main" val="2268178512"/>
+                  </a:ext>
+                </a:extLst>
+              </a:tr>
+              <a:tr h="955009">
+                <a:tc>
+                  <a:txBody>
+                    <a:bodyPr/>
+                    <a:lstStyle/>
+                    <a:p>
+                      <a:pPr algn="ctr"/>
+                      <a:endParaRPr lang="fr-FR" dirty="0" smtClean="0"/>
+                    </a:p>
+                    <a:p>
+                      <a:pPr algn="ctr"/>
+                      <a:r>
+                        <a:rPr lang="fr-FR" dirty="0" smtClean="0"/>
+                        <a:t>sécurisation</a:t>
+                      </a:r>
+                      <a:endParaRPr lang="fr-FR" dirty="0"/>
+                    </a:p>
+                  </a:txBody>
+                  <a:tcPr/>
+                </a:tc>
+                <a:tc>
+                  <a:txBody>
+                    <a:bodyPr/>
+                    <a:lstStyle/>
+                    <a:p>
+                      <a:pPr algn="ctr"/>
+                      <a:endParaRPr lang="fr-FR" dirty="0"/>
+                    </a:p>
+                  </a:txBody>
+                  <a:tcPr/>
+                </a:tc>
+                <a:tc>
+                  <a:txBody>
+                    <a:bodyPr/>
+                    <a:lstStyle/>
+                    <a:p>
+                      <a:pPr algn="ctr"/>
+                      <a:endParaRPr lang="fr-FR" dirty="0"/>
+                    </a:p>
+                  </a:txBody>
+                  <a:tcPr/>
+                </a:tc>
+                <a:tc>
+                  <a:txBody>
+                    <a:bodyPr/>
+                    <a:lstStyle/>
+                    <a:p>
+                      <a:pPr algn="ctr"/>
+                      <a:endParaRPr lang="fr-FR" dirty="0"/>
+                    </a:p>
+                  </a:txBody>
+                  <a:tcPr/>
+                </a:tc>
+                <a:extLst>
+                  <a:ext uri="{0D108BD9-81ED-4DB2-BD59-A6C34878D82A}">
+                    <a16:rowId xmlns:a16="http://schemas.microsoft.com/office/drawing/2014/main" val="2663648811"/>
+                  </a:ext>
+                </a:extLst>
+              </a:tr>
+              <a:tr h="955009">
+                <a:tc>
+                  <a:txBody>
+                    <a:bodyPr/>
+                    <a:lstStyle/>
+                    <a:p>
+                      <a:pPr algn="ctr"/>
+                      <a:endParaRPr lang="fr-FR" dirty="0" smtClean="0"/>
+                    </a:p>
+                  </a:txBody>
+                  <a:tcPr/>
+                </a:tc>
+                <a:tc>
+                  <a:txBody>
+                    <a:bodyPr/>
+                    <a:lstStyle/>
+                    <a:p>
+                      <a:pPr algn="ctr"/>
+                      <a:endParaRPr lang="fr-FR" dirty="0"/>
+                    </a:p>
+                  </a:txBody>
+                  <a:tcPr/>
+                </a:tc>
+                <a:tc>
+                  <a:txBody>
+                    <a:bodyPr/>
+                    <a:lstStyle/>
+                    <a:p>
+                      <a:pPr algn="ctr"/>
+                      <a:endParaRPr lang="fr-FR" dirty="0"/>
+                    </a:p>
+                  </a:txBody>
+                  <a:tcPr/>
+                </a:tc>
+                <a:tc>
+                  <a:txBody>
+                    <a:bodyPr/>
+                    <a:lstStyle/>
+                    <a:p>
+                      <a:pPr algn="ctr"/>
+                      <a:endParaRPr lang="fr-FR" dirty="0"/>
+                    </a:p>
+                  </a:txBody>
+                  <a:tcPr/>
+                </a:tc>
+                <a:extLst>
+                  <a:ext uri="{0D108BD9-81ED-4DB2-BD59-A6C34878D82A}">
+                    <a16:rowId xmlns:a16="http://schemas.microsoft.com/office/drawing/2014/main" val="3405210912"/>
+                  </a:ext>
+                </a:extLst>
+              </a:tr>
+            </a:tbl>
+          </a:graphicData>
+        </a:graphic>
+      </p:graphicFrame>
+    </p:spTree>
+    <p:extLst>
+      <p:ext uri="{BB962C8B-B14F-4D97-AF65-F5344CB8AC3E}">
+        <p14:creationId xmlns:p14="http://schemas.microsoft.com/office/powerpoint/2010/main" val="1031953042"/>
+      </p:ext>
+    </p:extLst>
+  </p:cSld>
+  <p:clrMapOvr>
+    <a:masterClrMapping/>
+  </p:clrMapOvr>
+</p:sld>
+</file>
+
+<file path=ppt/slides/slide6.xml><?xml version="1.0" encoding="utf-8"?>
+<p:sld xmlns:a="http://schemas.openxmlformats.org/drawingml/2006/main" xmlns:r="http://schemas.openxmlformats.org/officeDocument/2006/relationships" xmlns:p="http://schemas.openxmlformats.org/presentationml/2006/main">
+  <p:cSld>
+    <p:spTree>
+      <p:nvGrpSpPr>
+        <p:cNvPr id="1" name=""/>
+        <p:cNvGrpSpPr/>
+        <p:nvPr/>
+      </p:nvGrpSpPr>
+      <p:grpSpPr>
+        <a:xfrm>
+          <a:off x="0" y="0"/>
+          <a:ext cx="0" cy="0"/>
+          <a:chOff x="0" y="0"/>
+          <a:chExt cx="0" cy="0"/>
+        </a:xfrm>
+      </p:grpSpPr>
+      <p:sp>
+        <p:nvSpPr>
+          <p:cNvPr id="4" name="ZoneTexte 3"/>
+          <p:cNvSpPr txBox="1"/>
+          <p:nvPr/>
+        </p:nvSpPr>
+        <p:spPr>
+          <a:xfrm>
+            <a:off x="479085" y="98860"/>
+            <a:ext cx="7365076" cy="461665"/>
+          </a:xfrm>
+          <a:prstGeom prst="rect">
+            <a:avLst/>
+          </a:prstGeom>
+          <a:noFill/>
+        </p:spPr>
+        <p:txBody>
+          <a:bodyPr wrap="square" rtlCol="0">
+            <a:spAutoFit/>
+          </a:bodyPr>
+          <a:lstStyle/>
+          <a:p>
+            <a:pPr algn="ctr"/>
+            <a:r>
+              <a:rPr lang="fr-FR" sz="2400" dirty="0" smtClean="0">
+                <a:latin typeface="Arial Black" panose="020B0A04020102020204" pitchFamily="34" charset="0"/>
+              </a:rPr>
+              <a:t>Partie </a:t>
+            </a:r>
+            <a:r>
+              <a:rPr lang="fr-FR" sz="2400" dirty="0">
+                <a:latin typeface="Arial Black" panose="020B0A04020102020204" pitchFamily="34" charset="0"/>
+              </a:rPr>
+              <a:t>5</a:t>
+            </a:r>
+            <a:r>
+              <a:rPr lang="fr-FR" sz="2400" dirty="0" smtClean="0">
+                <a:latin typeface="Arial Black" panose="020B0A04020102020204" pitchFamily="34" charset="0"/>
+              </a:rPr>
+              <a:t>: présentation </a:t>
+            </a:r>
+            <a:endParaRPr lang="fr-FR" sz="2400" dirty="0">
+              <a:latin typeface="Arial Black" panose="020B0A04020102020204" pitchFamily="34" charset="0"/>
+            </a:endParaRPr>
+          </a:p>
+        </p:txBody>
+      </p:sp>
+      <p:sp>
+        <p:nvSpPr>
+          <p:cNvPr id="5" name="ZoneTexte 4"/>
+          <p:cNvSpPr txBox="1"/>
+          <p:nvPr/>
+        </p:nvSpPr>
+        <p:spPr>
+          <a:xfrm>
+            <a:off x="8495607" y="191193"/>
+            <a:ext cx="3466408" cy="369332"/>
+          </a:xfrm>
+          <a:prstGeom prst="rect">
+            <a:avLst/>
+          </a:prstGeom>
+          <a:noFill/>
+        </p:spPr>
+        <p:txBody>
+          <a:bodyPr wrap="square" rtlCol="0">
+            <a:spAutoFit/>
+          </a:bodyPr>
+          <a:lstStyle/>
+          <a:p>
+            <a:r>
+              <a:rPr lang="fr-FR" dirty="0" smtClean="0">
+                <a:latin typeface="Arial Black" panose="020B0A04020102020204" pitchFamily="34" charset="0"/>
+              </a:rPr>
+              <a:t>..</a:t>
+            </a:r>
+            <a:r>
+              <a:rPr lang="fr-FR" dirty="0" smtClean="0">
+                <a:latin typeface="Arial Black" panose="020B0A04020102020204" pitchFamily="34" charset="0"/>
+              </a:rPr>
+              <a:t>/../2025 </a:t>
+            </a:r>
+            <a:r>
+              <a:rPr lang="fr-FR" dirty="0" smtClean="0">
+                <a:latin typeface="Arial Black" panose="020B0A04020102020204" pitchFamily="34" charset="0"/>
+              </a:rPr>
+              <a:t>– </a:t>
+            </a:r>
+            <a:r>
+              <a:rPr lang="fr-FR" dirty="0" smtClean="0">
+                <a:latin typeface="Arial Black" panose="020B0A04020102020204" pitchFamily="34" charset="0"/>
+              </a:rPr>
+              <a:t>../../2025</a:t>
+            </a:r>
+            <a:endParaRPr lang="fr-FR" dirty="0">
+              <a:latin typeface="Arial Black" panose="020B0A04020102020204" pitchFamily="34" charset="0"/>
+            </a:endParaRPr>
+          </a:p>
+        </p:txBody>
+      </p:sp>
+      <p:graphicFrame>
+        <p:nvGraphicFramePr>
+          <p:cNvPr id="6" name="Tableau 5"/>
+          <p:cNvGraphicFramePr>
+            <a:graphicFrameLocks noGrp="1"/>
+          </p:cNvGraphicFramePr>
+          <p:nvPr>
+            <p:extLst>
+              <p:ext uri="{D42A27DB-BD31-4B8C-83A1-F6EECF244321}">
+                <p14:modId xmlns:p14="http://schemas.microsoft.com/office/powerpoint/2010/main" val="559589661"/>
+              </p:ext>
+            </p:extLst>
+          </p:nvPr>
+        </p:nvGraphicFramePr>
+        <p:xfrm>
+          <a:off x="1815867" y="699796"/>
+          <a:ext cx="8791172" cy="5573662"/>
+        </p:xfrm>
+        <a:graphic>
+          <a:graphicData uri="http://schemas.openxmlformats.org/drawingml/2006/table">
+            <a:tbl>
+              <a:tblPr firstRow="1" bandRow="1">
+                <a:tableStyleId>{793D81CF-94F2-401A-BA57-92F5A7B2D0C5}</a:tableStyleId>
+              </a:tblPr>
+              <a:tblGrid>
+                <a:gridCol w="2197793">
+                  <a:extLst>
+                    <a:ext uri="{9D8B030D-6E8A-4147-A177-3AD203B41FA5}">
+                      <a16:colId xmlns:a16="http://schemas.microsoft.com/office/drawing/2014/main" val="1279948072"/>
+                    </a:ext>
+                  </a:extLst>
+                </a:gridCol>
+                <a:gridCol w="2197793">
+                  <a:extLst>
+                    <a:ext uri="{9D8B030D-6E8A-4147-A177-3AD203B41FA5}">
+                      <a16:colId xmlns:a16="http://schemas.microsoft.com/office/drawing/2014/main" val="1593545219"/>
+                    </a:ext>
+                  </a:extLst>
+                </a:gridCol>
+                <a:gridCol w="2197793">
+                  <a:extLst>
+                    <a:ext uri="{9D8B030D-6E8A-4147-A177-3AD203B41FA5}">
+                      <a16:colId xmlns:a16="http://schemas.microsoft.com/office/drawing/2014/main" val="1373504811"/>
+                    </a:ext>
+                  </a:extLst>
+                </a:gridCol>
+                <a:gridCol w="2197793">
+                  <a:extLst>
+                    <a:ext uri="{9D8B030D-6E8A-4147-A177-3AD203B41FA5}">
+                      <a16:colId xmlns:a16="http://schemas.microsoft.com/office/drawing/2014/main" val="1641182163"/>
+                    </a:ext>
+                  </a:extLst>
+                </a:gridCol>
+              </a:tblGrid>
+              <a:tr h="961053">
+                <a:tc>
+                  <a:txBody>
+                    <a:bodyPr/>
+                    <a:lstStyle/>
+                    <a:p>
+                      <a:pPr algn="ctr"/>
+                      <a:endParaRPr lang="fr-FR" dirty="0" smtClean="0"/>
+                    </a:p>
+                    <a:p>
+                      <a:pPr algn="ctr"/>
+                      <a:r>
+                        <a:rPr lang="fr-FR" dirty="0" smtClean="0"/>
+                        <a:t>Taches</a:t>
+                      </a:r>
+                      <a:endParaRPr lang="fr-FR" dirty="0"/>
+                    </a:p>
+                  </a:txBody>
+                  <a:tcPr/>
+                </a:tc>
+                <a:tc>
+                  <a:txBody>
+                    <a:bodyPr/>
+                    <a:lstStyle/>
+                    <a:p>
+                      <a:pPr algn="ctr"/>
+                      <a:endParaRPr lang="fr-FR" dirty="0" smtClean="0"/>
+                    </a:p>
+                    <a:p>
+                      <a:pPr algn="ctr"/>
+                      <a:r>
+                        <a:rPr lang="fr-FR" dirty="0" smtClean="0"/>
+                        <a:t>Gabriel</a:t>
+                      </a:r>
+                      <a:endParaRPr lang="fr-FR" dirty="0"/>
+                    </a:p>
+                  </a:txBody>
+                  <a:tcPr/>
+                </a:tc>
+                <a:tc>
+                  <a:txBody>
+                    <a:bodyPr/>
+                    <a:lstStyle/>
+                    <a:p>
+                      <a:pPr algn="ctr"/>
+                      <a:endParaRPr lang="fr-FR" dirty="0" smtClean="0"/>
+                    </a:p>
+                    <a:p>
+                      <a:pPr algn="ctr"/>
+                      <a:r>
+                        <a:rPr lang="fr-FR" dirty="0" smtClean="0"/>
+                        <a:t>Michael</a:t>
+                      </a:r>
+                      <a:endParaRPr lang="fr-FR" dirty="0"/>
+                    </a:p>
+                  </a:txBody>
+                  <a:tcPr/>
+                </a:tc>
+                <a:tc>
+                  <a:txBody>
+                    <a:bodyPr/>
+                    <a:lstStyle/>
+                    <a:p>
+                      <a:pPr algn="ctr"/>
+                      <a:endParaRPr lang="fr-FR" dirty="0" smtClean="0"/>
+                    </a:p>
+                    <a:p>
+                      <a:pPr algn="ctr"/>
+                      <a:r>
+                        <a:rPr lang="fr-FR" dirty="0" smtClean="0"/>
+                        <a:t>Claude</a:t>
+                      </a:r>
+                      <a:endParaRPr lang="fr-FR" dirty="0"/>
+                    </a:p>
+                  </a:txBody>
+                  <a:tcPr/>
+                </a:tc>
+                <a:extLst>
+                  <a:ext uri="{0D108BD9-81ED-4DB2-BD59-A6C34878D82A}">
+                    <a16:rowId xmlns:a16="http://schemas.microsoft.com/office/drawing/2014/main" val="2647326308"/>
+                  </a:ext>
+                </a:extLst>
+              </a:tr>
+              <a:tr h="1147666">
+                <a:tc>
+                  <a:txBody>
+                    <a:bodyPr/>
+                    <a:lstStyle/>
+                    <a:p>
+                      <a:pPr algn="ctr"/>
+                      <a:endParaRPr lang="fr-FR" dirty="0" smtClean="0"/>
+                    </a:p>
+                    <a:p>
+                      <a:pPr algn="ctr"/>
+                      <a:r>
+                        <a:rPr lang="fr-FR" dirty="0" smtClean="0"/>
+                        <a:t>Documentation</a:t>
+                      </a:r>
+                      <a:r>
+                        <a:rPr lang="fr-FR" baseline="0" dirty="0" smtClean="0"/>
+                        <a:t> relative au projet</a:t>
+                      </a:r>
+                      <a:endParaRPr lang="fr-FR" dirty="0" smtClean="0"/>
+                    </a:p>
+                  </a:txBody>
+                  <a:tcPr/>
+                </a:tc>
+                <a:tc>
+                  <a:txBody>
+                    <a:bodyPr/>
+                    <a:lstStyle/>
+                    <a:p>
+                      <a:pPr algn="ctr"/>
+                      <a:endParaRPr lang="fr-FR" dirty="0" smtClean="0"/>
+                    </a:p>
+                    <a:p>
+                      <a:pPr algn="ctr"/>
+                      <a:endParaRPr lang="fr-FR" dirty="0"/>
+                    </a:p>
+                  </a:txBody>
+                  <a:tcPr/>
+                </a:tc>
+                <a:tc>
+                  <a:txBody>
+                    <a:bodyPr/>
+                    <a:lstStyle/>
+                    <a:p>
+                      <a:pPr algn="ctr"/>
+                      <a:endParaRPr lang="fr-FR" dirty="0"/>
+                    </a:p>
+                  </a:txBody>
+                  <a:tcPr/>
+                </a:tc>
+                <a:tc>
+                  <a:txBody>
+                    <a:bodyPr/>
+                    <a:lstStyle/>
+                    <a:p>
+                      <a:pPr algn="ctr"/>
+                      <a:endParaRPr lang="fr-FR" dirty="0"/>
+                    </a:p>
+                  </a:txBody>
+                  <a:tcPr/>
+                </a:tc>
+                <a:extLst>
+                  <a:ext uri="{0D108BD9-81ED-4DB2-BD59-A6C34878D82A}">
+                    <a16:rowId xmlns:a16="http://schemas.microsoft.com/office/drawing/2014/main" val="853558620"/>
+                  </a:ext>
+                </a:extLst>
+              </a:tr>
+              <a:tr h="1259632">
+                <a:tc>
+                  <a:txBody>
+                    <a:bodyPr/>
+                    <a:lstStyle/>
+                    <a:p>
+                      <a:pPr algn="ctr"/>
+                      <a:endParaRPr lang="fr-FR" dirty="0" smtClean="0"/>
+                    </a:p>
+                    <a:p>
+                      <a:pPr algn="ctr"/>
+                      <a:r>
+                        <a:rPr lang="fr-FR" dirty="0" smtClean="0"/>
+                        <a:t>Support</a:t>
+                      </a:r>
+                      <a:r>
+                        <a:rPr lang="fr-FR" baseline="0" dirty="0" smtClean="0"/>
+                        <a:t> de présentation</a:t>
+                      </a:r>
+                      <a:endParaRPr lang="fr-FR" dirty="0" smtClean="0"/>
+                    </a:p>
+                  </a:txBody>
+                  <a:tcPr/>
+                </a:tc>
+                <a:tc>
+                  <a:txBody>
+                    <a:bodyPr/>
+                    <a:lstStyle/>
+                    <a:p>
+                      <a:pPr algn="ctr"/>
+                      <a:endParaRPr lang="fr-FR" dirty="0"/>
+                    </a:p>
+                  </a:txBody>
+                  <a:tcPr/>
+                </a:tc>
+                <a:tc>
+                  <a:txBody>
+                    <a:bodyPr/>
+                    <a:lstStyle/>
+                    <a:p>
+                      <a:pPr algn="ctr"/>
+                      <a:endParaRPr lang="fr-FR" dirty="0"/>
+                    </a:p>
+                  </a:txBody>
+                  <a:tcPr/>
+                </a:tc>
+                <a:tc>
+                  <a:txBody>
+                    <a:bodyPr/>
+                    <a:lstStyle/>
+                    <a:p>
+                      <a:pPr algn="ctr"/>
+                      <a:endParaRPr lang="fr-FR"/>
+                    </a:p>
+                  </a:txBody>
+                  <a:tcPr/>
+                </a:tc>
+                <a:extLst>
+                  <a:ext uri="{0D108BD9-81ED-4DB2-BD59-A6C34878D82A}">
+                    <a16:rowId xmlns:a16="http://schemas.microsoft.com/office/drawing/2014/main" val="960133350"/>
+                  </a:ext>
+                </a:extLst>
+              </a:tr>
+              <a:tr h="1250302">
+                <a:tc>
+                  <a:txBody>
+                    <a:bodyPr/>
+                    <a:lstStyle/>
+                    <a:p>
+                      <a:pPr algn="ctr"/>
+                      <a:endParaRPr lang="fr-FR" dirty="0" smtClean="0"/>
+                    </a:p>
+                    <a:p>
+                      <a:pPr algn="ctr"/>
+                      <a:r>
+                        <a:rPr lang="fr-FR" dirty="0" smtClean="0"/>
+                        <a:t>Présentation</a:t>
+                      </a:r>
+                      <a:r>
+                        <a:rPr lang="fr-FR" baseline="0" dirty="0" smtClean="0"/>
+                        <a:t> du projet</a:t>
+                      </a:r>
+                      <a:endParaRPr lang="fr-FR" dirty="0" smtClean="0"/>
+                    </a:p>
+                  </a:txBody>
+                  <a:tcPr/>
+                </a:tc>
+                <a:tc>
+                  <a:txBody>
+                    <a:bodyPr/>
+                    <a:lstStyle/>
+                    <a:p>
+                      <a:pPr algn="ctr"/>
+                      <a:endParaRPr lang="fr-FR" dirty="0"/>
+                    </a:p>
+                  </a:txBody>
+                  <a:tcPr/>
+                </a:tc>
+                <a:tc>
+                  <a:txBody>
+                    <a:bodyPr/>
+                    <a:lstStyle/>
+                    <a:p>
+                      <a:pPr algn="ctr"/>
+                      <a:endParaRPr lang="fr-FR" dirty="0"/>
+                    </a:p>
+                  </a:txBody>
+                  <a:tcPr/>
+                </a:tc>
+                <a:tc>
+                  <a:txBody>
+                    <a:bodyPr/>
+                    <a:lstStyle/>
+                    <a:p>
+                      <a:pPr algn="ctr"/>
+                      <a:endParaRPr lang="fr-FR" dirty="0"/>
+                    </a:p>
+                  </a:txBody>
+                  <a:tcPr/>
+                </a:tc>
+                <a:extLst>
+                  <a:ext uri="{0D108BD9-81ED-4DB2-BD59-A6C34878D82A}">
+                    <a16:rowId xmlns:a16="http://schemas.microsoft.com/office/drawing/2014/main" val="2268178512"/>
+                  </a:ext>
+                </a:extLst>
+              </a:tr>
+              <a:tr h="955009">
+                <a:tc>
+                  <a:txBody>
+                    <a:bodyPr/>
+                    <a:lstStyle/>
+                    <a:p>
+                      <a:pPr algn="ctr"/>
+                      <a:endParaRPr lang="fr-FR" dirty="0" smtClean="0"/>
+                    </a:p>
+                    <a:p>
+                      <a:pPr algn="ctr"/>
+                      <a:r>
+                        <a:rPr lang="fr-FR" dirty="0" smtClean="0"/>
+                        <a:t>sécurisation</a:t>
+                      </a:r>
+                      <a:endParaRPr lang="fr-FR" dirty="0"/>
+                    </a:p>
+                  </a:txBody>
+                  <a:tcPr/>
+                </a:tc>
+                <a:tc>
+                  <a:txBody>
+                    <a:bodyPr/>
+                    <a:lstStyle/>
+                    <a:p>
+                      <a:pPr algn="ctr"/>
+                      <a:endParaRPr lang="fr-FR" dirty="0"/>
+                    </a:p>
+                  </a:txBody>
+                  <a:tcPr/>
+                </a:tc>
+                <a:tc>
+                  <a:txBody>
+                    <a:bodyPr/>
+                    <a:lstStyle/>
+                    <a:p>
+                      <a:pPr algn="ctr"/>
+                      <a:endParaRPr lang="fr-FR" dirty="0"/>
+                    </a:p>
+                  </a:txBody>
+                  <a:tcPr/>
+                </a:tc>
+                <a:tc>
+                  <a:txBody>
+                    <a:bodyPr/>
+                    <a:lstStyle/>
+                    <a:p>
+                      <a:pPr algn="ctr"/>
+                      <a:endParaRPr lang="fr-FR" dirty="0"/>
+                    </a:p>
+                  </a:txBody>
+                  <a:tcPr/>
+                </a:tc>
+                <a:extLst>
+                  <a:ext uri="{0D108BD9-81ED-4DB2-BD59-A6C34878D82A}">
+                    <a16:rowId xmlns:a16="http://schemas.microsoft.com/office/drawing/2014/main" val="2663648811"/>
+                  </a:ext>
+                </a:extLst>
+              </a:tr>
+            </a:tbl>
+          </a:graphicData>
+        </a:graphic>
+      </p:graphicFrame>
+    </p:spTree>
+    <p:extLst>
+      <p:ext uri="{BB962C8B-B14F-4D97-AF65-F5344CB8AC3E}">
+        <p14:creationId xmlns:p14="http://schemas.microsoft.com/office/powerpoint/2010/main" val="2885146786"/>
       </p:ext>
     </p:extLst>
   </p:cSld>

</xml_diff>